<commit_message>
done till my bugs page
</commit_message>
<xml_diff>
--- a/advocacy/BugBase 1.pptx
+++ b/advocacy/BugBase 1.pptx
@@ -31,11 +31,16 @@
     <p:sldId id="280" r:id="rId25"/>
     <p:sldId id="281" r:id="rId26"/>
     <p:sldId id="282" r:id="rId27"/>
-    <p:sldId id="284" r:id="rId28"/>
-    <p:sldId id="285" r:id="rId29"/>
-    <p:sldId id="286" r:id="rId30"/>
-    <p:sldId id="283" r:id="rId31"/>
-    <p:sldId id="259" r:id="rId32"/>
+    <p:sldId id="291" r:id="rId28"/>
+    <p:sldId id="284" r:id="rId29"/>
+    <p:sldId id="287" r:id="rId30"/>
+    <p:sldId id="288" r:id="rId31"/>
+    <p:sldId id="289" r:id="rId32"/>
+    <p:sldId id="290" r:id="rId33"/>
+    <p:sldId id="285" r:id="rId34"/>
+    <p:sldId id="292" r:id="rId35"/>
+    <p:sldId id="283" r:id="rId36"/>
+    <p:sldId id="259" r:id="rId37"/>
   </p:sldIdLst>
   <p:sldSz cx="9144000" cy="6858000" type="screen4x3"/>
   <p:notesSz cx="6858000" cy="9144000"/>
@@ -7480,66 +7485,43 @@
           </a:p>
         </p:txBody>
       </p:sp>
-      <p:pic>
-        <p:nvPicPr>
-          <p:cNvPr id="5" name="Picture 4" descr="snapshot57.png"/>
-          <p:cNvPicPr>
-            <a:picLocks noChangeAspect="1"/>
-          </p:cNvPicPr>
+      <p:sp>
+        <p:nvSpPr>
+          <p:cNvPr id="4" name="TextBox 3"/>
+          <p:cNvSpPr txBox="1"/>
           <p:nvPr/>
-        </p:nvPicPr>
-        <p:blipFill>
-          <a:blip r:embed="rId2"/>
-          <a:stretch>
-            <a:fillRect/>
-          </a:stretch>
-        </p:blipFill>
-        <p:spPr>
-          <a:xfrm>
-            <a:off x="0" y="1424215"/>
-            <a:ext cx="9144000" cy="5433785"/>
+        </p:nvSpPr>
+        <p:spPr>
+          <a:xfrm>
+            <a:off x="457200" y="1887141"/>
+            <a:ext cx="8229600" cy="1569660"/>
           </a:xfrm>
           <a:prstGeom prst="rect">
             <a:avLst/>
           </a:prstGeom>
-        </p:spPr>
-      </p:pic>
-      <p:sp>
-        <p:nvSpPr>
-          <p:cNvPr id="6" name="Down Arrow 5"/>
-          <p:cNvSpPr/>
-          <p:nvPr/>
-        </p:nvSpPr>
-        <p:spPr>
-          <a:xfrm>
-            <a:off x="4419600" y="6019800"/>
-            <a:ext cx="533400" cy="685800"/>
-          </a:xfrm>
-          <a:prstGeom prst="downArrow">
-            <a:avLst/>
-          </a:prstGeom>
-          <a:ln w="76200"/>
-        </p:spPr>
-        <p:style>
-          <a:lnRef idx="2">
-            <a:schemeClr val="dk1"/>
-          </a:lnRef>
-          <a:fillRef idx="1">
-            <a:schemeClr val="lt1"/>
-          </a:fillRef>
-          <a:effectRef idx="0">
-            <a:schemeClr val="dk1"/>
-          </a:effectRef>
-          <a:fontRef idx="minor">
-            <a:schemeClr val="dk1"/>
-          </a:fontRef>
-        </p:style>
-        <p:txBody>
-          <a:bodyPr rtlCol="0" anchor="ctr"/>
+          <a:solidFill>
+            <a:schemeClr val="accent5">
+              <a:lumMod val="20000"/>
+              <a:lumOff val="80000"/>
+            </a:schemeClr>
+          </a:solidFill>
+        </p:spPr>
+        <p:txBody>
+          <a:bodyPr wrap="square" rtlCol="0">
+            <a:spAutoFit/>
+          </a:bodyPr>
           <a:lstStyle/>
           <a:p>
             <a:pPr algn="ctr"/>
-            <a:endParaRPr lang="en-US"/>
+            <a:r>
+              <a:rPr lang="en-US" sz="4800" dirty="0" smtClean="0"/>
+              <a:t>Getting an overview of WTF is going on</a:t>
+            </a:r>
+            <a:endParaRPr lang="en-US" sz="2000" i="1" dirty="0">
+              <a:solidFill>
+                <a:srgbClr val="00B050"/>
+              </a:solidFill>
+            </a:endParaRPr>
           </a:p>
         </p:txBody>
       </p:sp>
@@ -7666,7 +7648,7 @@
       </p:sp>
       <p:pic>
         <p:nvPicPr>
-          <p:cNvPr id="6" name="Picture 5" descr="snapshot58.png"/>
+          <p:cNvPr id="5" name="Picture 4" descr="snapshot57.png"/>
           <p:cNvPicPr>
             <a:picLocks noChangeAspect="1"/>
           </p:cNvPicPr>
@@ -7680,53 +7662,14 @@
         </p:blipFill>
         <p:spPr>
           <a:xfrm>
-            <a:off x="0" y="1524000"/>
-            <a:ext cx="9144000" cy="5288643"/>
+            <a:off x="0" y="1424215"/>
+            <a:ext cx="9144000" cy="5433785"/>
           </a:xfrm>
           <a:prstGeom prst="rect">
             <a:avLst/>
           </a:prstGeom>
         </p:spPr>
       </p:pic>
-      <p:sp>
-        <p:nvSpPr>
-          <p:cNvPr id="7" name="Down Arrow 6"/>
-          <p:cNvSpPr/>
-          <p:nvPr/>
-        </p:nvSpPr>
-        <p:spPr>
-          <a:xfrm>
-            <a:off x="4419600" y="1447800"/>
-            <a:ext cx="533400" cy="685800"/>
-          </a:xfrm>
-          <a:prstGeom prst="downArrow">
-            <a:avLst/>
-          </a:prstGeom>
-          <a:ln w="76200"/>
-        </p:spPr>
-        <p:style>
-          <a:lnRef idx="2">
-            <a:schemeClr val="dk1"/>
-          </a:lnRef>
-          <a:fillRef idx="1">
-            <a:schemeClr val="lt1"/>
-          </a:fillRef>
-          <a:effectRef idx="0">
-            <a:schemeClr val="dk1"/>
-          </a:effectRef>
-          <a:fontRef idx="minor">
-            <a:schemeClr val="dk1"/>
-          </a:fontRef>
-        </p:style>
-        <p:txBody>
-          <a:bodyPr rtlCol="0" anchor="ctr"/>
-          <a:lstStyle/>
-          <a:p>
-            <a:pPr algn="ctr"/>
-            <a:endParaRPr lang="en-US"/>
-          </a:p>
-        </p:txBody>
-      </p:sp>
     </p:spTree>
   </p:cSld>
   <p:clrMapOvr>
@@ -7872,6 +7815,67 @@
           </a:prstGeom>
         </p:spPr>
       </p:pic>
+      <p:sp>
+        <p:nvSpPr>
+          <p:cNvPr id="6" name="Rectangular Callout 5"/>
+          <p:cNvSpPr/>
+          <p:nvPr/>
+        </p:nvSpPr>
+        <p:spPr>
+          <a:xfrm>
+            <a:off x="1295400" y="1828800"/>
+            <a:ext cx="2209800" cy="838200"/>
+          </a:xfrm>
+          <a:prstGeom prst="wedgeRectCallout">
+            <a:avLst/>
+          </a:prstGeom>
+          <a:solidFill>
+            <a:schemeClr val="bg1"/>
+          </a:solidFill>
+          <a:ln>
+            <a:solidFill>
+              <a:schemeClr val="tx1"/>
+            </a:solidFill>
+          </a:ln>
+          <a:effectLst>
+            <a:outerShdw blurRad="50800" dist="38100" dir="13500000" algn="br" rotWithShape="0">
+              <a:prstClr val="black">
+                <a:alpha val="40000"/>
+              </a:prstClr>
+            </a:outerShdw>
+          </a:effectLst>
+          <a:scene3d>
+            <a:camera prst="perspectiveHeroicExtremeRightFacing"/>
+            <a:lightRig rig="threePt" dir="t"/>
+          </a:scene3d>
+        </p:spPr>
+        <p:style>
+          <a:lnRef idx="2">
+            <a:schemeClr val="dk1"/>
+          </a:lnRef>
+          <a:fillRef idx="1">
+            <a:schemeClr val="lt1"/>
+          </a:fillRef>
+          <a:effectRef idx="0">
+            <a:schemeClr val="dk1"/>
+          </a:effectRef>
+          <a:fontRef idx="minor">
+            <a:schemeClr val="dk1"/>
+          </a:fontRef>
+        </p:style>
+        <p:txBody>
+          <a:bodyPr rtlCol="0" anchor="ctr"/>
+          <a:lstStyle/>
+          <a:p>
+            <a:pPr algn="ctr"/>
+            <a:r>
+              <a:rPr lang="en-US" dirty="0" smtClean="0"/>
+              <a:t>Your contributions quantified</a:t>
+            </a:r>
+            <a:endParaRPr lang="en-US" dirty="0"/>
+          </a:p>
+        </p:txBody>
+      </p:sp>
     </p:spTree>
   </p:cSld>
   <p:clrMapOvr>
@@ -8084,13 +8088,159 @@
                   <a:srgbClr val="00B050"/>
                 </a:solidFill>
               </a:rPr>
-              <a:t>Login / Register</a:t>
+              <a:t>Dashboard / Home Page</a:t>
             </a:r>
             <a:endParaRPr lang="en-US" b="1" dirty="0">
               <a:solidFill>
                 <a:srgbClr val="00B050"/>
               </a:solidFill>
             </a:endParaRPr>
+          </a:p>
+        </p:txBody>
+      </p:sp>
+      <p:pic>
+        <p:nvPicPr>
+          <p:cNvPr id="5" name="Picture 4" descr="snapshot57.png"/>
+          <p:cNvPicPr>
+            <a:picLocks noChangeAspect="1"/>
+          </p:cNvPicPr>
+          <p:nvPr/>
+        </p:nvPicPr>
+        <p:blipFill>
+          <a:blip r:embed="rId2"/>
+          <a:stretch>
+            <a:fillRect/>
+          </a:stretch>
+        </p:blipFill>
+        <p:spPr>
+          <a:xfrm>
+            <a:off x="0" y="1424215"/>
+            <a:ext cx="9144000" cy="5433785"/>
+          </a:xfrm>
+          <a:prstGeom prst="rect">
+            <a:avLst/>
+          </a:prstGeom>
+        </p:spPr>
+      </p:pic>
+      <p:sp>
+        <p:nvSpPr>
+          <p:cNvPr id="6" name="Rectangular Callout 5"/>
+          <p:cNvSpPr/>
+          <p:nvPr/>
+        </p:nvSpPr>
+        <p:spPr>
+          <a:xfrm>
+            <a:off x="1295400" y="1828800"/>
+            <a:ext cx="2209800" cy="838200"/>
+          </a:xfrm>
+          <a:prstGeom prst="wedgeRectCallout">
+            <a:avLst/>
+          </a:prstGeom>
+          <a:solidFill>
+            <a:schemeClr val="bg1"/>
+          </a:solidFill>
+          <a:ln>
+            <a:solidFill>
+              <a:schemeClr val="tx1"/>
+            </a:solidFill>
+          </a:ln>
+          <a:effectLst>
+            <a:outerShdw blurRad="50800" dist="38100" dir="13500000" algn="br" rotWithShape="0">
+              <a:prstClr val="black">
+                <a:alpha val="40000"/>
+              </a:prstClr>
+            </a:outerShdw>
+          </a:effectLst>
+          <a:scene3d>
+            <a:camera prst="perspectiveHeroicExtremeRightFacing"/>
+            <a:lightRig rig="threePt" dir="t"/>
+          </a:scene3d>
+        </p:spPr>
+        <p:style>
+          <a:lnRef idx="2">
+            <a:schemeClr val="dk1"/>
+          </a:lnRef>
+          <a:fillRef idx="1">
+            <a:schemeClr val="lt1"/>
+          </a:fillRef>
+          <a:effectRef idx="0">
+            <a:schemeClr val="dk1"/>
+          </a:effectRef>
+          <a:fontRef idx="minor">
+            <a:schemeClr val="dk1"/>
+          </a:fontRef>
+        </p:style>
+        <p:txBody>
+          <a:bodyPr rtlCol="0" anchor="ctr"/>
+          <a:lstStyle/>
+          <a:p>
+            <a:pPr algn="ctr"/>
+            <a:r>
+              <a:rPr lang="en-US" dirty="0" smtClean="0"/>
+              <a:t>Your contributions quantified</a:t>
+            </a:r>
+            <a:endParaRPr lang="en-US" dirty="0"/>
+          </a:p>
+        </p:txBody>
+      </p:sp>
+      <p:sp>
+        <p:nvSpPr>
+          <p:cNvPr id="7" name="Rectangular Callout 6"/>
+          <p:cNvSpPr/>
+          <p:nvPr/>
+        </p:nvSpPr>
+        <p:spPr>
+          <a:xfrm>
+            <a:off x="1447800" y="3581400"/>
+            <a:ext cx="2209800" cy="838200"/>
+          </a:xfrm>
+          <a:prstGeom prst="wedgeRectCallout">
+            <a:avLst/>
+          </a:prstGeom>
+          <a:solidFill>
+            <a:schemeClr val="bg1"/>
+          </a:solidFill>
+          <a:ln>
+            <a:solidFill>
+              <a:schemeClr val="tx1"/>
+            </a:solidFill>
+          </a:ln>
+          <a:effectLst>
+            <a:outerShdw blurRad="50800" dist="38100" dir="13500000" algn="br" rotWithShape="0">
+              <a:prstClr val="black">
+                <a:alpha val="40000"/>
+              </a:prstClr>
+            </a:outerShdw>
+          </a:effectLst>
+          <a:scene3d>
+            <a:camera prst="perspectiveHeroicExtremeRightFacing"/>
+            <a:lightRig rig="threePt" dir="t"/>
+          </a:scene3d>
+        </p:spPr>
+        <p:style>
+          <a:lnRef idx="2">
+            <a:schemeClr val="dk1"/>
+          </a:lnRef>
+          <a:fillRef idx="1">
+            <a:schemeClr val="lt1"/>
+          </a:fillRef>
+          <a:effectRef idx="0">
+            <a:schemeClr val="dk1"/>
+          </a:effectRef>
+          <a:fontRef idx="minor">
+            <a:schemeClr val="dk1"/>
+          </a:fontRef>
+        </p:style>
+        <p:txBody>
+          <a:bodyPr rtlCol="0" anchor="ctr"/>
+          <a:lstStyle/>
+          <a:p>
+            <a:pPr algn="ctr"/>
+            <a:r>
+              <a:rPr lang="en-US" dirty="0" smtClean="0"/>
+              <a:t>Your recent work</a:t>
+            </a:r>
+            <a:endParaRPr lang="en-US" dirty="0"/>
           </a:p>
         </p:txBody>
       </p:sp>
@@ -8110,6 +8260,1212 @@
 </file>
 
 <file path=ppt/slides/slide31.xml><?xml version="1.0" encoding="utf-8"?>
+<p:sld xmlns:a="http://schemas.openxmlformats.org/drawingml/2006/main" xmlns:r="http://schemas.openxmlformats.org/officeDocument/2006/relationships" xmlns:p="http://schemas.openxmlformats.org/presentationml/2006/main">
+  <p:cSld>
+    <p:spTree>
+      <p:nvGrpSpPr>
+        <p:cNvPr id="1" name=""/>
+        <p:cNvGrpSpPr/>
+        <p:nvPr/>
+      </p:nvGrpSpPr>
+      <p:grpSpPr>
+        <a:xfrm>
+          <a:off x="0" y="0"/>
+          <a:ext cx="0" cy="0"/>
+          <a:chOff x="0" y="0"/>
+          <a:chExt cx="0" cy="0"/>
+        </a:xfrm>
+      </p:grpSpPr>
+      <p:sp>
+        <p:nvSpPr>
+          <p:cNvPr id="2" name="Title 1"/>
+          <p:cNvSpPr>
+            <a:spLocks noGrp="1"/>
+          </p:cNvSpPr>
+          <p:nvPr>
+            <p:ph type="ctrTitle"/>
+          </p:nvPr>
+        </p:nvSpPr>
+        <p:spPr>
+          <a:xfrm>
+            <a:off x="0" y="1"/>
+            <a:ext cx="9144000" cy="838199"/>
+          </a:xfrm>
+          <a:solidFill>
+            <a:schemeClr val="tx1">
+              <a:lumMod val="95000"/>
+              <a:lumOff val="5000"/>
+            </a:schemeClr>
+          </a:solidFill>
+        </p:spPr>
+        <p:txBody>
+          <a:bodyPr>
+            <a:normAutofit/>
+          </a:bodyPr>
+          <a:lstStyle/>
+          <a:p>
+            <a:r>
+              <a:rPr lang="en-US" sz="3600" b="1" dirty="0" smtClean="0">
+                <a:solidFill>
+                  <a:schemeClr val="accent5">
+                    <a:lumMod val="20000"/>
+                    <a:lumOff val="80000"/>
+                  </a:schemeClr>
+                </a:solidFill>
+              </a:rPr>
+              <a:t>Features Tour</a:t>
+            </a:r>
+            <a:endParaRPr lang="en-US" sz="3600" b="1" dirty="0">
+              <a:solidFill>
+                <a:schemeClr val="accent5">
+                  <a:lumMod val="20000"/>
+                  <a:lumOff val="80000"/>
+                </a:schemeClr>
+              </a:solidFill>
+            </a:endParaRPr>
+          </a:p>
+        </p:txBody>
+      </p:sp>
+      <p:sp>
+        <p:nvSpPr>
+          <p:cNvPr id="3" name="Subtitle 2"/>
+          <p:cNvSpPr>
+            <a:spLocks noGrp="1"/>
+          </p:cNvSpPr>
+          <p:nvPr>
+            <p:ph type="subTitle" idx="1"/>
+          </p:nvPr>
+        </p:nvSpPr>
+        <p:spPr>
+          <a:xfrm>
+            <a:off x="0" y="838200"/>
+            <a:ext cx="9144000" cy="609600"/>
+          </a:xfrm>
+          <a:solidFill>
+            <a:srgbClr val="FFFFCC"/>
+          </a:solidFill>
+        </p:spPr>
+        <p:txBody>
+          <a:bodyPr/>
+          <a:lstStyle/>
+          <a:p>
+            <a:r>
+              <a:rPr lang="en-US" b="1" dirty="0" smtClean="0">
+                <a:solidFill>
+                  <a:srgbClr val="00B050"/>
+                </a:solidFill>
+              </a:rPr>
+              <a:t>Dashboard / Home Page</a:t>
+            </a:r>
+            <a:endParaRPr lang="en-US" b="1" dirty="0">
+              <a:solidFill>
+                <a:srgbClr val="00B050"/>
+              </a:solidFill>
+            </a:endParaRPr>
+          </a:p>
+        </p:txBody>
+      </p:sp>
+      <p:pic>
+        <p:nvPicPr>
+          <p:cNvPr id="5" name="Picture 4" descr="snapshot57.png"/>
+          <p:cNvPicPr>
+            <a:picLocks noChangeAspect="1"/>
+          </p:cNvPicPr>
+          <p:nvPr/>
+        </p:nvPicPr>
+        <p:blipFill>
+          <a:blip r:embed="rId2"/>
+          <a:stretch>
+            <a:fillRect/>
+          </a:stretch>
+        </p:blipFill>
+        <p:spPr>
+          <a:xfrm>
+            <a:off x="0" y="1424215"/>
+            <a:ext cx="9144000" cy="5433785"/>
+          </a:xfrm>
+          <a:prstGeom prst="rect">
+            <a:avLst/>
+          </a:prstGeom>
+        </p:spPr>
+      </p:pic>
+      <p:sp>
+        <p:nvSpPr>
+          <p:cNvPr id="6" name="Rectangular Callout 5"/>
+          <p:cNvSpPr/>
+          <p:nvPr/>
+        </p:nvSpPr>
+        <p:spPr>
+          <a:xfrm>
+            <a:off x="1295400" y="1828800"/>
+            <a:ext cx="2209800" cy="838200"/>
+          </a:xfrm>
+          <a:prstGeom prst="wedgeRectCallout">
+            <a:avLst/>
+          </a:prstGeom>
+          <a:solidFill>
+            <a:schemeClr val="bg1"/>
+          </a:solidFill>
+          <a:ln>
+            <a:solidFill>
+              <a:schemeClr val="tx1"/>
+            </a:solidFill>
+          </a:ln>
+          <a:effectLst>
+            <a:outerShdw blurRad="50800" dist="38100" dir="13500000" algn="br" rotWithShape="0">
+              <a:prstClr val="black">
+                <a:alpha val="40000"/>
+              </a:prstClr>
+            </a:outerShdw>
+          </a:effectLst>
+          <a:scene3d>
+            <a:camera prst="perspectiveHeroicExtremeRightFacing"/>
+            <a:lightRig rig="threePt" dir="t"/>
+          </a:scene3d>
+        </p:spPr>
+        <p:style>
+          <a:lnRef idx="2">
+            <a:schemeClr val="dk1"/>
+          </a:lnRef>
+          <a:fillRef idx="1">
+            <a:schemeClr val="lt1"/>
+          </a:fillRef>
+          <a:effectRef idx="0">
+            <a:schemeClr val="dk1"/>
+          </a:effectRef>
+          <a:fontRef idx="minor">
+            <a:schemeClr val="dk1"/>
+          </a:fontRef>
+        </p:style>
+        <p:txBody>
+          <a:bodyPr rtlCol="0" anchor="ctr"/>
+          <a:lstStyle/>
+          <a:p>
+            <a:pPr algn="ctr"/>
+            <a:r>
+              <a:rPr lang="en-US" dirty="0" smtClean="0"/>
+              <a:t>Your contributions quantified</a:t>
+            </a:r>
+            <a:endParaRPr lang="en-US" dirty="0"/>
+          </a:p>
+        </p:txBody>
+      </p:sp>
+      <p:sp>
+        <p:nvSpPr>
+          <p:cNvPr id="7" name="Rectangular Callout 6"/>
+          <p:cNvSpPr/>
+          <p:nvPr/>
+        </p:nvSpPr>
+        <p:spPr>
+          <a:xfrm>
+            <a:off x="1447800" y="3581400"/>
+            <a:ext cx="2209800" cy="838200"/>
+          </a:xfrm>
+          <a:prstGeom prst="wedgeRectCallout">
+            <a:avLst/>
+          </a:prstGeom>
+          <a:solidFill>
+            <a:schemeClr val="bg1"/>
+          </a:solidFill>
+          <a:ln>
+            <a:solidFill>
+              <a:schemeClr val="tx1"/>
+            </a:solidFill>
+          </a:ln>
+          <a:effectLst>
+            <a:outerShdw blurRad="50800" dist="38100" dir="13500000" algn="br" rotWithShape="0">
+              <a:prstClr val="black">
+                <a:alpha val="40000"/>
+              </a:prstClr>
+            </a:outerShdw>
+          </a:effectLst>
+          <a:scene3d>
+            <a:camera prst="perspectiveHeroicExtremeRightFacing"/>
+            <a:lightRig rig="threePt" dir="t"/>
+          </a:scene3d>
+        </p:spPr>
+        <p:style>
+          <a:lnRef idx="2">
+            <a:schemeClr val="dk1"/>
+          </a:lnRef>
+          <a:fillRef idx="1">
+            <a:schemeClr val="lt1"/>
+          </a:fillRef>
+          <a:effectRef idx="0">
+            <a:schemeClr val="dk1"/>
+          </a:effectRef>
+          <a:fontRef idx="minor">
+            <a:schemeClr val="dk1"/>
+          </a:fontRef>
+        </p:style>
+        <p:txBody>
+          <a:bodyPr rtlCol="0" anchor="ctr"/>
+          <a:lstStyle/>
+          <a:p>
+            <a:pPr algn="ctr"/>
+            <a:r>
+              <a:rPr lang="en-US" dirty="0" smtClean="0"/>
+              <a:t>Your recent work</a:t>
+            </a:r>
+            <a:endParaRPr lang="en-US" dirty="0"/>
+          </a:p>
+        </p:txBody>
+      </p:sp>
+      <p:sp>
+        <p:nvSpPr>
+          <p:cNvPr id="8" name="Rectangular Callout 7"/>
+          <p:cNvSpPr/>
+          <p:nvPr/>
+        </p:nvSpPr>
+        <p:spPr>
+          <a:xfrm>
+            <a:off x="5867400" y="2133600"/>
+            <a:ext cx="2209800" cy="838200"/>
+          </a:xfrm>
+          <a:prstGeom prst="wedgeRectCallout">
+            <a:avLst/>
+          </a:prstGeom>
+          <a:solidFill>
+            <a:schemeClr val="bg1"/>
+          </a:solidFill>
+          <a:ln>
+            <a:solidFill>
+              <a:schemeClr val="tx1"/>
+            </a:solidFill>
+          </a:ln>
+          <a:effectLst>
+            <a:outerShdw blurRad="50800" dist="38100" dir="13500000" algn="br" rotWithShape="0">
+              <a:prstClr val="black">
+                <a:alpha val="40000"/>
+              </a:prstClr>
+            </a:outerShdw>
+          </a:effectLst>
+          <a:scene3d>
+            <a:camera prst="perspectiveHeroicExtremeRightFacing"/>
+            <a:lightRig rig="threePt" dir="t"/>
+          </a:scene3d>
+        </p:spPr>
+        <p:style>
+          <a:lnRef idx="2">
+            <a:schemeClr val="dk1"/>
+          </a:lnRef>
+          <a:fillRef idx="1">
+            <a:schemeClr val="lt1"/>
+          </a:fillRef>
+          <a:effectRef idx="0">
+            <a:schemeClr val="dk1"/>
+          </a:effectRef>
+          <a:fontRef idx="minor">
+            <a:schemeClr val="dk1"/>
+          </a:fontRef>
+        </p:style>
+        <p:txBody>
+          <a:bodyPr rtlCol="0" anchor="ctr"/>
+          <a:lstStyle/>
+          <a:p>
+            <a:pPr algn="ctr"/>
+            <a:r>
+              <a:rPr lang="en-US" dirty="0" smtClean="0"/>
+              <a:t>Activity stream for today</a:t>
+            </a:r>
+            <a:endParaRPr lang="en-US" dirty="0"/>
+          </a:p>
+        </p:txBody>
+      </p:sp>
+    </p:spTree>
+  </p:cSld>
+  <p:clrMapOvr>
+    <a:masterClrMapping/>
+  </p:clrMapOvr>
+  <p:timing>
+    <p:tnLst>
+      <p:par>
+        <p:cTn id="1" dur="indefinite" restart="never" nodeType="tmRoot"/>
+      </p:par>
+    </p:tnLst>
+  </p:timing>
+</p:sld>
+</file>
+
+<file path=ppt/slides/slide32.xml><?xml version="1.0" encoding="utf-8"?>
+<p:sld xmlns:a="http://schemas.openxmlformats.org/drawingml/2006/main" xmlns:r="http://schemas.openxmlformats.org/officeDocument/2006/relationships" xmlns:p="http://schemas.openxmlformats.org/presentationml/2006/main">
+  <p:cSld>
+    <p:spTree>
+      <p:nvGrpSpPr>
+        <p:cNvPr id="1" name=""/>
+        <p:cNvGrpSpPr/>
+        <p:nvPr/>
+      </p:nvGrpSpPr>
+      <p:grpSpPr>
+        <a:xfrm>
+          <a:off x="0" y="0"/>
+          <a:ext cx="0" cy="0"/>
+          <a:chOff x="0" y="0"/>
+          <a:chExt cx="0" cy="0"/>
+        </a:xfrm>
+      </p:grpSpPr>
+      <p:sp>
+        <p:nvSpPr>
+          <p:cNvPr id="2" name="Title 1"/>
+          <p:cNvSpPr>
+            <a:spLocks noGrp="1"/>
+          </p:cNvSpPr>
+          <p:nvPr>
+            <p:ph type="ctrTitle"/>
+          </p:nvPr>
+        </p:nvSpPr>
+        <p:spPr>
+          <a:xfrm>
+            <a:off x="0" y="1"/>
+            <a:ext cx="9144000" cy="838199"/>
+          </a:xfrm>
+          <a:solidFill>
+            <a:schemeClr val="tx1">
+              <a:lumMod val="95000"/>
+              <a:lumOff val="5000"/>
+            </a:schemeClr>
+          </a:solidFill>
+        </p:spPr>
+        <p:txBody>
+          <a:bodyPr>
+            <a:normAutofit/>
+          </a:bodyPr>
+          <a:lstStyle/>
+          <a:p>
+            <a:r>
+              <a:rPr lang="en-US" sz="3600" b="1" dirty="0" smtClean="0">
+                <a:solidFill>
+                  <a:schemeClr val="accent5">
+                    <a:lumMod val="20000"/>
+                    <a:lumOff val="80000"/>
+                  </a:schemeClr>
+                </a:solidFill>
+              </a:rPr>
+              <a:t>Features Tour</a:t>
+            </a:r>
+            <a:endParaRPr lang="en-US" sz="3600" b="1" dirty="0">
+              <a:solidFill>
+                <a:schemeClr val="accent5">
+                  <a:lumMod val="20000"/>
+                  <a:lumOff val="80000"/>
+                </a:schemeClr>
+              </a:solidFill>
+            </a:endParaRPr>
+          </a:p>
+        </p:txBody>
+      </p:sp>
+      <p:sp>
+        <p:nvSpPr>
+          <p:cNvPr id="3" name="Subtitle 2"/>
+          <p:cNvSpPr>
+            <a:spLocks noGrp="1"/>
+          </p:cNvSpPr>
+          <p:nvPr>
+            <p:ph type="subTitle" idx="1"/>
+          </p:nvPr>
+        </p:nvSpPr>
+        <p:spPr>
+          <a:xfrm>
+            <a:off x="0" y="838200"/>
+            <a:ext cx="9144000" cy="609600"/>
+          </a:xfrm>
+          <a:solidFill>
+            <a:srgbClr val="FFFFCC"/>
+          </a:solidFill>
+        </p:spPr>
+        <p:txBody>
+          <a:bodyPr/>
+          <a:lstStyle/>
+          <a:p>
+            <a:r>
+              <a:rPr lang="en-US" b="1" dirty="0" smtClean="0">
+                <a:solidFill>
+                  <a:srgbClr val="00B050"/>
+                </a:solidFill>
+              </a:rPr>
+              <a:t>Dashboard / Home Page</a:t>
+            </a:r>
+            <a:endParaRPr lang="en-US" b="1" dirty="0">
+              <a:solidFill>
+                <a:srgbClr val="00B050"/>
+              </a:solidFill>
+            </a:endParaRPr>
+          </a:p>
+        </p:txBody>
+      </p:sp>
+      <p:pic>
+        <p:nvPicPr>
+          <p:cNvPr id="5" name="Picture 4" descr="snapshot57.png"/>
+          <p:cNvPicPr>
+            <a:picLocks noChangeAspect="1"/>
+          </p:cNvPicPr>
+          <p:nvPr/>
+        </p:nvPicPr>
+        <p:blipFill>
+          <a:blip r:embed="rId2"/>
+          <a:stretch>
+            <a:fillRect/>
+          </a:stretch>
+        </p:blipFill>
+        <p:spPr>
+          <a:xfrm>
+            <a:off x="0" y="1424215"/>
+            <a:ext cx="9144000" cy="5433785"/>
+          </a:xfrm>
+          <a:prstGeom prst="rect">
+            <a:avLst/>
+          </a:prstGeom>
+        </p:spPr>
+      </p:pic>
+      <p:sp>
+        <p:nvSpPr>
+          <p:cNvPr id="6" name="Rectangular Callout 5"/>
+          <p:cNvSpPr/>
+          <p:nvPr/>
+        </p:nvSpPr>
+        <p:spPr>
+          <a:xfrm>
+            <a:off x="1295400" y="1828800"/>
+            <a:ext cx="2209800" cy="838200"/>
+          </a:xfrm>
+          <a:prstGeom prst="wedgeRectCallout">
+            <a:avLst/>
+          </a:prstGeom>
+          <a:solidFill>
+            <a:schemeClr val="bg1"/>
+          </a:solidFill>
+          <a:ln>
+            <a:solidFill>
+              <a:schemeClr val="tx1"/>
+            </a:solidFill>
+          </a:ln>
+          <a:effectLst>
+            <a:outerShdw blurRad="50800" dist="38100" dir="13500000" algn="br" rotWithShape="0">
+              <a:prstClr val="black">
+                <a:alpha val="40000"/>
+              </a:prstClr>
+            </a:outerShdw>
+          </a:effectLst>
+          <a:scene3d>
+            <a:camera prst="perspectiveHeroicExtremeRightFacing"/>
+            <a:lightRig rig="threePt" dir="t"/>
+          </a:scene3d>
+        </p:spPr>
+        <p:style>
+          <a:lnRef idx="2">
+            <a:schemeClr val="dk1"/>
+          </a:lnRef>
+          <a:fillRef idx="1">
+            <a:schemeClr val="lt1"/>
+          </a:fillRef>
+          <a:effectRef idx="0">
+            <a:schemeClr val="dk1"/>
+          </a:effectRef>
+          <a:fontRef idx="minor">
+            <a:schemeClr val="dk1"/>
+          </a:fontRef>
+        </p:style>
+        <p:txBody>
+          <a:bodyPr rtlCol="0" anchor="ctr"/>
+          <a:lstStyle/>
+          <a:p>
+            <a:pPr algn="ctr"/>
+            <a:r>
+              <a:rPr lang="en-US" dirty="0" smtClean="0"/>
+              <a:t>Your contributions quantified</a:t>
+            </a:r>
+            <a:endParaRPr lang="en-US" dirty="0"/>
+          </a:p>
+        </p:txBody>
+      </p:sp>
+      <p:sp>
+        <p:nvSpPr>
+          <p:cNvPr id="7" name="Rectangular Callout 6"/>
+          <p:cNvSpPr/>
+          <p:nvPr/>
+        </p:nvSpPr>
+        <p:spPr>
+          <a:xfrm>
+            <a:off x="1447800" y="3581400"/>
+            <a:ext cx="2209800" cy="838200"/>
+          </a:xfrm>
+          <a:prstGeom prst="wedgeRectCallout">
+            <a:avLst/>
+          </a:prstGeom>
+          <a:solidFill>
+            <a:schemeClr val="bg1"/>
+          </a:solidFill>
+          <a:ln>
+            <a:solidFill>
+              <a:schemeClr val="tx1"/>
+            </a:solidFill>
+          </a:ln>
+          <a:effectLst>
+            <a:outerShdw blurRad="50800" dist="38100" dir="13500000" algn="br" rotWithShape="0">
+              <a:prstClr val="black">
+                <a:alpha val="40000"/>
+              </a:prstClr>
+            </a:outerShdw>
+          </a:effectLst>
+          <a:scene3d>
+            <a:camera prst="perspectiveHeroicExtremeRightFacing"/>
+            <a:lightRig rig="threePt" dir="t"/>
+          </a:scene3d>
+        </p:spPr>
+        <p:style>
+          <a:lnRef idx="2">
+            <a:schemeClr val="dk1"/>
+          </a:lnRef>
+          <a:fillRef idx="1">
+            <a:schemeClr val="lt1"/>
+          </a:fillRef>
+          <a:effectRef idx="0">
+            <a:schemeClr val="dk1"/>
+          </a:effectRef>
+          <a:fontRef idx="minor">
+            <a:schemeClr val="dk1"/>
+          </a:fontRef>
+        </p:style>
+        <p:txBody>
+          <a:bodyPr rtlCol="0" anchor="ctr"/>
+          <a:lstStyle/>
+          <a:p>
+            <a:pPr algn="ctr"/>
+            <a:r>
+              <a:rPr lang="en-US" dirty="0" smtClean="0"/>
+              <a:t>Your recent work</a:t>
+            </a:r>
+            <a:endParaRPr lang="en-US" dirty="0"/>
+          </a:p>
+        </p:txBody>
+      </p:sp>
+      <p:sp>
+        <p:nvSpPr>
+          <p:cNvPr id="8" name="Rectangular Callout 7"/>
+          <p:cNvSpPr/>
+          <p:nvPr/>
+        </p:nvSpPr>
+        <p:spPr>
+          <a:xfrm>
+            <a:off x="5867400" y="2133600"/>
+            <a:ext cx="2209800" cy="838200"/>
+          </a:xfrm>
+          <a:prstGeom prst="wedgeRectCallout">
+            <a:avLst/>
+          </a:prstGeom>
+          <a:solidFill>
+            <a:schemeClr val="bg1"/>
+          </a:solidFill>
+          <a:ln>
+            <a:solidFill>
+              <a:schemeClr val="tx1"/>
+            </a:solidFill>
+          </a:ln>
+          <a:effectLst>
+            <a:outerShdw blurRad="50800" dist="38100" dir="13500000" algn="br" rotWithShape="0">
+              <a:prstClr val="black">
+                <a:alpha val="40000"/>
+              </a:prstClr>
+            </a:outerShdw>
+          </a:effectLst>
+          <a:scene3d>
+            <a:camera prst="perspectiveHeroicExtremeRightFacing"/>
+            <a:lightRig rig="threePt" dir="t"/>
+          </a:scene3d>
+        </p:spPr>
+        <p:style>
+          <a:lnRef idx="2">
+            <a:schemeClr val="dk1"/>
+          </a:lnRef>
+          <a:fillRef idx="1">
+            <a:schemeClr val="lt1"/>
+          </a:fillRef>
+          <a:effectRef idx="0">
+            <a:schemeClr val="dk1"/>
+          </a:effectRef>
+          <a:fontRef idx="minor">
+            <a:schemeClr val="dk1"/>
+          </a:fontRef>
+        </p:style>
+        <p:txBody>
+          <a:bodyPr rtlCol="0" anchor="ctr"/>
+          <a:lstStyle/>
+          <a:p>
+            <a:pPr algn="ctr"/>
+            <a:r>
+              <a:rPr lang="en-US" dirty="0" smtClean="0"/>
+              <a:t>Activity stream for today</a:t>
+            </a:r>
+            <a:endParaRPr lang="en-US" dirty="0"/>
+          </a:p>
+        </p:txBody>
+      </p:sp>
+      <p:sp>
+        <p:nvSpPr>
+          <p:cNvPr id="9" name="Down Arrow 8"/>
+          <p:cNvSpPr/>
+          <p:nvPr/>
+        </p:nvSpPr>
+        <p:spPr>
+          <a:xfrm>
+            <a:off x="4419600" y="6019800"/>
+            <a:ext cx="533400" cy="685800"/>
+          </a:xfrm>
+          <a:prstGeom prst="downArrow">
+            <a:avLst/>
+          </a:prstGeom>
+          <a:ln w="76200"/>
+        </p:spPr>
+        <p:style>
+          <a:lnRef idx="2">
+            <a:schemeClr val="dk1"/>
+          </a:lnRef>
+          <a:fillRef idx="1">
+            <a:schemeClr val="lt1"/>
+          </a:fillRef>
+          <a:effectRef idx="0">
+            <a:schemeClr val="dk1"/>
+          </a:effectRef>
+          <a:fontRef idx="minor">
+            <a:schemeClr val="dk1"/>
+          </a:fontRef>
+        </p:style>
+        <p:txBody>
+          <a:bodyPr rtlCol="0" anchor="ctr"/>
+          <a:lstStyle/>
+          <a:p>
+            <a:pPr algn="ctr"/>
+            <a:endParaRPr lang="en-US"/>
+          </a:p>
+        </p:txBody>
+      </p:sp>
+    </p:spTree>
+  </p:cSld>
+  <p:clrMapOvr>
+    <a:masterClrMapping/>
+  </p:clrMapOvr>
+  <p:timing>
+    <p:tnLst>
+      <p:par>
+        <p:cTn id="1" dur="indefinite" restart="never" nodeType="tmRoot"/>
+      </p:par>
+    </p:tnLst>
+  </p:timing>
+</p:sld>
+</file>
+
+<file path=ppt/slides/slide33.xml><?xml version="1.0" encoding="utf-8"?>
+<p:sld xmlns:a="http://schemas.openxmlformats.org/drawingml/2006/main" xmlns:r="http://schemas.openxmlformats.org/officeDocument/2006/relationships" xmlns:p="http://schemas.openxmlformats.org/presentationml/2006/main">
+  <p:cSld>
+    <p:spTree>
+      <p:nvGrpSpPr>
+        <p:cNvPr id="1" name=""/>
+        <p:cNvGrpSpPr/>
+        <p:nvPr/>
+      </p:nvGrpSpPr>
+      <p:grpSpPr>
+        <a:xfrm>
+          <a:off x="0" y="0"/>
+          <a:ext cx="0" cy="0"/>
+          <a:chOff x="0" y="0"/>
+          <a:chExt cx="0" cy="0"/>
+        </a:xfrm>
+      </p:grpSpPr>
+      <p:sp>
+        <p:nvSpPr>
+          <p:cNvPr id="2" name="Title 1"/>
+          <p:cNvSpPr>
+            <a:spLocks noGrp="1"/>
+          </p:cNvSpPr>
+          <p:nvPr>
+            <p:ph type="ctrTitle"/>
+          </p:nvPr>
+        </p:nvSpPr>
+        <p:spPr>
+          <a:xfrm>
+            <a:off x="0" y="1"/>
+            <a:ext cx="9144000" cy="838199"/>
+          </a:xfrm>
+          <a:solidFill>
+            <a:schemeClr val="tx1">
+              <a:lumMod val="95000"/>
+              <a:lumOff val="5000"/>
+            </a:schemeClr>
+          </a:solidFill>
+        </p:spPr>
+        <p:txBody>
+          <a:bodyPr>
+            <a:normAutofit/>
+          </a:bodyPr>
+          <a:lstStyle/>
+          <a:p>
+            <a:r>
+              <a:rPr lang="en-US" sz="3600" b="1" dirty="0" smtClean="0">
+                <a:solidFill>
+                  <a:schemeClr val="accent5">
+                    <a:lumMod val="20000"/>
+                    <a:lumOff val="80000"/>
+                  </a:schemeClr>
+                </a:solidFill>
+              </a:rPr>
+              <a:t>Features Tour</a:t>
+            </a:r>
+            <a:endParaRPr lang="en-US" sz="3600" b="1" dirty="0">
+              <a:solidFill>
+                <a:schemeClr val="accent5">
+                  <a:lumMod val="20000"/>
+                  <a:lumOff val="80000"/>
+                </a:schemeClr>
+              </a:solidFill>
+            </a:endParaRPr>
+          </a:p>
+        </p:txBody>
+      </p:sp>
+      <p:sp>
+        <p:nvSpPr>
+          <p:cNvPr id="3" name="Subtitle 2"/>
+          <p:cNvSpPr>
+            <a:spLocks noGrp="1"/>
+          </p:cNvSpPr>
+          <p:nvPr>
+            <p:ph type="subTitle" idx="1"/>
+          </p:nvPr>
+        </p:nvSpPr>
+        <p:spPr>
+          <a:xfrm>
+            <a:off x="0" y="838200"/>
+            <a:ext cx="9144000" cy="609600"/>
+          </a:xfrm>
+          <a:solidFill>
+            <a:srgbClr val="FFFFCC"/>
+          </a:solidFill>
+        </p:spPr>
+        <p:txBody>
+          <a:bodyPr/>
+          <a:lstStyle/>
+          <a:p>
+            <a:r>
+              <a:rPr lang="en-US" b="1" dirty="0" smtClean="0">
+                <a:solidFill>
+                  <a:srgbClr val="00B050"/>
+                </a:solidFill>
+              </a:rPr>
+              <a:t>Dashboard / Home Page</a:t>
+            </a:r>
+            <a:endParaRPr lang="en-US" b="1" dirty="0">
+              <a:solidFill>
+                <a:srgbClr val="00B050"/>
+              </a:solidFill>
+            </a:endParaRPr>
+          </a:p>
+        </p:txBody>
+      </p:sp>
+      <p:pic>
+        <p:nvPicPr>
+          <p:cNvPr id="6" name="Picture 5" descr="snapshot58.png"/>
+          <p:cNvPicPr>
+            <a:picLocks noChangeAspect="1"/>
+          </p:cNvPicPr>
+          <p:nvPr/>
+        </p:nvPicPr>
+        <p:blipFill>
+          <a:blip r:embed="rId2"/>
+          <a:stretch>
+            <a:fillRect/>
+          </a:stretch>
+        </p:blipFill>
+        <p:spPr>
+          <a:xfrm>
+            <a:off x="0" y="1524000"/>
+            <a:ext cx="9144000" cy="5288643"/>
+          </a:xfrm>
+          <a:prstGeom prst="rect">
+            <a:avLst/>
+          </a:prstGeom>
+        </p:spPr>
+      </p:pic>
+      <p:sp>
+        <p:nvSpPr>
+          <p:cNvPr id="7" name="Down Arrow 6"/>
+          <p:cNvSpPr/>
+          <p:nvPr/>
+        </p:nvSpPr>
+        <p:spPr>
+          <a:xfrm>
+            <a:off x="4419600" y="1447800"/>
+            <a:ext cx="533400" cy="685800"/>
+          </a:xfrm>
+          <a:prstGeom prst="downArrow">
+            <a:avLst/>
+          </a:prstGeom>
+          <a:ln w="76200"/>
+        </p:spPr>
+        <p:style>
+          <a:lnRef idx="2">
+            <a:schemeClr val="dk1"/>
+          </a:lnRef>
+          <a:fillRef idx="1">
+            <a:schemeClr val="lt1"/>
+          </a:fillRef>
+          <a:effectRef idx="0">
+            <a:schemeClr val="dk1"/>
+          </a:effectRef>
+          <a:fontRef idx="minor">
+            <a:schemeClr val="dk1"/>
+          </a:fontRef>
+        </p:style>
+        <p:txBody>
+          <a:bodyPr rtlCol="0" anchor="ctr"/>
+          <a:lstStyle/>
+          <a:p>
+            <a:pPr algn="ctr"/>
+            <a:endParaRPr lang="en-US"/>
+          </a:p>
+        </p:txBody>
+      </p:sp>
+      <p:sp>
+        <p:nvSpPr>
+          <p:cNvPr id="8" name="Rectangular Callout 7"/>
+          <p:cNvSpPr/>
+          <p:nvPr/>
+        </p:nvSpPr>
+        <p:spPr>
+          <a:xfrm>
+            <a:off x="5715000" y="2667000"/>
+            <a:ext cx="2209800" cy="838200"/>
+          </a:xfrm>
+          <a:prstGeom prst="wedgeRectCallout">
+            <a:avLst/>
+          </a:prstGeom>
+          <a:solidFill>
+            <a:schemeClr val="bg1"/>
+          </a:solidFill>
+          <a:ln>
+            <a:solidFill>
+              <a:schemeClr val="tx1"/>
+            </a:solidFill>
+          </a:ln>
+          <a:effectLst>
+            <a:outerShdw blurRad="50800" dist="38100" dir="13500000" algn="br" rotWithShape="0">
+              <a:prstClr val="black">
+                <a:alpha val="40000"/>
+              </a:prstClr>
+            </a:outerShdw>
+          </a:effectLst>
+          <a:scene3d>
+            <a:camera prst="perspectiveHeroicExtremeRightFacing"/>
+            <a:lightRig rig="threePt" dir="t"/>
+          </a:scene3d>
+        </p:spPr>
+        <p:style>
+          <a:lnRef idx="2">
+            <a:schemeClr val="dk1"/>
+          </a:lnRef>
+          <a:fillRef idx="1">
+            <a:schemeClr val="lt1"/>
+          </a:fillRef>
+          <a:effectRef idx="0">
+            <a:schemeClr val="dk1"/>
+          </a:effectRef>
+          <a:fontRef idx="minor">
+            <a:schemeClr val="dk1"/>
+          </a:fontRef>
+        </p:style>
+        <p:txBody>
+          <a:bodyPr rtlCol="0" anchor="ctr"/>
+          <a:lstStyle/>
+          <a:p>
+            <a:pPr algn="ctr"/>
+            <a:r>
+              <a:rPr lang="en-US" dirty="0" smtClean="0"/>
+              <a:t>Anything before today</a:t>
+            </a:r>
+            <a:endParaRPr lang="en-US" dirty="0"/>
+          </a:p>
+        </p:txBody>
+      </p:sp>
+    </p:spTree>
+  </p:cSld>
+  <p:clrMapOvr>
+    <a:masterClrMapping/>
+  </p:clrMapOvr>
+  <p:timing>
+    <p:tnLst>
+      <p:par>
+        <p:cTn id="1" dur="indefinite" restart="never" nodeType="tmRoot"/>
+      </p:par>
+    </p:tnLst>
+  </p:timing>
+</p:sld>
+</file>
+
+<file path=ppt/slides/slide34.xml><?xml version="1.0" encoding="utf-8"?>
+<p:sld xmlns:a="http://schemas.openxmlformats.org/drawingml/2006/main" xmlns:r="http://schemas.openxmlformats.org/officeDocument/2006/relationships" xmlns:p="http://schemas.openxmlformats.org/presentationml/2006/main">
+  <p:cSld>
+    <p:spTree>
+      <p:nvGrpSpPr>
+        <p:cNvPr id="1" name=""/>
+        <p:cNvGrpSpPr/>
+        <p:nvPr/>
+      </p:nvGrpSpPr>
+      <p:grpSpPr>
+        <a:xfrm>
+          <a:off x="0" y="0"/>
+          <a:ext cx="0" cy="0"/>
+          <a:chOff x="0" y="0"/>
+          <a:chExt cx="0" cy="0"/>
+        </a:xfrm>
+      </p:grpSpPr>
+      <p:sp>
+        <p:nvSpPr>
+          <p:cNvPr id="2" name="Title 1"/>
+          <p:cNvSpPr>
+            <a:spLocks noGrp="1"/>
+          </p:cNvSpPr>
+          <p:nvPr>
+            <p:ph type="ctrTitle"/>
+          </p:nvPr>
+        </p:nvSpPr>
+        <p:spPr>
+          <a:xfrm>
+            <a:off x="0" y="1"/>
+            <a:ext cx="9144000" cy="838199"/>
+          </a:xfrm>
+          <a:solidFill>
+            <a:schemeClr val="tx1">
+              <a:lumMod val="95000"/>
+              <a:lumOff val="5000"/>
+            </a:schemeClr>
+          </a:solidFill>
+        </p:spPr>
+        <p:txBody>
+          <a:bodyPr>
+            <a:normAutofit/>
+          </a:bodyPr>
+          <a:lstStyle/>
+          <a:p>
+            <a:r>
+              <a:rPr lang="en-US" sz="3600" b="1" dirty="0" smtClean="0">
+                <a:solidFill>
+                  <a:schemeClr val="accent5">
+                    <a:lumMod val="20000"/>
+                    <a:lumOff val="80000"/>
+                  </a:schemeClr>
+                </a:solidFill>
+              </a:rPr>
+              <a:t>Features Tour</a:t>
+            </a:r>
+            <a:endParaRPr lang="en-US" sz="3600" b="1" dirty="0">
+              <a:solidFill>
+                <a:schemeClr val="accent5">
+                  <a:lumMod val="20000"/>
+                  <a:lumOff val="80000"/>
+                </a:schemeClr>
+              </a:solidFill>
+            </a:endParaRPr>
+          </a:p>
+        </p:txBody>
+      </p:sp>
+      <p:sp>
+        <p:nvSpPr>
+          <p:cNvPr id="3" name="Subtitle 2"/>
+          <p:cNvSpPr>
+            <a:spLocks noGrp="1"/>
+          </p:cNvSpPr>
+          <p:nvPr>
+            <p:ph type="subTitle" idx="1"/>
+          </p:nvPr>
+        </p:nvSpPr>
+        <p:spPr>
+          <a:xfrm>
+            <a:off x="0" y="838200"/>
+            <a:ext cx="9144000" cy="609600"/>
+          </a:xfrm>
+          <a:solidFill>
+            <a:srgbClr val="FFFFCC"/>
+          </a:solidFill>
+        </p:spPr>
+        <p:txBody>
+          <a:bodyPr/>
+          <a:lstStyle/>
+          <a:p>
+            <a:r>
+              <a:rPr lang="en-US" b="1" dirty="0" smtClean="0">
+                <a:solidFill>
+                  <a:srgbClr val="00B050"/>
+                </a:solidFill>
+              </a:rPr>
+              <a:t>My Bugs Page</a:t>
+            </a:r>
+            <a:endParaRPr lang="en-US" b="1" dirty="0">
+              <a:solidFill>
+                <a:srgbClr val="00B050"/>
+              </a:solidFill>
+            </a:endParaRPr>
+          </a:p>
+        </p:txBody>
+      </p:sp>
+      <p:pic>
+        <p:nvPicPr>
+          <p:cNvPr id="5" name="Picture 4" descr="Screenshot-37.png"/>
+          <p:cNvPicPr>
+            <a:picLocks noChangeAspect="1"/>
+          </p:cNvPicPr>
+          <p:nvPr/>
+        </p:nvPicPr>
+        <p:blipFill>
+          <a:blip r:embed="rId2"/>
+          <a:stretch>
+            <a:fillRect/>
+          </a:stretch>
+        </p:blipFill>
+        <p:spPr>
+          <a:xfrm>
+            <a:off x="0" y="1500187"/>
+            <a:ext cx="9144000" cy="5357813"/>
+          </a:xfrm>
+          <a:prstGeom prst="rect">
+            <a:avLst/>
+          </a:prstGeom>
+        </p:spPr>
+      </p:pic>
+    </p:spTree>
+  </p:cSld>
+  <p:clrMapOvr>
+    <a:masterClrMapping/>
+  </p:clrMapOvr>
+  <p:timing>
+    <p:tnLst>
+      <p:par>
+        <p:cTn id="1" dur="indefinite" restart="never" nodeType="tmRoot"/>
+      </p:par>
+    </p:tnLst>
+  </p:timing>
+</p:sld>
+</file>
+
+<file path=ppt/slides/slide35.xml><?xml version="1.0" encoding="utf-8"?>
+<p:sld xmlns:a="http://schemas.openxmlformats.org/drawingml/2006/main" xmlns:r="http://schemas.openxmlformats.org/officeDocument/2006/relationships" xmlns:p="http://schemas.openxmlformats.org/presentationml/2006/main">
+  <p:cSld>
+    <p:spTree>
+      <p:nvGrpSpPr>
+        <p:cNvPr id="1" name=""/>
+        <p:cNvGrpSpPr/>
+        <p:nvPr/>
+      </p:nvGrpSpPr>
+      <p:grpSpPr>
+        <a:xfrm>
+          <a:off x="0" y="0"/>
+          <a:ext cx="0" cy="0"/>
+          <a:chOff x="0" y="0"/>
+          <a:chExt cx="0" cy="0"/>
+        </a:xfrm>
+      </p:grpSpPr>
+      <p:sp>
+        <p:nvSpPr>
+          <p:cNvPr id="2" name="Title 1"/>
+          <p:cNvSpPr>
+            <a:spLocks noGrp="1"/>
+          </p:cNvSpPr>
+          <p:nvPr>
+            <p:ph type="ctrTitle"/>
+          </p:nvPr>
+        </p:nvSpPr>
+        <p:spPr>
+          <a:xfrm>
+            <a:off x="0" y="1"/>
+            <a:ext cx="9144000" cy="838199"/>
+          </a:xfrm>
+          <a:solidFill>
+            <a:schemeClr val="tx1">
+              <a:lumMod val="95000"/>
+              <a:lumOff val="5000"/>
+            </a:schemeClr>
+          </a:solidFill>
+        </p:spPr>
+        <p:txBody>
+          <a:bodyPr>
+            <a:normAutofit/>
+          </a:bodyPr>
+          <a:lstStyle/>
+          <a:p>
+            <a:r>
+              <a:rPr lang="en-US" sz="3600" b="1" dirty="0" smtClean="0">
+                <a:solidFill>
+                  <a:schemeClr val="accent5">
+                    <a:lumMod val="20000"/>
+                    <a:lumOff val="80000"/>
+                  </a:schemeClr>
+                </a:solidFill>
+              </a:rPr>
+              <a:t>Features Tour</a:t>
+            </a:r>
+            <a:endParaRPr lang="en-US" sz="3600" b="1" dirty="0">
+              <a:solidFill>
+                <a:schemeClr val="accent5">
+                  <a:lumMod val="20000"/>
+                  <a:lumOff val="80000"/>
+                </a:schemeClr>
+              </a:solidFill>
+            </a:endParaRPr>
+          </a:p>
+        </p:txBody>
+      </p:sp>
+      <p:sp>
+        <p:nvSpPr>
+          <p:cNvPr id="3" name="Subtitle 2"/>
+          <p:cNvSpPr>
+            <a:spLocks noGrp="1"/>
+          </p:cNvSpPr>
+          <p:nvPr>
+            <p:ph type="subTitle" idx="1"/>
+          </p:nvPr>
+        </p:nvSpPr>
+        <p:spPr>
+          <a:xfrm>
+            <a:off x="0" y="838200"/>
+            <a:ext cx="9144000" cy="609600"/>
+          </a:xfrm>
+          <a:solidFill>
+            <a:srgbClr val="FFFFCC"/>
+          </a:solidFill>
+        </p:spPr>
+        <p:txBody>
+          <a:bodyPr/>
+          <a:lstStyle/>
+          <a:p>
+            <a:r>
+              <a:rPr lang="en-US" b="1" dirty="0" smtClean="0">
+                <a:solidFill>
+                  <a:srgbClr val="00B050"/>
+                </a:solidFill>
+              </a:rPr>
+              <a:t>Login / Register</a:t>
+            </a:r>
+            <a:endParaRPr lang="en-US" b="1" dirty="0">
+              <a:solidFill>
+                <a:srgbClr val="00B050"/>
+              </a:solidFill>
+            </a:endParaRPr>
+          </a:p>
+        </p:txBody>
+      </p:sp>
+    </p:spTree>
+  </p:cSld>
+  <p:clrMapOvr>
+    <a:masterClrMapping/>
+  </p:clrMapOvr>
+  <p:timing>
+    <p:tnLst>
+      <p:par>
+        <p:cTn id="1" dur="indefinite" restart="never" nodeType="tmRoot"/>
+      </p:par>
+    </p:tnLst>
+  </p:timing>
+</p:sld>
+</file>
+
+<file path=ppt/slides/slide36.xml><?xml version="1.0" encoding="utf-8"?>
 <p:sld xmlns:a="http://schemas.openxmlformats.org/drawingml/2006/main" xmlns:r="http://schemas.openxmlformats.org/officeDocument/2006/relationships" xmlns:p="http://schemas.openxmlformats.org/presentationml/2006/main">
   <p:cSld>
     <p:spTree>

</xml_diff>

<commit_message>
added admin page demo
</commit_message>
<xml_diff>
--- a/advocacy/BugBase 1.pptx
+++ b/advocacy/BugBase 1.pptx
@@ -38,9 +38,24 @@
     <p:sldId id="289" r:id="rId32"/>
     <p:sldId id="290" r:id="rId33"/>
     <p:sldId id="285" r:id="rId34"/>
-    <p:sldId id="292" r:id="rId35"/>
-    <p:sldId id="283" r:id="rId36"/>
-    <p:sldId id="259" r:id="rId37"/>
+    <p:sldId id="293" r:id="rId35"/>
+    <p:sldId id="294" r:id="rId36"/>
+    <p:sldId id="295" r:id="rId37"/>
+    <p:sldId id="296" r:id="rId38"/>
+    <p:sldId id="297" r:id="rId39"/>
+    <p:sldId id="298" r:id="rId40"/>
+    <p:sldId id="283" r:id="rId41"/>
+    <p:sldId id="299" r:id="rId42"/>
+    <p:sldId id="300" r:id="rId43"/>
+    <p:sldId id="301" r:id="rId44"/>
+    <p:sldId id="303" r:id="rId45"/>
+    <p:sldId id="304" r:id="rId46"/>
+    <p:sldId id="305" r:id="rId47"/>
+    <p:sldId id="306" r:id="rId48"/>
+    <p:sldId id="308" r:id="rId49"/>
+    <p:sldId id="307" r:id="rId50"/>
+    <p:sldId id="309" r:id="rId51"/>
+    <p:sldId id="259" r:id="rId52"/>
   </p:sldIdLst>
   <p:sldSz cx="9144000" cy="6858000" type="screen4x3"/>
   <p:notesSz cx="6858000" cy="9144000"/>
@@ -9305,30 +9320,46 @@
           </a:p>
         </p:txBody>
       </p:sp>
-      <p:pic>
-        <p:nvPicPr>
-          <p:cNvPr id="5" name="Picture 4" descr="Screenshot-37.png"/>
-          <p:cNvPicPr>
-            <a:picLocks noChangeAspect="1"/>
-          </p:cNvPicPr>
+      <p:sp>
+        <p:nvSpPr>
+          <p:cNvPr id="6" name="TextBox 5"/>
+          <p:cNvSpPr txBox="1"/>
           <p:nvPr/>
-        </p:nvPicPr>
-        <p:blipFill>
-          <a:blip r:embed="rId2"/>
-          <a:stretch>
-            <a:fillRect/>
-          </a:stretch>
-        </p:blipFill>
-        <p:spPr>
-          <a:xfrm>
-            <a:off x="0" y="1500187"/>
-            <a:ext cx="9144000" cy="5357813"/>
+        </p:nvSpPr>
+        <p:spPr>
+          <a:xfrm>
+            <a:off x="457200" y="1887141"/>
+            <a:ext cx="8229600" cy="830997"/>
           </a:xfrm>
           <a:prstGeom prst="rect">
             <a:avLst/>
           </a:prstGeom>
-        </p:spPr>
-      </p:pic>
+          <a:solidFill>
+            <a:schemeClr val="accent5">
+              <a:lumMod val="20000"/>
+              <a:lumOff val="80000"/>
+            </a:schemeClr>
+          </a:solidFill>
+        </p:spPr>
+        <p:txBody>
+          <a:bodyPr wrap="square" rtlCol="0">
+            <a:spAutoFit/>
+          </a:bodyPr>
+          <a:lstStyle/>
+          <a:p>
+            <a:pPr algn="ctr"/>
+            <a:r>
+              <a:rPr lang="en-US" sz="4800" dirty="0" smtClean="0"/>
+              <a:t>Mind your own business</a:t>
+            </a:r>
+            <a:endParaRPr lang="en-US" sz="2000" i="1" dirty="0">
+              <a:solidFill>
+                <a:srgbClr val="00B050"/>
+              </a:solidFill>
+            </a:endParaRPr>
+          </a:p>
+        </p:txBody>
+      </p:sp>
     </p:spTree>
   </p:cSld>
   <p:clrMapOvr>
@@ -9440,7 +9471,7 @@
                   <a:srgbClr val="00B050"/>
                 </a:solidFill>
               </a:rPr>
-              <a:t>Login / Register</a:t>
+              <a:t>My Bugs Page</a:t>
             </a:r>
             <a:endParaRPr lang="en-US" b="1" dirty="0">
               <a:solidFill>
@@ -9450,6 +9481,30 @@
           </a:p>
         </p:txBody>
       </p:sp>
+      <p:pic>
+        <p:nvPicPr>
+          <p:cNvPr id="5" name="Picture 4" descr="Screenshot-37.png"/>
+          <p:cNvPicPr>
+            <a:picLocks noChangeAspect="1"/>
+          </p:cNvPicPr>
+          <p:nvPr/>
+        </p:nvPicPr>
+        <p:blipFill>
+          <a:blip r:embed="rId2"/>
+          <a:stretch>
+            <a:fillRect/>
+          </a:stretch>
+        </p:blipFill>
+        <p:spPr>
+          <a:xfrm>
+            <a:off x="0" y="1500187"/>
+            <a:ext cx="9144000" cy="5357813"/>
+          </a:xfrm>
+          <a:prstGeom prst="rect">
+            <a:avLst/>
+          </a:prstGeom>
+        </p:spPr>
+      </p:pic>
     </p:spTree>
   </p:cSld>
   <p:clrMapOvr>
@@ -9511,7 +9566,7 @@
           <a:lstStyle/>
           <a:p>
             <a:r>
-              <a:rPr lang="en-US" sz="3600" b="1" dirty="0" err="1" smtClean="0">
+              <a:rPr lang="en-US" sz="3600" b="1" dirty="0" smtClean="0">
                 <a:solidFill>
                   <a:schemeClr val="accent5">
                     <a:lumMod val="20000"/>
@@ -9519,18 +9574,7 @@
                   </a:schemeClr>
                 </a:solidFill>
               </a:rPr>
-              <a:t>BugBase</a:t>
-            </a:r>
-            <a:r>
-              <a:rPr lang="en-US" sz="3600" b="1" dirty="0" smtClean="0">
-                <a:solidFill>
-                  <a:schemeClr val="accent5">
-                    <a:lumMod val="20000"/>
-                    <a:lumOff val="80000"/>
-                  </a:schemeClr>
-                </a:solidFill>
-              </a:rPr>
-              <a:t> 1.0</a:t>
+              <a:t>Features Tour</a:t>
             </a:r>
             <a:endParaRPr lang="en-US" sz="3600" b="1" dirty="0">
               <a:solidFill>
@@ -9572,7 +9616,7 @@
                   <a:srgbClr val="00B050"/>
                 </a:solidFill>
               </a:rPr>
-              <a:t>What is a bug tracker?</a:t>
+              <a:t>All Bugs</a:t>
             </a:r>
             <a:endParaRPr lang="en-US" b="1" dirty="0">
               <a:solidFill>
@@ -9582,6 +9626,504 @@
           </a:p>
         </p:txBody>
       </p:sp>
+      <p:sp>
+        <p:nvSpPr>
+          <p:cNvPr id="6" name="TextBox 5"/>
+          <p:cNvSpPr txBox="1"/>
+          <p:nvPr/>
+        </p:nvSpPr>
+        <p:spPr>
+          <a:xfrm>
+            <a:off x="457200" y="1887141"/>
+            <a:ext cx="8229600" cy="830997"/>
+          </a:xfrm>
+          <a:prstGeom prst="rect">
+            <a:avLst/>
+          </a:prstGeom>
+          <a:solidFill>
+            <a:schemeClr val="accent5">
+              <a:lumMod val="20000"/>
+              <a:lumOff val="80000"/>
+            </a:schemeClr>
+          </a:solidFill>
+        </p:spPr>
+        <p:txBody>
+          <a:bodyPr wrap="square" rtlCol="0">
+            <a:spAutoFit/>
+          </a:bodyPr>
+          <a:lstStyle/>
+          <a:p>
+            <a:pPr algn="ctr"/>
+            <a:r>
+              <a:rPr lang="en-US" sz="4800" dirty="0" smtClean="0"/>
+              <a:t>For the workaholic</a:t>
+            </a:r>
+            <a:endParaRPr lang="en-US" sz="2000" i="1" dirty="0">
+              <a:solidFill>
+                <a:srgbClr val="00B050"/>
+              </a:solidFill>
+            </a:endParaRPr>
+          </a:p>
+        </p:txBody>
+      </p:sp>
+    </p:spTree>
+  </p:cSld>
+  <p:clrMapOvr>
+    <a:masterClrMapping/>
+  </p:clrMapOvr>
+  <p:timing>
+    <p:tnLst>
+      <p:par>
+        <p:cTn id="1" dur="indefinite" restart="never" nodeType="tmRoot"/>
+      </p:par>
+    </p:tnLst>
+  </p:timing>
+</p:sld>
+</file>
+
+<file path=ppt/slides/slide37.xml><?xml version="1.0" encoding="utf-8"?>
+<p:sld xmlns:a="http://schemas.openxmlformats.org/drawingml/2006/main" xmlns:r="http://schemas.openxmlformats.org/officeDocument/2006/relationships" xmlns:p="http://schemas.openxmlformats.org/presentationml/2006/main">
+  <p:cSld>
+    <p:spTree>
+      <p:nvGrpSpPr>
+        <p:cNvPr id="1" name=""/>
+        <p:cNvGrpSpPr/>
+        <p:nvPr/>
+      </p:nvGrpSpPr>
+      <p:grpSpPr>
+        <a:xfrm>
+          <a:off x="0" y="0"/>
+          <a:ext cx="0" cy="0"/>
+          <a:chOff x="0" y="0"/>
+          <a:chExt cx="0" cy="0"/>
+        </a:xfrm>
+      </p:grpSpPr>
+      <p:sp>
+        <p:nvSpPr>
+          <p:cNvPr id="2" name="Title 1"/>
+          <p:cNvSpPr>
+            <a:spLocks noGrp="1"/>
+          </p:cNvSpPr>
+          <p:nvPr>
+            <p:ph type="ctrTitle"/>
+          </p:nvPr>
+        </p:nvSpPr>
+        <p:spPr>
+          <a:xfrm>
+            <a:off x="0" y="1"/>
+            <a:ext cx="9144000" cy="838199"/>
+          </a:xfrm>
+          <a:solidFill>
+            <a:schemeClr val="tx1">
+              <a:lumMod val="95000"/>
+              <a:lumOff val="5000"/>
+            </a:schemeClr>
+          </a:solidFill>
+        </p:spPr>
+        <p:txBody>
+          <a:bodyPr>
+            <a:normAutofit/>
+          </a:bodyPr>
+          <a:lstStyle/>
+          <a:p>
+            <a:r>
+              <a:rPr lang="en-US" sz="3600" b="1" dirty="0" smtClean="0">
+                <a:solidFill>
+                  <a:schemeClr val="accent5">
+                    <a:lumMod val="20000"/>
+                    <a:lumOff val="80000"/>
+                  </a:schemeClr>
+                </a:solidFill>
+              </a:rPr>
+              <a:t>Features Tour</a:t>
+            </a:r>
+            <a:endParaRPr lang="en-US" sz="3600" b="1" dirty="0">
+              <a:solidFill>
+                <a:schemeClr val="accent5">
+                  <a:lumMod val="20000"/>
+                  <a:lumOff val="80000"/>
+                </a:schemeClr>
+              </a:solidFill>
+            </a:endParaRPr>
+          </a:p>
+        </p:txBody>
+      </p:sp>
+      <p:sp>
+        <p:nvSpPr>
+          <p:cNvPr id="3" name="Subtitle 2"/>
+          <p:cNvSpPr>
+            <a:spLocks noGrp="1"/>
+          </p:cNvSpPr>
+          <p:nvPr>
+            <p:ph type="subTitle" idx="1"/>
+          </p:nvPr>
+        </p:nvSpPr>
+        <p:spPr>
+          <a:xfrm>
+            <a:off x="0" y="838200"/>
+            <a:ext cx="9144000" cy="609600"/>
+          </a:xfrm>
+          <a:solidFill>
+            <a:srgbClr val="FFFFCC"/>
+          </a:solidFill>
+        </p:spPr>
+        <p:txBody>
+          <a:bodyPr/>
+          <a:lstStyle/>
+          <a:p>
+            <a:r>
+              <a:rPr lang="en-US" b="1" dirty="0" smtClean="0">
+                <a:solidFill>
+                  <a:srgbClr val="00B050"/>
+                </a:solidFill>
+              </a:rPr>
+              <a:t>All Bugs</a:t>
+            </a:r>
+            <a:endParaRPr lang="en-US" b="1" dirty="0">
+              <a:solidFill>
+                <a:srgbClr val="00B050"/>
+              </a:solidFill>
+            </a:endParaRPr>
+          </a:p>
+        </p:txBody>
+      </p:sp>
+      <p:pic>
+        <p:nvPicPr>
+          <p:cNvPr id="5" name="Picture 4" descr="Screenshot-38.png"/>
+          <p:cNvPicPr>
+            <a:picLocks noChangeAspect="1"/>
+          </p:cNvPicPr>
+          <p:nvPr/>
+        </p:nvPicPr>
+        <p:blipFill>
+          <a:blip r:embed="rId2"/>
+          <a:stretch>
+            <a:fillRect/>
+          </a:stretch>
+        </p:blipFill>
+        <p:spPr>
+          <a:xfrm>
+            <a:off x="0" y="1447800"/>
+            <a:ext cx="9144000" cy="5357813"/>
+          </a:xfrm>
+          <a:prstGeom prst="rect">
+            <a:avLst/>
+          </a:prstGeom>
+        </p:spPr>
+      </p:pic>
+    </p:spTree>
+  </p:cSld>
+  <p:clrMapOvr>
+    <a:masterClrMapping/>
+  </p:clrMapOvr>
+  <p:timing>
+    <p:tnLst>
+      <p:par>
+        <p:cTn id="1" dur="indefinite" restart="never" nodeType="tmRoot"/>
+      </p:par>
+    </p:tnLst>
+  </p:timing>
+</p:sld>
+</file>
+
+<file path=ppt/slides/slide38.xml><?xml version="1.0" encoding="utf-8"?>
+<p:sld xmlns:a="http://schemas.openxmlformats.org/drawingml/2006/main" xmlns:r="http://schemas.openxmlformats.org/officeDocument/2006/relationships" xmlns:p="http://schemas.openxmlformats.org/presentationml/2006/main">
+  <p:cSld>
+    <p:spTree>
+      <p:nvGrpSpPr>
+        <p:cNvPr id="1" name=""/>
+        <p:cNvGrpSpPr/>
+        <p:nvPr/>
+      </p:nvGrpSpPr>
+      <p:grpSpPr>
+        <a:xfrm>
+          <a:off x="0" y="0"/>
+          <a:ext cx="0" cy="0"/>
+          <a:chOff x="0" y="0"/>
+          <a:chExt cx="0" cy="0"/>
+        </a:xfrm>
+      </p:grpSpPr>
+      <p:sp>
+        <p:nvSpPr>
+          <p:cNvPr id="2" name="Title 1"/>
+          <p:cNvSpPr>
+            <a:spLocks noGrp="1"/>
+          </p:cNvSpPr>
+          <p:nvPr>
+            <p:ph type="ctrTitle"/>
+          </p:nvPr>
+        </p:nvSpPr>
+        <p:spPr>
+          <a:xfrm>
+            <a:off x="0" y="1"/>
+            <a:ext cx="9144000" cy="838199"/>
+          </a:xfrm>
+          <a:solidFill>
+            <a:schemeClr val="tx1">
+              <a:lumMod val="95000"/>
+              <a:lumOff val="5000"/>
+            </a:schemeClr>
+          </a:solidFill>
+        </p:spPr>
+        <p:txBody>
+          <a:bodyPr>
+            <a:normAutofit/>
+          </a:bodyPr>
+          <a:lstStyle/>
+          <a:p>
+            <a:r>
+              <a:rPr lang="en-US" sz="3600" b="1" dirty="0" smtClean="0">
+                <a:solidFill>
+                  <a:schemeClr val="accent5">
+                    <a:lumMod val="20000"/>
+                    <a:lumOff val="80000"/>
+                  </a:schemeClr>
+                </a:solidFill>
+              </a:rPr>
+              <a:t>Features Tour</a:t>
+            </a:r>
+            <a:endParaRPr lang="en-US" sz="3600" b="1" dirty="0">
+              <a:solidFill>
+                <a:schemeClr val="accent5">
+                  <a:lumMod val="20000"/>
+                  <a:lumOff val="80000"/>
+                </a:schemeClr>
+              </a:solidFill>
+            </a:endParaRPr>
+          </a:p>
+        </p:txBody>
+      </p:sp>
+      <p:sp>
+        <p:nvSpPr>
+          <p:cNvPr id="3" name="Subtitle 2"/>
+          <p:cNvSpPr>
+            <a:spLocks noGrp="1"/>
+          </p:cNvSpPr>
+          <p:nvPr>
+            <p:ph type="subTitle" idx="1"/>
+          </p:nvPr>
+        </p:nvSpPr>
+        <p:spPr>
+          <a:xfrm>
+            <a:off x="0" y="838200"/>
+            <a:ext cx="9144000" cy="609600"/>
+          </a:xfrm>
+          <a:solidFill>
+            <a:srgbClr val="FFFFCC"/>
+          </a:solidFill>
+        </p:spPr>
+        <p:txBody>
+          <a:bodyPr/>
+          <a:lstStyle/>
+          <a:p>
+            <a:r>
+              <a:rPr lang="en-US" b="1" dirty="0" smtClean="0">
+                <a:solidFill>
+                  <a:srgbClr val="00B050"/>
+                </a:solidFill>
+              </a:rPr>
+              <a:t>Projects</a:t>
+            </a:r>
+            <a:endParaRPr lang="en-US" b="1" dirty="0">
+              <a:solidFill>
+                <a:srgbClr val="00B050"/>
+              </a:solidFill>
+            </a:endParaRPr>
+          </a:p>
+        </p:txBody>
+      </p:sp>
+      <p:sp>
+        <p:nvSpPr>
+          <p:cNvPr id="7" name="TextBox 6"/>
+          <p:cNvSpPr txBox="1"/>
+          <p:nvPr/>
+        </p:nvSpPr>
+        <p:spPr>
+          <a:xfrm>
+            <a:off x="457200" y="1887141"/>
+            <a:ext cx="8229600" cy="2308324"/>
+          </a:xfrm>
+          <a:prstGeom prst="rect">
+            <a:avLst/>
+          </a:prstGeom>
+          <a:solidFill>
+            <a:schemeClr val="accent5">
+              <a:lumMod val="20000"/>
+              <a:lumOff val="80000"/>
+            </a:schemeClr>
+          </a:solidFill>
+        </p:spPr>
+        <p:txBody>
+          <a:bodyPr wrap="square" rtlCol="0">
+            <a:spAutoFit/>
+          </a:bodyPr>
+          <a:lstStyle/>
+          <a:p>
+            <a:pPr algn="ctr"/>
+            <a:r>
+              <a:rPr lang="en-US" sz="4800" dirty="0" smtClean="0"/>
+              <a:t>When people ask you </a:t>
+            </a:r>
+          </a:p>
+          <a:p>
+            <a:pPr algn="ctr"/>
+            <a:r>
+              <a:rPr lang="en-US" sz="4800" dirty="0" smtClean="0"/>
+              <a:t>“Hey Joe, so what are you working on?”</a:t>
+            </a:r>
+            <a:endParaRPr lang="en-US" sz="2000" i="1" dirty="0">
+              <a:solidFill>
+                <a:srgbClr val="00B050"/>
+              </a:solidFill>
+            </a:endParaRPr>
+          </a:p>
+        </p:txBody>
+      </p:sp>
+    </p:spTree>
+  </p:cSld>
+  <p:clrMapOvr>
+    <a:masterClrMapping/>
+  </p:clrMapOvr>
+  <p:timing>
+    <p:tnLst>
+      <p:par>
+        <p:cTn id="1" dur="indefinite" restart="never" nodeType="tmRoot"/>
+      </p:par>
+    </p:tnLst>
+  </p:timing>
+</p:sld>
+</file>
+
+<file path=ppt/slides/slide39.xml><?xml version="1.0" encoding="utf-8"?>
+<p:sld xmlns:a="http://schemas.openxmlformats.org/drawingml/2006/main" xmlns:r="http://schemas.openxmlformats.org/officeDocument/2006/relationships" xmlns:p="http://schemas.openxmlformats.org/presentationml/2006/main">
+  <p:cSld>
+    <p:spTree>
+      <p:nvGrpSpPr>
+        <p:cNvPr id="1" name=""/>
+        <p:cNvGrpSpPr/>
+        <p:nvPr/>
+      </p:nvGrpSpPr>
+      <p:grpSpPr>
+        <a:xfrm>
+          <a:off x="0" y="0"/>
+          <a:ext cx="0" cy="0"/>
+          <a:chOff x="0" y="0"/>
+          <a:chExt cx="0" cy="0"/>
+        </a:xfrm>
+      </p:grpSpPr>
+      <p:sp>
+        <p:nvSpPr>
+          <p:cNvPr id="2" name="Title 1"/>
+          <p:cNvSpPr>
+            <a:spLocks noGrp="1"/>
+          </p:cNvSpPr>
+          <p:nvPr>
+            <p:ph type="ctrTitle"/>
+          </p:nvPr>
+        </p:nvSpPr>
+        <p:spPr>
+          <a:xfrm>
+            <a:off x="0" y="1"/>
+            <a:ext cx="9144000" cy="838199"/>
+          </a:xfrm>
+          <a:solidFill>
+            <a:schemeClr val="tx1">
+              <a:lumMod val="95000"/>
+              <a:lumOff val="5000"/>
+            </a:schemeClr>
+          </a:solidFill>
+        </p:spPr>
+        <p:txBody>
+          <a:bodyPr>
+            <a:normAutofit/>
+          </a:bodyPr>
+          <a:lstStyle/>
+          <a:p>
+            <a:r>
+              <a:rPr lang="en-US" sz="3600" b="1" dirty="0" smtClean="0">
+                <a:solidFill>
+                  <a:schemeClr val="accent5">
+                    <a:lumMod val="20000"/>
+                    <a:lumOff val="80000"/>
+                  </a:schemeClr>
+                </a:solidFill>
+              </a:rPr>
+              <a:t>Features Tour</a:t>
+            </a:r>
+            <a:endParaRPr lang="en-US" sz="3600" b="1" dirty="0">
+              <a:solidFill>
+                <a:schemeClr val="accent5">
+                  <a:lumMod val="20000"/>
+                  <a:lumOff val="80000"/>
+                </a:schemeClr>
+              </a:solidFill>
+            </a:endParaRPr>
+          </a:p>
+        </p:txBody>
+      </p:sp>
+      <p:sp>
+        <p:nvSpPr>
+          <p:cNvPr id="3" name="Subtitle 2"/>
+          <p:cNvSpPr>
+            <a:spLocks noGrp="1"/>
+          </p:cNvSpPr>
+          <p:nvPr>
+            <p:ph type="subTitle" idx="1"/>
+          </p:nvPr>
+        </p:nvSpPr>
+        <p:spPr>
+          <a:xfrm>
+            <a:off x="0" y="838200"/>
+            <a:ext cx="9144000" cy="609600"/>
+          </a:xfrm>
+          <a:solidFill>
+            <a:srgbClr val="FFFFCC"/>
+          </a:solidFill>
+        </p:spPr>
+        <p:txBody>
+          <a:bodyPr/>
+          <a:lstStyle/>
+          <a:p>
+            <a:r>
+              <a:rPr lang="en-US" b="1" dirty="0" smtClean="0">
+                <a:solidFill>
+                  <a:srgbClr val="00B050"/>
+                </a:solidFill>
+              </a:rPr>
+              <a:t>Projects</a:t>
+            </a:r>
+            <a:endParaRPr lang="en-US" b="1" dirty="0">
+              <a:solidFill>
+                <a:srgbClr val="00B050"/>
+              </a:solidFill>
+            </a:endParaRPr>
+          </a:p>
+        </p:txBody>
+      </p:sp>
+      <p:pic>
+        <p:nvPicPr>
+          <p:cNvPr id="6" name="Picture 5" descr="Screenshot-39.png"/>
+          <p:cNvPicPr>
+            <a:picLocks noChangeAspect="1"/>
+          </p:cNvPicPr>
+          <p:nvPr/>
+        </p:nvPicPr>
+        <p:blipFill>
+          <a:blip r:embed="rId2"/>
+          <a:stretch>
+            <a:fillRect/>
+          </a:stretch>
+        </p:blipFill>
+        <p:spPr>
+          <a:xfrm>
+            <a:off x="0" y="1447800"/>
+            <a:ext cx="9144000" cy="5357813"/>
+          </a:xfrm>
+          <a:prstGeom prst="rect">
+            <a:avLst/>
+          </a:prstGeom>
+        </p:spPr>
+      </p:pic>
     </p:spTree>
   </p:cSld>
   <p:clrMapOvr>
@@ -9718,6 +10260,1918 @@
 </p:sld>
 </file>
 
+<file path=ppt/slides/slide40.xml><?xml version="1.0" encoding="utf-8"?>
+<p:sld xmlns:a="http://schemas.openxmlformats.org/drawingml/2006/main" xmlns:r="http://schemas.openxmlformats.org/officeDocument/2006/relationships" xmlns:p="http://schemas.openxmlformats.org/presentationml/2006/main">
+  <p:cSld>
+    <p:spTree>
+      <p:nvGrpSpPr>
+        <p:cNvPr id="1" name=""/>
+        <p:cNvGrpSpPr/>
+        <p:nvPr/>
+      </p:nvGrpSpPr>
+      <p:grpSpPr>
+        <a:xfrm>
+          <a:off x="0" y="0"/>
+          <a:ext cx="0" cy="0"/>
+          <a:chOff x="0" y="0"/>
+          <a:chExt cx="0" cy="0"/>
+        </a:xfrm>
+      </p:grpSpPr>
+      <p:sp>
+        <p:nvSpPr>
+          <p:cNvPr id="2" name="Title 1"/>
+          <p:cNvSpPr>
+            <a:spLocks noGrp="1"/>
+          </p:cNvSpPr>
+          <p:nvPr>
+            <p:ph type="ctrTitle"/>
+          </p:nvPr>
+        </p:nvSpPr>
+        <p:spPr>
+          <a:xfrm>
+            <a:off x="0" y="1"/>
+            <a:ext cx="9144000" cy="838199"/>
+          </a:xfrm>
+          <a:solidFill>
+            <a:schemeClr val="tx1">
+              <a:lumMod val="95000"/>
+              <a:lumOff val="5000"/>
+            </a:schemeClr>
+          </a:solidFill>
+        </p:spPr>
+        <p:txBody>
+          <a:bodyPr>
+            <a:normAutofit/>
+          </a:bodyPr>
+          <a:lstStyle/>
+          <a:p>
+            <a:r>
+              <a:rPr lang="en-US" sz="3600" b="1" dirty="0" smtClean="0">
+                <a:solidFill>
+                  <a:schemeClr val="accent5">
+                    <a:lumMod val="20000"/>
+                    <a:lumOff val="80000"/>
+                  </a:schemeClr>
+                </a:solidFill>
+              </a:rPr>
+              <a:t>Features Tour</a:t>
+            </a:r>
+            <a:endParaRPr lang="en-US" sz="3600" b="1" dirty="0">
+              <a:solidFill>
+                <a:schemeClr val="accent5">
+                  <a:lumMod val="20000"/>
+                  <a:lumOff val="80000"/>
+                </a:schemeClr>
+              </a:solidFill>
+            </a:endParaRPr>
+          </a:p>
+        </p:txBody>
+      </p:sp>
+      <p:sp>
+        <p:nvSpPr>
+          <p:cNvPr id="3" name="Subtitle 2"/>
+          <p:cNvSpPr>
+            <a:spLocks noGrp="1"/>
+          </p:cNvSpPr>
+          <p:nvPr>
+            <p:ph type="subTitle" idx="1"/>
+          </p:nvPr>
+        </p:nvSpPr>
+        <p:spPr>
+          <a:xfrm>
+            <a:off x="0" y="838200"/>
+            <a:ext cx="9144000" cy="609600"/>
+          </a:xfrm>
+          <a:solidFill>
+            <a:srgbClr val="FFFFCC"/>
+          </a:solidFill>
+        </p:spPr>
+        <p:txBody>
+          <a:bodyPr/>
+          <a:lstStyle/>
+          <a:p>
+            <a:r>
+              <a:rPr lang="en-US" b="1" dirty="0" smtClean="0">
+                <a:solidFill>
+                  <a:srgbClr val="00B050"/>
+                </a:solidFill>
+              </a:rPr>
+              <a:t>Report New Bug</a:t>
+            </a:r>
+            <a:endParaRPr lang="en-US" b="1" dirty="0">
+              <a:solidFill>
+                <a:srgbClr val="00B050"/>
+              </a:solidFill>
+            </a:endParaRPr>
+          </a:p>
+        </p:txBody>
+      </p:sp>
+      <p:sp>
+        <p:nvSpPr>
+          <p:cNvPr id="4" name="TextBox 3"/>
+          <p:cNvSpPr txBox="1"/>
+          <p:nvPr/>
+        </p:nvSpPr>
+        <p:spPr>
+          <a:xfrm>
+            <a:off x="457200" y="1887141"/>
+            <a:ext cx="8229600" cy="830997"/>
+          </a:xfrm>
+          <a:prstGeom prst="rect">
+            <a:avLst/>
+          </a:prstGeom>
+          <a:solidFill>
+            <a:schemeClr val="accent5">
+              <a:lumMod val="20000"/>
+              <a:lumOff val="80000"/>
+            </a:schemeClr>
+          </a:solidFill>
+        </p:spPr>
+        <p:txBody>
+          <a:bodyPr wrap="square" rtlCol="0">
+            <a:spAutoFit/>
+          </a:bodyPr>
+          <a:lstStyle/>
+          <a:p>
+            <a:pPr algn="ctr"/>
+            <a:r>
+              <a:rPr lang="en-US" sz="4800" dirty="0" smtClean="0"/>
+              <a:t>Honey, I got a problem!</a:t>
+            </a:r>
+            <a:endParaRPr lang="en-US" sz="2000" i="1" dirty="0">
+              <a:solidFill>
+                <a:srgbClr val="00B050"/>
+              </a:solidFill>
+            </a:endParaRPr>
+          </a:p>
+        </p:txBody>
+      </p:sp>
+    </p:spTree>
+  </p:cSld>
+  <p:clrMapOvr>
+    <a:masterClrMapping/>
+  </p:clrMapOvr>
+  <p:timing>
+    <p:tnLst>
+      <p:par>
+        <p:cTn id="1" dur="indefinite" restart="never" nodeType="tmRoot"/>
+      </p:par>
+    </p:tnLst>
+  </p:timing>
+</p:sld>
+</file>
+
+<file path=ppt/slides/slide41.xml><?xml version="1.0" encoding="utf-8"?>
+<p:sld xmlns:a="http://schemas.openxmlformats.org/drawingml/2006/main" xmlns:r="http://schemas.openxmlformats.org/officeDocument/2006/relationships" xmlns:p="http://schemas.openxmlformats.org/presentationml/2006/main">
+  <p:cSld>
+    <p:spTree>
+      <p:nvGrpSpPr>
+        <p:cNvPr id="1" name=""/>
+        <p:cNvGrpSpPr/>
+        <p:nvPr/>
+      </p:nvGrpSpPr>
+      <p:grpSpPr>
+        <a:xfrm>
+          <a:off x="0" y="0"/>
+          <a:ext cx="0" cy="0"/>
+          <a:chOff x="0" y="0"/>
+          <a:chExt cx="0" cy="0"/>
+        </a:xfrm>
+      </p:grpSpPr>
+      <p:sp>
+        <p:nvSpPr>
+          <p:cNvPr id="2" name="Title 1"/>
+          <p:cNvSpPr>
+            <a:spLocks noGrp="1"/>
+          </p:cNvSpPr>
+          <p:nvPr>
+            <p:ph type="ctrTitle"/>
+          </p:nvPr>
+        </p:nvSpPr>
+        <p:spPr>
+          <a:xfrm>
+            <a:off x="0" y="1"/>
+            <a:ext cx="9144000" cy="838199"/>
+          </a:xfrm>
+          <a:solidFill>
+            <a:schemeClr val="tx1">
+              <a:lumMod val="95000"/>
+              <a:lumOff val="5000"/>
+            </a:schemeClr>
+          </a:solidFill>
+        </p:spPr>
+        <p:txBody>
+          <a:bodyPr>
+            <a:normAutofit/>
+          </a:bodyPr>
+          <a:lstStyle/>
+          <a:p>
+            <a:r>
+              <a:rPr lang="en-US" sz="3600" b="1" dirty="0" smtClean="0">
+                <a:solidFill>
+                  <a:schemeClr val="accent5">
+                    <a:lumMod val="20000"/>
+                    <a:lumOff val="80000"/>
+                  </a:schemeClr>
+                </a:solidFill>
+              </a:rPr>
+              <a:t>Features Tour</a:t>
+            </a:r>
+            <a:endParaRPr lang="en-US" sz="3600" b="1" dirty="0">
+              <a:solidFill>
+                <a:schemeClr val="accent5">
+                  <a:lumMod val="20000"/>
+                  <a:lumOff val="80000"/>
+                </a:schemeClr>
+              </a:solidFill>
+            </a:endParaRPr>
+          </a:p>
+        </p:txBody>
+      </p:sp>
+      <p:sp>
+        <p:nvSpPr>
+          <p:cNvPr id="3" name="Subtitle 2"/>
+          <p:cNvSpPr>
+            <a:spLocks noGrp="1"/>
+          </p:cNvSpPr>
+          <p:nvPr>
+            <p:ph type="subTitle" idx="1"/>
+          </p:nvPr>
+        </p:nvSpPr>
+        <p:spPr>
+          <a:xfrm>
+            <a:off x="0" y="838200"/>
+            <a:ext cx="9144000" cy="609600"/>
+          </a:xfrm>
+          <a:solidFill>
+            <a:srgbClr val="FFFFCC"/>
+          </a:solidFill>
+        </p:spPr>
+        <p:txBody>
+          <a:bodyPr/>
+          <a:lstStyle/>
+          <a:p>
+            <a:r>
+              <a:rPr lang="en-US" b="1" dirty="0" smtClean="0">
+                <a:solidFill>
+                  <a:srgbClr val="00B050"/>
+                </a:solidFill>
+              </a:rPr>
+              <a:t>Report New Bug</a:t>
+            </a:r>
+            <a:endParaRPr lang="en-US" b="1" dirty="0">
+              <a:solidFill>
+                <a:srgbClr val="00B050"/>
+              </a:solidFill>
+            </a:endParaRPr>
+          </a:p>
+        </p:txBody>
+      </p:sp>
+      <p:pic>
+        <p:nvPicPr>
+          <p:cNvPr id="4" name="Picture 3" descr="Screenshot-40.png"/>
+          <p:cNvPicPr>
+            <a:picLocks noChangeAspect="1"/>
+          </p:cNvPicPr>
+          <p:nvPr/>
+        </p:nvPicPr>
+        <p:blipFill>
+          <a:blip r:embed="rId2"/>
+          <a:stretch>
+            <a:fillRect/>
+          </a:stretch>
+        </p:blipFill>
+        <p:spPr>
+          <a:xfrm>
+            <a:off x="0" y="1447800"/>
+            <a:ext cx="9144000" cy="5357813"/>
+          </a:xfrm>
+          <a:prstGeom prst="rect">
+            <a:avLst/>
+          </a:prstGeom>
+        </p:spPr>
+      </p:pic>
+    </p:spTree>
+  </p:cSld>
+  <p:clrMapOvr>
+    <a:masterClrMapping/>
+  </p:clrMapOvr>
+  <p:timing>
+    <p:tnLst>
+      <p:par>
+        <p:cTn id="1" dur="indefinite" restart="never" nodeType="tmRoot"/>
+      </p:par>
+    </p:tnLst>
+  </p:timing>
+</p:sld>
+</file>
+
+<file path=ppt/slides/slide42.xml><?xml version="1.0" encoding="utf-8"?>
+<p:sld xmlns:a="http://schemas.openxmlformats.org/drawingml/2006/main" xmlns:r="http://schemas.openxmlformats.org/officeDocument/2006/relationships" xmlns:p="http://schemas.openxmlformats.org/presentationml/2006/main">
+  <p:cSld>
+    <p:spTree>
+      <p:nvGrpSpPr>
+        <p:cNvPr id="1" name=""/>
+        <p:cNvGrpSpPr/>
+        <p:nvPr/>
+      </p:nvGrpSpPr>
+      <p:grpSpPr>
+        <a:xfrm>
+          <a:off x="0" y="0"/>
+          <a:ext cx="0" cy="0"/>
+          <a:chOff x="0" y="0"/>
+          <a:chExt cx="0" cy="0"/>
+        </a:xfrm>
+      </p:grpSpPr>
+      <p:sp>
+        <p:nvSpPr>
+          <p:cNvPr id="2" name="Title 1"/>
+          <p:cNvSpPr>
+            <a:spLocks noGrp="1"/>
+          </p:cNvSpPr>
+          <p:nvPr>
+            <p:ph type="ctrTitle"/>
+          </p:nvPr>
+        </p:nvSpPr>
+        <p:spPr>
+          <a:xfrm>
+            <a:off x="0" y="1"/>
+            <a:ext cx="9144000" cy="838199"/>
+          </a:xfrm>
+          <a:solidFill>
+            <a:schemeClr val="tx1">
+              <a:lumMod val="95000"/>
+              <a:lumOff val="5000"/>
+            </a:schemeClr>
+          </a:solidFill>
+        </p:spPr>
+        <p:txBody>
+          <a:bodyPr>
+            <a:normAutofit/>
+          </a:bodyPr>
+          <a:lstStyle/>
+          <a:p>
+            <a:r>
+              <a:rPr lang="en-US" sz="3600" b="1" dirty="0" smtClean="0">
+                <a:solidFill>
+                  <a:schemeClr val="accent5">
+                    <a:lumMod val="20000"/>
+                    <a:lumOff val="80000"/>
+                  </a:schemeClr>
+                </a:solidFill>
+              </a:rPr>
+              <a:t>Features Tour</a:t>
+            </a:r>
+            <a:endParaRPr lang="en-US" sz="3600" b="1" dirty="0">
+              <a:solidFill>
+                <a:schemeClr val="accent5">
+                  <a:lumMod val="20000"/>
+                  <a:lumOff val="80000"/>
+                </a:schemeClr>
+              </a:solidFill>
+            </a:endParaRPr>
+          </a:p>
+        </p:txBody>
+      </p:sp>
+      <p:sp>
+        <p:nvSpPr>
+          <p:cNvPr id="3" name="Subtitle 2"/>
+          <p:cNvSpPr>
+            <a:spLocks noGrp="1"/>
+          </p:cNvSpPr>
+          <p:nvPr>
+            <p:ph type="subTitle" idx="1"/>
+          </p:nvPr>
+        </p:nvSpPr>
+        <p:spPr>
+          <a:xfrm>
+            <a:off x="0" y="838200"/>
+            <a:ext cx="9144000" cy="609600"/>
+          </a:xfrm>
+          <a:solidFill>
+            <a:srgbClr val="FFFFCC"/>
+          </a:solidFill>
+        </p:spPr>
+        <p:txBody>
+          <a:bodyPr/>
+          <a:lstStyle/>
+          <a:p>
+            <a:r>
+              <a:rPr lang="en-US" b="1" dirty="0" smtClean="0">
+                <a:solidFill>
+                  <a:srgbClr val="00B050"/>
+                </a:solidFill>
+              </a:rPr>
+              <a:t>The Bug Page</a:t>
+            </a:r>
+            <a:endParaRPr lang="en-US" b="1" dirty="0">
+              <a:solidFill>
+                <a:srgbClr val="00B050"/>
+              </a:solidFill>
+            </a:endParaRPr>
+          </a:p>
+        </p:txBody>
+      </p:sp>
+      <p:sp>
+        <p:nvSpPr>
+          <p:cNvPr id="5" name="TextBox 4"/>
+          <p:cNvSpPr txBox="1"/>
+          <p:nvPr/>
+        </p:nvSpPr>
+        <p:spPr>
+          <a:xfrm>
+            <a:off x="457200" y="1887141"/>
+            <a:ext cx="8229600" cy="830997"/>
+          </a:xfrm>
+          <a:prstGeom prst="rect">
+            <a:avLst/>
+          </a:prstGeom>
+          <a:solidFill>
+            <a:schemeClr val="accent5">
+              <a:lumMod val="20000"/>
+              <a:lumOff val="80000"/>
+            </a:schemeClr>
+          </a:solidFill>
+        </p:spPr>
+        <p:txBody>
+          <a:bodyPr wrap="square" rtlCol="0">
+            <a:spAutoFit/>
+          </a:bodyPr>
+          <a:lstStyle/>
+          <a:p>
+            <a:pPr algn="ctr"/>
+            <a:r>
+              <a:rPr lang="en-US" sz="4800" dirty="0" smtClean="0"/>
+              <a:t>the Pandora’s Box?</a:t>
+            </a:r>
+            <a:endParaRPr lang="en-US" sz="2000" i="1" dirty="0">
+              <a:solidFill>
+                <a:srgbClr val="00B050"/>
+              </a:solidFill>
+            </a:endParaRPr>
+          </a:p>
+        </p:txBody>
+      </p:sp>
+    </p:spTree>
+  </p:cSld>
+  <p:clrMapOvr>
+    <a:masterClrMapping/>
+  </p:clrMapOvr>
+  <p:timing>
+    <p:tnLst>
+      <p:par>
+        <p:cTn id="1" dur="indefinite" restart="never" nodeType="tmRoot"/>
+      </p:par>
+    </p:tnLst>
+  </p:timing>
+</p:sld>
+</file>
+
+<file path=ppt/slides/slide43.xml><?xml version="1.0" encoding="utf-8"?>
+<p:sld xmlns:a="http://schemas.openxmlformats.org/drawingml/2006/main" xmlns:r="http://schemas.openxmlformats.org/officeDocument/2006/relationships" xmlns:p="http://schemas.openxmlformats.org/presentationml/2006/main">
+  <p:cSld>
+    <p:spTree>
+      <p:nvGrpSpPr>
+        <p:cNvPr id="1" name=""/>
+        <p:cNvGrpSpPr/>
+        <p:nvPr/>
+      </p:nvGrpSpPr>
+      <p:grpSpPr>
+        <a:xfrm>
+          <a:off x="0" y="0"/>
+          <a:ext cx="0" cy="0"/>
+          <a:chOff x="0" y="0"/>
+          <a:chExt cx="0" cy="0"/>
+        </a:xfrm>
+      </p:grpSpPr>
+      <p:sp>
+        <p:nvSpPr>
+          <p:cNvPr id="2" name="Title 1"/>
+          <p:cNvSpPr>
+            <a:spLocks noGrp="1"/>
+          </p:cNvSpPr>
+          <p:nvPr>
+            <p:ph type="ctrTitle"/>
+          </p:nvPr>
+        </p:nvSpPr>
+        <p:spPr>
+          <a:xfrm>
+            <a:off x="0" y="1"/>
+            <a:ext cx="9144000" cy="838199"/>
+          </a:xfrm>
+          <a:solidFill>
+            <a:schemeClr val="tx1">
+              <a:lumMod val="95000"/>
+              <a:lumOff val="5000"/>
+            </a:schemeClr>
+          </a:solidFill>
+        </p:spPr>
+        <p:txBody>
+          <a:bodyPr>
+            <a:normAutofit/>
+          </a:bodyPr>
+          <a:lstStyle/>
+          <a:p>
+            <a:r>
+              <a:rPr lang="en-US" sz="3600" b="1" dirty="0" smtClean="0">
+                <a:solidFill>
+                  <a:schemeClr val="accent5">
+                    <a:lumMod val="20000"/>
+                    <a:lumOff val="80000"/>
+                  </a:schemeClr>
+                </a:solidFill>
+              </a:rPr>
+              <a:t>Features Tour</a:t>
+            </a:r>
+            <a:endParaRPr lang="en-US" sz="3600" b="1" dirty="0">
+              <a:solidFill>
+                <a:schemeClr val="accent5">
+                  <a:lumMod val="20000"/>
+                  <a:lumOff val="80000"/>
+                </a:schemeClr>
+              </a:solidFill>
+            </a:endParaRPr>
+          </a:p>
+        </p:txBody>
+      </p:sp>
+      <p:pic>
+        <p:nvPicPr>
+          <p:cNvPr id="7" name="Picture 6" descr="snapshot-41.png"/>
+          <p:cNvPicPr>
+            <a:picLocks noChangeAspect="1"/>
+          </p:cNvPicPr>
+          <p:nvPr/>
+        </p:nvPicPr>
+        <p:blipFill>
+          <a:blip r:embed="rId2"/>
+          <a:stretch>
+            <a:fillRect/>
+          </a:stretch>
+        </p:blipFill>
+        <p:spPr>
+          <a:xfrm>
+            <a:off x="762000" y="701207"/>
+            <a:ext cx="7680694" cy="6546477"/>
+          </a:xfrm>
+          <a:prstGeom prst="rect">
+            <a:avLst/>
+          </a:prstGeom>
+        </p:spPr>
+      </p:pic>
+    </p:spTree>
+  </p:cSld>
+  <p:clrMapOvr>
+    <a:masterClrMapping/>
+  </p:clrMapOvr>
+  <p:timing>
+    <p:tnLst>
+      <p:par>
+        <p:cTn id="1" dur="indefinite" restart="never" nodeType="tmRoot"/>
+      </p:par>
+    </p:tnLst>
+  </p:timing>
+</p:sld>
+</file>
+
+<file path=ppt/slides/slide44.xml><?xml version="1.0" encoding="utf-8"?>
+<p:sld xmlns:a="http://schemas.openxmlformats.org/drawingml/2006/main" xmlns:r="http://schemas.openxmlformats.org/officeDocument/2006/relationships" xmlns:p="http://schemas.openxmlformats.org/presentationml/2006/main">
+  <p:cSld>
+    <p:spTree>
+      <p:nvGrpSpPr>
+        <p:cNvPr id="1" name=""/>
+        <p:cNvGrpSpPr/>
+        <p:nvPr/>
+      </p:nvGrpSpPr>
+      <p:grpSpPr>
+        <a:xfrm>
+          <a:off x="0" y="0"/>
+          <a:ext cx="0" cy="0"/>
+          <a:chOff x="0" y="0"/>
+          <a:chExt cx="0" cy="0"/>
+        </a:xfrm>
+      </p:grpSpPr>
+      <p:sp>
+        <p:nvSpPr>
+          <p:cNvPr id="2" name="Title 1"/>
+          <p:cNvSpPr>
+            <a:spLocks noGrp="1"/>
+          </p:cNvSpPr>
+          <p:nvPr>
+            <p:ph type="ctrTitle"/>
+          </p:nvPr>
+        </p:nvSpPr>
+        <p:spPr>
+          <a:xfrm>
+            <a:off x="0" y="1"/>
+            <a:ext cx="9144000" cy="838199"/>
+          </a:xfrm>
+          <a:solidFill>
+            <a:schemeClr val="tx1">
+              <a:lumMod val="95000"/>
+              <a:lumOff val="5000"/>
+            </a:schemeClr>
+          </a:solidFill>
+        </p:spPr>
+        <p:txBody>
+          <a:bodyPr>
+            <a:normAutofit/>
+          </a:bodyPr>
+          <a:lstStyle/>
+          <a:p>
+            <a:r>
+              <a:rPr lang="en-US" sz="3600" b="1" dirty="0" smtClean="0">
+                <a:solidFill>
+                  <a:schemeClr val="accent5">
+                    <a:lumMod val="20000"/>
+                    <a:lumOff val="80000"/>
+                  </a:schemeClr>
+                </a:solidFill>
+              </a:rPr>
+              <a:t>Features Tour</a:t>
+            </a:r>
+            <a:endParaRPr lang="en-US" sz="3600" b="1" dirty="0">
+              <a:solidFill>
+                <a:schemeClr val="accent5">
+                  <a:lumMod val="20000"/>
+                  <a:lumOff val="80000"/>
+                </a:schemeClr>
+              </a:solidFill>
+            </a:endParaRPr>
+          </a:p>
+        </p:txBody>
+      </p:sp>
+      <p:pic>
+        <p:nvPicPr>
+          <p:cNvPr id="7" name="Picture 6" descr="snapshot-41.png"/>
+          <p:cNvPicPr>
+            <a:picLocks noChangeAspect="1"/>
+          </p:cNvPicPr>
+          <p:nvPr/>
+        </p:nvPicPr>
+        <p:blipFill>
+          <a:blip r:embed="rId2"/>
+          <a:stretch>
+            <a:fillRect/>
+          </a:stretch>
+        </p:blipFill>
+        <p:spPr>
+          <a:xfrm>
+            <a:off x="762000" y="701207"/>
+            <a:ext cx="7680694" cy="6546477"/>
+          </a:xfrm>
+          <a:prstGeom prst="rect">
+            <a:avLst/>
+          </a:prstGeom>
+        </p:spPr>
+      </p:pic>
+      <p:sp>
+        <p:nvSpPr>
+          <p:cNvPr id="4" name="Rectangular Callout 3"/>
+          <p:cNvSpPr/>
+          <p:nvPr/>
+        </p:nvSpPr>
+        <p:spPr>
+          <a:xfrm>
+            <a:off x="3886200" y="1447800"/>
+            <a:ext cx="1828800" cy="533400"/>
+          </a:xfrm>
+          <a:prstGeom prst="wedgeRectCallout">
+            <a:avLst/>
+          </a:prstGeom>
+          <a:solidFill>
+            <a:schemeClr val="bg1"/>
+          </a:solidFill>
+          <a:ln>
+            <a:solidFill>
+              <a:schemeClr val="tx1"/>
+            </a:solidFill>
+          </a:ln>
+          <a:effectLst>
+            <a:outerShdw blurRad="50800" dist="38100" dir="13500000" algn="br" rotWithShape="0">
+              <a:prstClr val="black">
+                <a:alpha val="40000"/>
+              </a:prstClr>
+            </a:outerShdw>
+          </a:effectLst>
+          <a:scene3d>
+            <a:camera prst="perspectiveHeroicExtremeRightFacing"/>
+            <a:lightRig rig="threePt" dir="t"/>
+          </a:scene3d>
+        </p:spPr>
+        <p:style>
+          <a:lnRef idx="2">
+            <a:schemeClr val="dk1"/>
+          </a:lnRef>
+          <a:fillRef idx="1">
+            <a:schemeClr val="lt1"/>
+          </a:fillRef>
+          <a:effectRef idx="0">
+            <a:schemeClr val="dk1"/>
+          </a:effectRef>
+          <a:fontRef idx="minor">
+            <a:schemeClr val="dk1"/>
+          </a:fontRef>
+        </p:style>
+        <p:txBody>
+          <a:bodyPr rtlCol="0" anchor="ctr"/>
+          <a:lstStyle/>
+          <a:p>
+            <a:pPr algn="ctr"/>
+            <a:r>
+              <a:rPr lang="en-US" dirty="0" smtClean="0"/>
+              <a:t>The mistake</a:t>
+            </a:r>
+            <a:endParaRPr lang="en-US" dirty="0"/>
+          </a:p>
+        </p:txBody>
+      </p:sp>
+      <p:sp>
+        <p:nvSpPr>
+          <p:cNvPr id="5" name="Rectangular Callout 4"/>
+          <p:cNvSpPr/>
+          <p:nvPr/>
+        </p:nvSpPr>
+        <p:spPr>
+          <a:xfrm>
+            <a:off x="1676400" y="1828800"/>
+            <a:ext cx="1828800" cy="533400"/>
+          </a:xfrm>
+          <a:prstGeom prst="wedgeRectCallout">
+            <a:avLst/>
+          </a:prstGeom>
+          <a:solidFill>
+            <a:schemeClr val="bg1"/>
+          </a:solidFill>
+          <a:ln>
+            <a:solidFill>
+              <a:schemeClr val="tx1"/>
+            </a:solidFill>
+          </a:ln>
+          <a:effectLst>
+            <a:outerShdw blurRad="50800" dist="38100" dir="13500000" algn="br" rotWithShape="0">
+              <a:prstClr val="black">
+                <a:alpha val="40000"/>
+              </a:prstClr>
+            </a:outerShdw>
+          </a:effectLst>
+          <a:scene3d>
+            <a:camera prst="perspectiveHeroicExtremeRightFacing"/>
+            <a:lightRig rig="threePt" dir="t"/>
+          </a:scene3d>
+        </p:spPr>
+        <p:style>
+          <a:lnRef idx="2">
+            <a:schemeClr val="dk1"/>
+          </a:lnRef>
+          <a:fillRef idx="1">
+            <a:schemeClr val="lt1"/>
+          </a:fillRef>
+          <a:effectRef idx="0">
+            <a:schemeClr val="dk1"/>
+          </a:effectRef>
+          <a:fontRef idx="minor">
+            <a:schemeClr val="dk1"/>
+          </a:fontRef>
+        </p:style>
+        <p:txBody>
+          <a:bodyPr rtlCol="0" anchor="ctr"/>
+          <a:lstStyle/>
+          <a:p>
+            <a:pPr algn="ctr"/>
+            <a:r>
+              <a:rPr lang="en-US" dirty="0" smtClean="0"/>
+              <a:t>The culprit</a:t>
+            </a:r>
+          </a:p>
+        </p:txBody>
+      </p:sp>
+      <p:sp>
+        <p:nvSpPr>
+          <p:cNvPr id="6" name="Rectangular Callout 5"/>
+          <p:cNvSpPr/>
+          <p:nvPr/>
+        </p:nvSpPr>
+        <p:spPr>
+          <a:xfrm>
+            <a:off x="3886200" y="2590800"/>
+            <a:ext cx="2133600" cy="685800"/>
+          </a:xfrm>
+          <a:prstGeom prst="wedgeRectCallout">
+            <a:avLst/>
+          </a:prstGeom>
+          <a:solidFill>
+            <a:schemeClr val="bg1"/>
+          </a:solidFill>
+          <a:ln>
+            <a:solidFill>
+              <a:schemeClr val="tx1"/>
+            </a:solidFill>
+          </a:ln>
+          <a:effectLst>
+            <a:outerShdw blurRad="50800" dist="38100" dir="13500000" algn="br" rotWithShape="0">
+              <a:prstClr val="black">
+                <a:alpha val="40000"/>
+              </a:prstClr>
+            </a:outerShdw>
+          </a:effectLst>
+          <a:scene3d>
+            <a:camera prst="perspectiveHeroicExtremeRightFacing"/>
+            <a:lightRig rig="threePt" dir="t"/>
+          </a:scene3d>
+        </p:spPr>
+        <p:style>
+          <a:lnRef idx="2">
+            <a:schemeClr val="dk1"/>
+          </a:lnRef>
+          <a:fillRef idx="1">
+            <a:schemeClr val="lt1"/>
+          </a:fillRef>
+          <a:effectRef idx="0">
+            <a:schemeClr val="dk1"/>
+          </a:effectRef>
+          <a:fontRef idx="minor">
+            <a:schemeClr val="dk1"/>
+          </a:fontRef>
+        </p:style>
+        <p:txBody>
+          <a:bodyPr rtlCol="0" anchor="ctr"/>
+          <a:lstStyle/>
+          <a:p>
+            <a:pPr algn="ctr"/>
+            <a:r>
+              <a:rPr lang="en-US" dirty="0" smtClean="0"/>
+              <a:t>The glorious past</a:t>
+            </a:r>
+          </a:p>
+        </p:txBody>
+      </p:sp>
+      <p:sp>
+        <p:nvSpPr>
+          <p:cNvPr id="8" name="Rectangular Callout 7"/>
+          <p:cNvSpPr/>
+          <p:nvPr/>
+        </p:nvSpPr>
+        <p:spPr>
+          <a:xfrm>
+            <a:off x="3581400" y="4038600"/>
+            <a:ext cx="2819400" cy="914400"/>
+          </a:xfrm>
+          <a:prstGeom prst="wedgeRectCallout">
+            <a:avLst/>
+          </a:prstGeom>
+          <a:solidFill>
+            <a:schemeClr val="bg1"/>
+          </a:solidFill>
+          <a:ln>
+            <a:solidFill>
+              <a:schemeClr val="tx1"/>
+            </a:solidFill>
+          </a:ln>
+          <a:effectLst>
+            <a:outerShdw blurRad="50800" dist="38100" dir="13500000" algn="br" rotWithShape="0">
+              <a:prstClr val="black">
+                <a:alpha val="40000"/>
+              </a:prstClr>
+            </a:outerShdw>
+          </a:effectLst>
+          <a:scene3d>
+            <a:camera prst="perspectiveHeroicExtremeRightFacing"/>
+            <a:lightRig rig="threePt" dir="t"/>
+          </a:scene3d>
+        </p:spPr>
+        <p:style>
+          <a:lnRef idx="2">
+            <a:schemeClr val="dk1"/>
+          </a:lnRef>
+          <a:fillRef idx="1">
+            <a:schemeClr val="lt1"/>
+          </a:fillRef>
+          <a:effectRef idx="0">
+            <a:schemeClr val="dk1"/>
+          </a:effectRef>
+          <a:fontRef idx="minor">
+            <a:schemeClr val="dk1"/>
+          </a:fontRef>
+        </p:style>
+        <p:txBody>
+          <a:bodyPr rtlCol="0" anchor="ctr"/>
+          <a:lstStyle/>
+          <a:p>
+            <a:pPr algn="ctr"/>
+            <a:r>
+              <a:rPr lang="en-US" dirty="0" smtClean="0"/>
+              <a:t>Yes you too can join the movement</a:t>
+            </a:r>
+          </a:p>
+        </p:txBody>
+      </p:sp>
+    </p:spTree>
+  </p:cSld>
+  <p:clrMapOvr>
+    <a:masterClrMapping/>
+  </p:clrMapOvr>
+  <p:timing>
+    <p:tnLst>
+      <p:par>
+        <p:cTn id="1" dur="indefinite" restart="never" nodeType="tmRoot"/>
+      </p:par>
+    </p:tnLst>
+  </p:timing>
+</p:sld>
+</file>
+
+<file path=ppt/slides/slide45.xml><?xml version="1.0" encoding="utf-8"?>
+<p:sld xmlns:a="http://schemas.openxmlformats.org/drawingml/2006/main" xmlns:r="http://schemas.openxmlformats.org/officeDocument/2006/relationships" xmlns:p="http://schemas.openxmlformats.org/presentationml/2006/main">
+  <p:cSld>
+    <p:spTree>
+      <p:nvGrpSpPr>
+        <p:cNvPr id="1" name=""/>
+        <p:cNvGrpSpPr/>
+        <p:nvPr/>
+      </p:nvGrpSpPr>
+      <p:grpSpPr>
+        <a:xfrm>
+          <a:off x="0" y="0"/>
+          <a:ext cx="0" cy="0"/>
+          <a:chOff x="0" y="0"/>
+          <a:chExt cx="0" cy="0"/>
+        </a:xfrm>
+      </p:grpSpPr>
+      <p:sp>
+        <p:nvSpPr>
+          <p:cNvPr id="2" name="Title 1"/>
+          <p:cNvSpPr>
+            <a:spLocks noGrp="1"/>
+          </p:cNvSpPr>
+          <p:nvPr>
+            <p:ph type="ctrTitle"/>
+          </p:nvPr>
+        </p:nvSpPr>
+        <p:spPr>
+          <a:xfrm>
+            <a:off x="0" y="1"/>
+            <a:ext cx="9144000" cy="838199"/>
+          </a:xfrm>
+          <a:solidFill>
+            <a:schemeClr val="tx1">
+              <a:lumMod val="95000"/>
+              <a:lumOff val="5000"/>
+            </a:schemeClr>
+          </a:solidFill>
+        </p:spPr>
+        <p:txBody>
+          <a:bodyPr>
+            <a:normAutofit/>
+          </a:bodyPr>
+          <a:lstStyle/>
+          <a:p>
+            <a:r>
+              <a:rPr lang="en-US" sz="3600" b="1" dirty="0" smtClean="0">
+                <a:solidFill>
+                  <a:schemeClr val="accent5">
+                    <a:lumMod val="20000"/>
+                    <a:lumOff val="80000"/>
+                  </a:schemeClr>
+                </a:solidFill>
+              </a:rPr>
+              <a:t>Features Tour</a:t>
+            </a:r>
+            <a:endParaRPr lang="en-US" sz="3600" b="1" dirty="0">
+              <a:solidFill>
+                <a:schemeClr val="accent5">
+                  <a:lumMod val="20000"/>
+                  <a:lumOff val="80000"/>
+                </a:schemeClr>
+              </a:solidFill>
+            </a:endParaRPr>
+          </a:p>
+        </p:txBody>
+      </p:sp>
+      <p:sp>
+        <p:nvSpPr>
+          <p:cNvPr id="3" name="Subtitle 2"/>
+          <p:cNvSpPr>
+            <a:spLocks noGrp="1"/>
+          </p:cNvSpPr>
+          <p:nvPr>
+            <p:ph type="subTitle" idx="1"/>
+          </p:nvPr>
+        </p:nvSpPr>
+        <p:spPr>
+          <a:xfrm>
+            <a:off x="0" y="838200"/>
+            <a:ext cx="9144000" cy="609600"/>
+          </a:xfrm>
+          <a:solidFill>
+            <a:srgbClr val="FFFFCC"/>
+          </a:solidFill>
+        </p:spPr>
+        <p:txBody>
+          <a:bodyPr/>
+          <a:lstStyle/>
+          <a:p>
+            <a:r>
+              <a:rPr lang="en-US" b="1" dirty="0" smtClean="0">
+                <a:solidFill>
+                  <a:srgbClr val="00B050"/>
+                </a:solidFill>
+              </a:rPr>
+              <a:t>Administration</a:t>
+            </a:r>
+            <a:endParaRPr lang="en-US" b="1" dirty="0">
+              <a:solidFill>
+                <a:srgbClr val="00B050"/>
+              </a:solidFill>
+            </a:endParaRPr>
+          </a:p>
+        </p:txBody>
+      </p:sp>
+      <p:sp>
+        <p:nvSpPr>
+          <p:cNvPr id="5" name="TextBox 4"/>
+          <p:cNvSpPr txBox="1"/>
+          <p:nvPr/>
+        </p:nvSpPr>
+        <p:spPr>
+          <a:xfrm>
+            <a:off x="457200" y="1887141"/>
+            <a:ext cx="8229600" cy="1569660"/>
+          </a:xfrm>
+          <a:prstGeom prst="rect">
+            <a:avLst/>
+          </a:prstGeom>
+          <a:solidFill>
+            <a:schemeClr val="accent5">
+              <a:lumMod val="20000"/>
+              <a:lumOff val="80000"/>
+            </a:schemeClr>
+          </a:solidFill>
+        </p:spPr>
+        <p:txBody>
+          <a:bodyPr wrap="square" rtlCol="0">
+            <a:spAutoFit/>
+          </a:bodyPr>
+          <a:lstStyle/>
+          <a:p>
+            <a:pPr algn="ctr"/>
+            <a:r>
+              <a:rPr lang="en-US" sz="4800" dirty="0" smtClean="0"/>
+              <a:t>Wait </a:t>
+            </a:r>
+            <a:r>
+              <a:rPr lang="en-US" sz="4800" dirty="0" err="1" smtClean="0"/>
+              <a:t>wait</a:t>
+            </a:r>
+            <a:r>
+              <a:rPr lang="en-US" sz="4800" dirty="0" smtClean="0"/>
+              <a:t>… then who manages all this ?</a:t>
+            </a:r>
+            <a:endParaRPr lang="en-US" sz="2000" i="1" dirty="0">
+              <a:solidFill>
+                <a:srgbClr val="00B050"/>
+              </a:solidFill>
+            </a:endParaRPr>
+          </a:p>
+        </p:txBody>
+      </p:sp>
+    </p:spTree>
+  </p:cSld>
+  <p:clrMapOvr>
+    <a:masterClrMapping/>
+  </p:clrMapOvr>
+  <p:timing>
+    <p:tnLst>
+      <p:par>
+        <p:cTn id="1" dur="indefinite" restart="never" nodeType="tmRoot"/>
+      </p:par>
+    </p:tnLst>
+  </p:timing>
+</p:sld>
+</file>
+
+<file path=ppt/slides/slide46.xml><?xml version="1.0" encoding="utf-8"?>
+<p:sld xmlns:a="http://schemas.openxmlformats.org/drawingml/2006/main" xmlns:r="http://schemas.openxmlformats.org/officeDocument/2006/relationships" xmlns:p="http://schemas.openxmlformats.org/presentationml/2006/main">
+  <p:cSld>
+    <p:spTree>
+      <p:nvGrpSpPr>
+        <p:cNvPr id="1" name=""/>
+        <p:cNvGrpSpPr/>
+        <p:nvPr/>
+      </p:nvGrpSpPr>
+      <p:grpSpPr>
+        <a:xfrm>
+          <a:off x="0" y="0"/>
+          <a:ext cx="0" cy="0"/>
+          <a:chOff x="0" y="0"/>
+          <a:chExt cx="0" cy="0"/>
+        </a:xfrm>
+      </p:grpSpPr>
+      <p:sp>
+        <p:nvSpPr>
+          <p:cNvPr id="2" name="Title 1"/>
+          <p:cNvSpPr>
+            <a:spLocks noGrp="1"/>
+          </p:cNvSpPr>
+          <p:nvPr>
+            <p:ph type="ctrTitle"/>
+          </p:nvPr>
+        </p:nvSpPr>
+        <p:spPr>
+          <a:xfrm>
+            <a:off x="0" y="1"/>
+            <a:ext cx="9144000" cy="838199"/>
+          </a:xfrm>
+          <a:solidFill>
+            <a:schemeClr val="tx1">
+              <a:lumMod val="95000"/>
+              <a:lumOff val="5000"/>
+            </a:schemeClr>
+          </a:solidFill>
+        </p:spPr>
+        <p:txBody>
+          <a:bodyPr>
+            <a:normAutofit/>
+          </a:bodyPr>
+          <a:lstStyle/>
+          <a:p>
+            <a:r>
+              <a:rPr lang="en-US" sz="3600" b="1" dirty="0" smtClean="0">
+                <a:solidFill>
+                  <a:schemeClr val="accent5">
+                    <a:lumMod val="20000"/>
+                    <a:lumOff val="80000"/>
+                  </a:schemeClr>
+                </a:solidFill>
+              </a:rPr>
+              <a:t>Features Tour</a:t>
+            </a:r>
+            <a:endParaRPr lang="en-US" sz="3600" b="1" dirty="0">
+              <a:solidFill>
+                <a:schemeClr val="accent5">
+                  <a:lumMod val="20000"/>
+                  <a:lumOff val="80000"/>
+                </a:schemeClr>
+              </a:solidFill>
+            </a:endParaRPr>
+          </a:p>
+        </p:txBody>
+      </p:sp>
+      <p:sp>
+        <p:nvSpPr>
+          <p:cNvPr id="3" name="Subtitle 2"/>
+          <p:cNvSpPr>
+            <a:spLocks noGrp="1"/>
+          </p:cNvSpPr>
+          <p:nvPr>
+            <p:ph type="subTitle" idx="1"/>
+          </p:nvPr>
+        </p:nvSpPr>
+        <p:spPr>
+          <a:xfrm>
+            <a:off x="0" y="838200"/>
+            <a:ext cx="9144000" cy="609600"/>
+          </a:xfrm>
+          <a:solidFill>
+            <a:srgbClr val="FFFFCC"/>
+          </a:solidFill>
+        </p:spPr>
+        <p:txBody>
+          <a:bodyPr/>
+          <a:lstStyle/>
+          <a:p>
+            <a:r>
+              <a:rPr lang="en-US" b="1" dirty="0" smtClean="0">
+                <a:solidFill>
+                  <a:srgbClr val="00B050"/>
+                </a:solidFill>
+              </a:rPr>
+              <a:t>Administration</a:t>
+            </a:r>
+            <a:endParaRPr lang="en-US" b="1" dirty="0">
+              <a:solidFill>
+                <a:srgbClr val="00B050"/>
+              </a:solidFill>
+            </a:endParaRPr>
+          </a:p>
+        </p:txBody>
+      </p:sp>
+      <p:pic>
+        <p:nvPicPr>
+          <p:cNvPr id="6" name="Picture 5" descr="Screenshot-41.png"/>
+          <p:cNvPicPr>
+            <a:picLocks noChangeAspect="1"/>
+          </p:cNvPicPr>
+          <p:nvPr/>
+        </p:nvPicPr>
+        <p:blipFill>
+          <a:blip r:embed="rId2"/>
+          <a:stretch>
+            <a:fillRect/>
+          </a:stretch>
+        </p:blipFill>
+        <p:spPr>
+          <a:xfrm>
+            <a:off x="0" y="1500187"/>
+            <a:ext cx="9144000" cy="5357813"/>
+          </a:xfrm>
+          <a:prstGeom prst="rect">
+            <a:avLst/>
+          </a:prstGeom>
+        </p:spPr>
+      </p:pic>
+      <p:sp>
+        <p:nvSpPr>
+          <p:cNvPr id="7" name="Rectangular Callout 6"/>
+          <p:cNvSpPr/>
+          <p:nvPr/>
+        </p:nvSpPr>
+        <p:spPr>
+          <a:xfrm>
+            <a:off x="6019800" y="990600"/>
+            <a:ext cx="2133600" cy="685800"/>
+          </a:xfrm>
+          <a:prstGeom prst="wedgeRectCallout">
+            <a:avLst/>
+          </a:prstGeom>
+          <a:solidFill>
+            <a:schemeClr val="bg1"/>
+          </a:solidFill>
+          <a:ln>
+            <a:solidFill>
+              <a:schemeClr val="tx1"/>
+            </a:solidFill>
+          </a:ln>
+          <a:effectLst>
+            <a:outerShdw blurRad="50800" dist="38100" dir="13500000" algn="br" rotWithShape="0">
+              <a:prstClr val="black">
+                <a:alpha val="40000"/>
+              </a:prstClr>
+            </a:outerShdw>
+          </a:effectLst>
+          <a:scene3d>
+            <a:camera prst="perspectiveHeroicExtremeRightFacing"/>
+            <a:lightRig rig="threePt" dir="t"/>
+          </a:scene3d>
+        </p:spPr>
+        <p:style>
+          <a:lnRef idx="2">
+            <a:schemeClr val="dk1"/>
+          </a:lnRef>
+          <a:fillRef idx="1">
+            <a:schemeClr val="lt1"/>
+          </a:fillRef>
+          <a:effectRef idx="0">
+            <a:schemeClr val="dk1"/>
+          </a:effectRef>
+          <a:fontRef idx="minor">
+            <a:schemeClr val="dk1"/>
+          </a:fontRef>
+        </p:style>
+        <p:txBody>
+          <a:bodyPr rtlCol="0" anchor="ctr"/>
+          <a:lstStyle/>
+          <a:p>
+            <a:pPr algn="ctr"/>
+            <a:r>
+              <a:rPr lang="en-US" dirty="0" smtClean="0"/>
+              <a:t>Command and Control</a:t>
+            </a:r>
+          </a:p>
+        </p:txBody>
+      </p:sp>
+    </p:spTree>
+  </p:cSld>
+  <p:clrMapOvr>
+    <a:masterClrMapping/>
+  </p:clrMapOvr>
+  <p:timing>
+    <p:tnLst>
+      <p:par>
+        <p:cTn id="1" dur="indefinite" restart="never" nodeType="tmRoot"/>
+      </p:par>
+    </p:tnLst>
+  </p:timing>
+</p:sld>
+</file>
+
+<file path=ppt/slides/slide47.xml><?xml version="1.0" encoding="utf-8"?>
+<p:sld xmlns:a="http://schemas.openxmlformats.org/drawingml/2006/main" xmlns:r="http://schemas.openxmlformats.org/officeDocument/2006/relationships" xmlns:p="http://schemas.openxmlformats.org/presentationml/2006/main">
+  <p:cSld>
+    <p:spTree>
+      <p:nvGrpSpPr>
+        <p:cNvPr id="1" name=""/>
+        <p:cNvGrpSpPr/>
+        <p:nvPr/>
+      </p:nvGrpSpPr>
+      <p:grpSpPr>
+        <a:xfrm>
+          <a:off x="0" y="0"/>
+          <a:ext cx="0" cy="0"/>
+          <a:chOff x="0" y="0"/>
+          <a:chExt cx="0" cy="0"/>
+        </a:xfrm>
+      </p:grpSpPr>
+      <p:sp>
+        <p:nvSpPr>
+          <p:cNvPr id="2" name="Title 1"/>
+          <p:cNvSpPr>
+            <a:spLocks noGrp="1"/>
+          </p:cNvSpPr>
+          <p:nvPr>
+            <p:ph type="ctrTitle"/>
+          </p:nvPr>
+        </p:nvSpPr>
+        <p:spPr>
+          <a:xfrm>
+            <a:off x="0" y="1"/>
+            <a:ext cx="9144000" cy="838199"/>
+          </a:xfrm>
+          <a:solidFill>
+            <a:schemeClr val="tx1">
+              <a:lumMod val="95000"/>
+              <a:lumOff val="5000"/>
+            </a:schemeClr>
+          </a:solidFill>
+        </p:spPr>
+        <p:txBody>
+          <a:bodyPr>
+            <a:normAutofit/>
+          </a:bodyPr>
+          <a:lstStyle/>
+          <a:p>
+            <a:r>
+              <a:rPr lang="en-US" sz="3600" b="1" dirty="0" smtClean="0">
+                <a:solidFill>
+                  <a:schemeClr val="accent5">
+                    <a:lumMod val="20000"/>
+                    <a:lumOff val="80000"/>
+                  </a:schemeClr>
+                </a:solidFill>
+              </a:rPr>
+              <a:t>Features Tour</a:t>
+            </a:r>
+            <a:endParaRPr lang="en-US" sz="3600" b="1" dirty="0">
+              <a:solidFill>
+                <a:schemeClr val="accent5">
+                  <a:lumMod val="20000"/>
+                  <a:lumOff val="80000"/>
+                </a:schemeClr>
+              </a:solidFill>
+            </a:endParaRPr>
+          </a:p>
+        </p:txBody>
+      </p:sp>
+      <p:pic>
+        <p:nvPicPr>
+          <p:cNvPr id="5" name="Picture 4" descr="download"/>
+          <p:cNvPicPr>
+            <a:picLocks noChangeAspect="1"/>
+          </p:cNvPicPr>
+          <p:nvPr/>
+        </p:nvPicPr>
+        <p:blipFill>
+          <a:blip r:embed="rId2"/>
+          <a:stretch>
+            <a:fillRect/>
+          </a:stretch>
+        </p:blipFill>
+        <p:spPr>
+          <a:xfrm>
+            <a:off x="812098" y="990600"/>
+            <a:ext cx="7646102" cy="6858000"/>
+          </a:xfrm>
+          <a:prstGeom prst="rect">
+            <a:avLst/>
+          </a:prstGeom>
+        </p:spPr>
+      </p:pic>
+      <p:sp>
+        <p:nvSpPr>
+          <p:cNvPr id="3" name="Subtitle 2"/>
+          <p:cNvSpPr>
+            <a:spLocks noGrp="1"/>
+          </p:cNvSpPr>
+          <p:nvPr>
+            <p:ph type="subTitle" idx="1"/>
+          </p:nvPr>
+        </p:nvSpPr>
+        <p:spPr>
+          <a:xfrm>
+            <a:off x="0" y="838200"/>
+            <a:ext cx="9144000" cy="609600"/>
+          </a:xfrm>
+          <a:solidFill>
+            <a:srgbClr val="FFFFCC"/>
+          </a:solidFill>
+        </p:spPr>
+        <p:txBody>
+          <a:bodyPr/>
+          <a:lstStyle/>
+          <a:p>
+            <a:r>
+              <a:rPr lang="en-US" b="1" dirty="0" smtClean="0">
+                <a:solidFill>
+                  <a:srgbClr val="00B050"/>
+                </a:solidFill>
+              </a:rPr>
+              <a:t>Administration</a:t>
+            </a:r>
+            <a:endParaRPr lang="en-US" b="1" dirty="0">
+              <a:solidFill>
+                <a:srgbClr val="00B050"/>
+              </a:solidFill>
+            </a:endParaRPr>
+          </a:p>
+        </p:txBody>
+      </p:sp>
+    </p:spTree>
+  </p:cSld>
+  <p:clrMapOvr>
+    <a:masterClrMapping/>
+  </p:clrMapOvr>
+  <p:timing>
+    <p:tnLst>
+      <p:par>
+        <p:cTn id="1" dur="indefinite" restart="never" nodeType="tmRoot"/>
+      </p:par>
+    </p:tnLst>
+  </p:timing>
+</p:sld>
+</file>
+
+<file path=ppt/slides/slide48.xml><?xml version="1.0" encoding="utf-8"?>
+<p:sld xmlns:a="http://schemas.openxmlformats.org/drawingml/2006/main" xmlns:r="http://schemas.openxmlformats.org/officeDocument/2006/relationships" xmlns:p="http://schemas.openxmlformats.org/presentationml/2006/main">
+  <p:cSld>
+    <p:spTree>
+      <p:nvGrpSpPr>
+        <p:cNvPr id="1" name=""/>
+        <p:cNvGrpSpPr/>
+        <p:nvPr/>
+      </p:nvGrpSpPr>
+      <p:grpSpPr>
+        <a:xfrm>
+          <a:off x="0" y="0"/>
+          <a:ext cx="0" cy="0"/>
+          <a:chOff x="0" y="0"/>
+          <a:chExt cx="0" cy="0"/>
+        </a:xfrm>
+      </p:grpSpPr>
+      <p:sp>
+        <p:nvSpPr>
+          <p:cNvPr id="2" name="Title 1"/>
+          <p:cNvSpPr>
+            <a:spLocks noGrp="1"/>
+          </p:cNvSpPr>
+          <p:nvPr>
+            <p:ph type="ctrTitle"/>
+          </p:nvPr>
+        </p:nvSpPr>
+        <p:spPr>
+          <a:xfrm>
+            <a:off x="0" y="1"/>
+            <a:ext cx="9144000" cy="838199"/>
+          </a:xfrm>
+          <a:solidFill>
+            <a:schemeClr val="tx1">
+              <a:lumMod val="95000"/>
+              <a:lumOff val="5000"/>
+            </a:schemeClr>
+          </a:solidFill>
+        </p:spPr>
+        <p:txBody>
+          <a:bodyPr>
+            <a:normAutofit/>
+          </a:bodyPr>
+          <a:lstStyle/>
+          <a:p>
+            <a:r>
+              <a:rPr lang="en-US" sz="3600" b="1" dirty="0" smtClean="0">
+                <a:solidFill>
+                  <a:schemeClr val="accent5">
+                    <a:lumMod val="20000"/>
+                    <a:lumOff val="80000"/>
+                  </a:schemeClr>
+                </a:solidFill>
+              </a:rPr>
+              <a:t>Features Tour</a:t>
+            </a:r>
+            <a:endParaRPr lang="en-US" sz="3600" b="1" dirty="0">
+              <a:solidFill>
+                <a:schemeClr val="accent5">
+                  <a:lumMod val="20000"/>
+                  <a:lumOff val="80000"/>
+                </a:schemeClr>
+              </a:solidFill>
+            </a:endParaRPr>
+          </a:p>
+        </p:txBody>
+      </p:sp>
+      <p:pic>
+        <p:nvPicPr>
+          <p:cNvPr id="5" name="Picture 4" descr="download"/>
+          <p:cNvPicPr>
+            <a:picLocks noChangeAspect="1"/>
+          </p:cNvPicPr>
+          <p:nvPr/>
+        </p:nvPicPr>
+        <p:blipFill>
+          <a:blip r:embed="rId2"/>
+          <a:stretch>
+            <a:fillRect/>
+          </a:stretch>
+        </p:blipFill>
+        <p:spPr>
+          <a:xfrm>
+            <a:off x="812098" y="990600"/>
+            <a:ext cx="7646102" cy="6858000"/>
+          </a:xfrm>
+          <a:prstGeom prst="rect">
+            <a:avLst/>
+          </a:prstGeom>
+        </p:spPr>
+      </p:pic>
+      <p:sp>
+        <p:nvSpPr>
+          <p:cNvPr id="3" name="Subtitle 2"/>
+          <p:cNvSpPr>
+            <a:spLocks noGrp="1"/>
+          </p:cNvSpPr>
+          <p:nvPr>
+            <p:ph type="subTitle" idx="1"/>
+          </p:nvPr>
+        </p:nvSpPr>
+        <p:spPr>
+          <a:xfrm>
+            <a:off x="0" y="838200"/>
+            <a:ext cx="9144000" cy="609600"/>
+          </a:xfrm>
+          <a:solidFill>
+            <a:srgbClr val="FFFFCC"/>
+          </a:solidFill>
+        </p:spPr>
+        <p:txBody>
+          <a:bodyPr/>
+          <a:lstStyle/>
+          <a:p>
+            <a:r>
+              <a:rPr lang="en-US" b="1" dirty="0" smtClean="0">
+                <a:solidFill>
+                  <a:srgbClr val="00B050"/>
+                </a:solidFill>
+              </a:rPr>
+              <a:t>Administration</a:t>
+            </a:r>
+            <a:endParaRPr lang="en-US" b="1" dirty="0">
+              <a:solidFill>
+                <a:srgbClr val="00B050"/>
+              </a:solidFill>
+            </a:endParaRPr>
+          </a:p>
+        </p:txBody>
+      </p:sp>
+      <p:sp>
+        <p:nvSpPr>
+          <p:cNvPr id="7" name="Rectangular Callout 6"/>
+          <p:cNvSpPr/>
+          <p:nvPr/>
+        </p:nvSpPr>
+        <p:spPr>
+          <a:xfrm>
+            <a:off x="3200400" y="3048000"/>
+            <a:ext cx="2133600" cy="685800"/>
+          </a:xfrm>
+          <a:prstGeom prst="wedgeRectCallout">
+            <a:avLst/>
+          </a:prstGeom>
+          <a:solidFill>
+            <a:schemeClr val="bg1"/>
+          </a:solidFill>
+          <a:ln>
+            <a:solidFill>
+              <a:schemeClr val="tx1"/>
+            </a:solidFill>
+          </a:ln>
+          <a:effectLst>
+            <a:outerShdw blurRad="50800" dist="38100" dir="13500000" algn="br" rotWithShape="0">
+              <a:prstClr val="black">
+                <a:alpha val="40000"/>
+              </a:prstClr>
+            </a:outerShdw>
+          </a:effectLst>
+          <a:scene3d>
+            <a:camera prst="perspectiveHeroicExtremeRightFacing"/>
+            <a:lightRig rig="threePt" dir="t"/>
+          </a:scene3d>
+        </p:spPr>
+        <p:style>
+          <a:lnRef idx="2">
+            <a:schemeClr val="dk1"/>
+          </a:lnRef>
+          <a:fillRef idx="1">
+            <a:schemeClr val="lt1"/>
+          </a:fillRef>
+          <a:effectRef idx="0">
+            <a:schemeClr val="dk1"/>
+          </a:effectRef>
+          <a:fontRef idx="minor">
+            <a:schemeClr val="dk1"/>
+          </a:fontRef>
+        </p:style>
+        <p:txBody>
+          <a:bodyPr rtlCol="0" anchor="ctr"/>
+          <a:lstStyle/>
+          <a:p>
+            <a:pPr algn="ctr"/>
+            <a:r>
+              <a:rPr lang="en-US" dirty="0" err="1" smtClean="0"/>
+              <a:t>iCreate</a:t>
+            </a:r>
+            <a:endParaRPr lang="en-US" dirty="0" smtClean="0"/>
+          </a:p>
+        </p:txBody>
+      </p:sp>
+    </p:spTree>
+  </p:cSld>
+  <p:clrMapOvr>
+    <a:masterClrMapping/>
+  </p:clrMapOvr>
+  <p:timing>
+    <p:tnLst>
+      <p:par>
+        <p:cTn id="1" dur="indefinite" restart="never" nodeType="tmRoot"/>
+      </p:par>
+    </p:tnLst>
+  </p:timing>
+</p:sld>
+</file>
+
+<file path=ppt/slides/slide49.xml><?xml version="1.0" encoding="utf-8"?>
+<p:sld xmlns:a="http://schemas.openxmlformats.org/drawingml/2006/main" xmlns:r="http://schemas.openxmlformats.org/officeDocument/2006/relationships" xmlns:p="http://schemas.openxmlformats.org/presentationml/2006/main">
+  <p:cSld>
+    <p:spTree>
+      <p:nvGrpSpPr>
+        <p:cNvPr id="1" name=""/>
+        <p:cNvGrpSpPr/>
+        <p:nvPr/>
+      </p:nvGrpSpPr>
+      <p:grpSpPr>
+        <a:xfrm>
+          <a:off x="0" y="0"/>
+          <a:ext cx="0" cy="0"/>
+          <a:chOff x="0" y="0"/>
+          <a:chExt cx="0" cy="0"/>
+        </a:xfrm>
+      </p:grpSpPr>
+      <p:sp>
+        <p:nvSpPr>
+          <p:cNvPr id="2" name="Title 1"/>
+          <p:cNvSpPr>
+            <a:spLocks noGrp="1"/>
+          </p:cNvSpPr>
+          <p:nvPr>
+            <p:ph type="ctrTitle"/>
+          </p:nvPr>
+        </p:nvSpPr>
+        <p:spPr>
+          <a:xfrm>
+            <a:off x="0" y="1"/>
+            <a:ext cx="9144000" cy="838199"/>
+          </a:xfrm>
+          <a:solidFill>
+            <a:schemeClr val="tx1">
+              <a:lumMod val="95000"/>
+              <a:lumOff val="5000"/>
+            </a:schemeClr>
+          </a:solidFill>
+        </p:spPr>
+        <p:txBody>
+          <a:bodyPr>
+            <a:normAutofit/>
+          </a:bodyPr>
+          <a:lstStyle/>
+          <a:p>
+            <a:r>
+              <a:rPr lang="en-US" sz="3600" b="1" dirty="0" smtClean="0">
+                <a:solidFill>
+                  <a:schemeClr val="accent5">
+                    <a:lumMod val="20000"/>
+                    <a:lumOff val="80000"/>
+                  </a:schemeClr>
+                </a:solidFill>
+              </a:rPr>
+              <a:t>Features Tour</a:t>
+            </a:r>
+            <a:endParaRPr lang="en-US" sz="3600" b="1" dirty="0">
+              <a:solidFill>
+                <a:schemeClr val="accent5">
+                  <a:lumMod val="20000"/>
+                  <a:lumOff val="80000"/>
+                </a:schemeClr>
+              </a:solidFill>
+            </a:endParaRPr>
+          </a:p>
+        </p:txBody>
+      </p:sp>
+      <p:pic>
+        <p:nvPicPr>
+          <p:cNvPr id="5" name="Picture 4" descr="download"/>
+          <p:cNvPicPr>
+            <a:picLocks noChangeAspect="1"/>
+          </p:cNvPicPr>
+          <p:nvPr/>
+        </p:nvPicPr>
+        <p:blipFill>
+          <a:blip r:embed="rId2"/>
+          <a:stretch>
+            <a:fillRect/>
+          </a:stretch>
+        </p:blipFill>
+        <p:spPr>
+          <a:xfrm>
+            <a:off x="812098" y="990600"/>
+            <a:ext cx="7646102" cy="6858000"/>
+          </a:xfrm>
+          <a:prstGeom prst="rect">
+            <a:avLst/>
+          </a:prstGeom>
+        </p:spPr>
+      </p:pic>
+      <p:sp>
+        <p:nvSpPr>
+          <p:cNvPr id="3" name="Subtitle 2"/>
+          <p:cNvSpPr>
+            <a:spLocks noGrp="1"/>
+          </p:cNvSpPr>
+          <p:nvPr>
+            <p:ph type="subTitle" idx="1"/>
+          </p:nvPr>
+        </p:nvSpPr>
+        <p:spPr>
+          <a:xfrm>
+            <a:off x="0" y="838200"/>
+            <a:ext cx="9144000" cy="609600"/>
+          </a:xfrm>
+          <a:solidFill>
+            <a:srgbClr val="FFFFCC"/>
+          </a:solidFill>
+        </p:spPr>
+        <p:txBody>
+          <a:bodyPr/>
+          <a:lstStyle/>
+          <a:p>
+            <a:r>
+              <a:rPr lang="en-US" b="1" dirty="0" smtClean="0">
+                <a:solidFill>
+                  <a:srgbClr val="00B050"/>
+                </a:solidFill>
+              </a:rPr>
+              <a:t>Administration</a:t>
+            </a:r>
+            <a:endParaRPr lang="en-US" b="1" dirty="0">
+              <a:solidFill>
+                <a:srgbClr val="00B050"/>
+              </a:solidFill>
+            </a:endParaRPr>
+          </a:p>
+        </p:txBody>
+      </p:sp>
+      <p:sp>
+        <p:nvSpPr>
+          <p:cNvPr id="7" name="Rectangular Callout 6"/>
+          <p:cNvSpPr/>
+          <p:nvPr/>
+        </p:nvSpPr>
+        <p:spPr>
+          <a:xfrm>
+            <a:off x="3200400" y="3048000"/>
+            <a:ext cx="2133600" cy="685800"/>
+          </a:xfrm>
+          <a:prstGeom prst="wedgeRectCallout">
+            <a:avLst/>
+          </a:prstGeom>
+          <a:solidFill>
+            <a:schemeClr val="bg1"/>
+          </a:solidFill>
+          <a:ln>
+            <a:solidFill>
+              <a:schemeClr val="tx1"/>
+            </a:solidFill>
+          </a:ln>
+          <a:effectLst>
+            <a:outerShdw blurRad="50800" dist="38100" dir="13500000" algn="br" rotWithShape="0">
+              <a:prstClr val="black">
+                <a:alpha val="40000"/>
+              </a:prstClr>
+            </a:outerShdw>
+          </a:effectLst>
+          <a:scene3d>
+            <a:camera prst="perspectiveHeroicExtremeRightFacing"/>
+            <a:lightRig rig="threePt" dir="t"/>
+          </a:scene3d>
+        </p:spPr>
+        <p:style>
+          <a:lnRef idx="2">
+            <a:schemeClr val="dk1"/>
+          </a:lnRef>
+          <a:fillRef idx="1">
+            <a:schemeClr val="lt1"/>
+          </a:fillRef>
+          <a:effectRef idx="0">
+            <a:schemeClr val="dk1"/>
+          </a:effectRef>
+          <a:fontRef idx="minor">
+            <a:schemeClr val="dk1"/>
+          </a:fontRef>
+        </p:style>
+        <p:txBody>
+          <a:bodyPr rtlCol="0" anchor="ctr"/>
+          <a:lstStyle/>
+          <a:p>
+            <a:pPr algn="ctr"/>
+            <a:r>
+              <a:rPr lang="en-US" dirty="0" err="1" smtClean="0"/>
+              <a:t>iCreate</a:t>
+            </a:r>
+            <a:endParaRPr lang="en-US" dirty="0" smtClean="0"/>
+          </a:p>
+        </p:txBody>
+      </p:sp>
+      <p:sp>
+        <p:nvSpPr>
+          <p:cNvPr id="8" name="Rectangular Callout 7"/>
+          <p:cNvSpPr/>
+          <p:nvPr/>
+        </p:nvSpPr>
+        <p:spPr>
+          <a:xfrm>
+            <a:off x="7162800" y="3886200"/>
+            <a:ext cx="2133600" cy="685800"/>
+          </a:xfrm>
+          <a:prstGeom prst="wedgeRectCallout">
+            <a:avLst/>
+          </a:prstGeom>
+          <a:solidFill>
+            <a:schemeClr val="bg1"/>
+          </a:solidFill>
+          <a:ln>
+            <a:solidFill>
+              <a:schemeClr val="tx1"/>
+            </a:solidFill>
+          </a:ln>
+          <a:effectLst>
+            <a:outerShdw blurRad="50800" dist="38100" dir="13500000" algn="br" rotWithShape="0">
+              <a:prstClr val="black">
+                <a:alpha val="40000"/>
+              </a:prstClr>
+            </a:outerShdw>
+          </a:effectLst>
+          <a:scene3d>
+            <a:camera prst="perspectiveHeroicExtremeRightFacing"/>
+            <a:lightRig rig="threePt" dir="t"/>
+          </a:scene3d>
+        </p:spPr>
+        <p:style>
+          <a:lnRef idx="2">
+            <a:schemeClr val="dk1"/>
+          </a:lnRef>
+          <a:fillRef idx="1">
+            <a:schemeClr val="lt1"/>
+          </a:fillRef>
+          <a:effectRef idx="0">
+            <a:schemeClr val="dk1"/>
+          </a:effectRef>
+          <a:fontRef idx="minor">
+            <a:schemeClr val="dk1"/>
+          </a:fontRef>
+        </p:style>
+        <p:txBody>
+          <a:bodyPr rtlCol="0" anchor="ctr"/>
+          <a:lstStyle/>
+          <a:p>
+            <a:pPr algn="ctr"/>
+            <a:r>
+              <a:rPr lang="en-US" dirty="0" err="1" smtClean="0"/>
+              <a:t>iDestroy</a:t>
+            </a:r>
+            <a:endParaRPr lang="en-US" dirty="0" smtClean="0"/>
+          </a:p>
+        </p:txBody>
+      </p:sp>
+    </p:spTree>
+  </p:cSld>
+  <p:clrMapOvr>
+    <a:masterClrMapping/>
+  </p:clrMapOvr>
+  <p:timing>
+    <p:tnLst>
+      <p:par>
+        <p:cTn id="1" dur="indefinite" restart="never" nodeType="tmRoot"/>
+      </p:par>
+    </p:tnLst>
+  </p:timing>
+</p:sld>
+</file>
+
 <file path=ppt/slides/slide5.xml><?xml version="1.0" encoding="utf-8"?>
 <p:sld xmlns:a="http://schemas.openxmlformats.org/drawingml/2006/main" xmlns:r="http://schemas.openxmlformats.org/officeDocument/2006/relationships" xmlns:p="http://schemas.openxmlformats.org/presentationml/2006/main">
   <p:cSld>
@@ -9866,6 +12320,476 @@
                 <a:schemeClr val="tx2">
                   <a:lumMod val="75000"/>
                 </a:schemeClr>
+              </a:solidFill>
+            </a:endParaRPr>
+          </a:p>
+        </p:txBody>
+      </p:sp>
+    </p:spTree>
+  </p:cSld>
+  <p:clrMapOvr>
+    <a:masterClrMapping/>
+  </p:clrMapOvr>
+  <p:timing>
+    <p:tnLst>
+      <p:par>
+        <p:cTn id="1" dur="indefinite" restart="never" nodeType="tmRoot"/>
+      </p:par>
+    </p:tnLst>
+  </p:timing>
+</p:sld>
+</file>
+
+<file path=ppt/slides/slide50.xml><?xml version="1.0" encoding="utf-8"?>
+<p:sld xmlns:a="http://schemas.openxmlformats.org/drawingml/2006/main" xmlns:r="http://schemas.openxmlformats.org/officeDocument/2006/relationships" xmlns:p="http://schemas.openxmlformats.org/presentationml/2006/main">
+  <p:cSld>
+    <p:spTree>
+      <p:nvGrpSpPr>
+        <p:cNvPr id="1" name=""/>
+        <p:cNvGrpSpPr/>
+        <p:nvPr/>
+      </p:nvGrpSpPr>
+      <p:grpSpPr>
+        <a:xfrm>
+          <a:off x="0" y="0"/>
+          <a:ext cx="0" cy="0"/>
+          <a:chOff x="0" y="0"/>
+          <a:chExt cx="0" cy="0"/>
+        </a:xfrm>
+      </p:grpSpPr>
+      <p:sp>
+        <p:nvSpPr>
+          <p:cNvPr id="2" name="Title 1"/>
+          <p:cNvSpPr>
+            <a:spLocks noGrp="1"/>
+          </p:cNvSpPr>
+          <p:nvPr>
+            <p:ph type="ctrTitle"/>
+          </p:nvPr>
+        </p:nvSpPr>
+        <p:spPr>
+          <a:xfrm>
+            <a:off x="0" y="1"/>
+            <a:ext cx="9144000" cy="838199"/>
+          </a:xfrm>
+          <a:solidFill>
+            <a:schemeClr val="tx1">
+              <a:lumMod val="95000"/>
+              <a:lumOff val="5000"/>
+            </a:schemeClr>
+          </a:solidFill>
+        </p:spPr>
+        <p:txBody>
+          <a:bodyPr>
+            <a:normAutofit/>
+          </a:bodyPr>
+          <a:lstStyle/>
+          <a:p>
+            <a:r>
+              <a:rPr lang="en-US" sz="3600" b="1" dirty="0" smtClean="0">
+                <a:solidFill>
+                  <a:schemeClr val="accent5">
+                    <a:lumMod val="20000"/>
+                    <a:lumOff val="80000"/>
+                  </a:schemeClr>
+                </a:solidFill>
+              </a:rPr>
+              <a:t>Features Tour</a:t>
+            </a:r>
+            <a:endParaRPr lang="en-US" sz="3600" b="1" dirty="0">
+              <a:solidFill>
+                <a:schemeClr val="accent5">
+                  <a:lumMod val="20000"/>
+                  <a:lumOff val="80000"/>
+                </a:schemeClr>
+              </a:solidFill>
+            </a:endParaRPr>
+          </a:p>
+        </p:txBody>
+      </p:sp>
+      <p:pic>
+        <p:nvPicPr>
+          <p:cNvPr id="5" name="Picture 4" descr="download"/>
+          <p:cNvPicPr>
+            <a:picLocks noChangeAspect="1"/>
+          </p:cNvPicPr>
+          <p:nvPr/>
+        </p:nvPicPr>
+        <p:blipFill>
+          <a:blip r:embed="rId2"/>
+          <a:stretch>
+            <a:fillRect/>
+          </a:stretch>
+        </p:blipFill>
+        <p:spPr>
+          <a:xfrm>
+            <a:off x="812098" y="990600"/>
+            <a:ext cx="7646102" cy="6858000"/>
+          </a:xfrm>
+          <a:prstGeom prst="rect">
+            <a:avLst/>
+          </a:prstGeom>
+        </p:spPr>
+      </p:pic>
+      <p:sp>
+        <p:nvSpPr>
+          <p:cNvPr id="3" name="Subtitle 2"/>
+          <p:cNvSpPr>
+            <a:spLocks noGrp="1"/>
+          </p:cNvSpPr>
+          <p:nvPr>
+            <p:ph type="subTitle" idx="1"/>
+          </p:nvPr>
+        </p:nvSpPr>
+        <p:spPr>
+          <a:xfrm>
+            <a:off x="0" y="838200"/>
+            <a:ext cx="9144000" cy="609600"/>
+          </a:xfrm>
+          <a:solidFill>
+            <a:srgbClr val="FFFFCC"/>
+          </a:solidFill>
+        </p:spPr>
+        <p:txBody>
+          <a:bodyPr/>
+          <a:lstStyle/>
+          <a:p>
+            <a:r>
+              <a:rPr lang="en-US" b="1" dirty="0" smtClean="0">
+                <a:solidFill>
+                  <a:srgbClr val="00B050"/>
+                </a:solidFill>
+              </a:rPr>
+              <a:t>Administration</a:t>
+            </a:r>
+            <a:endParaRPr lang="en-US" b="1" dirty="0">
+              <a:solidFill>
+                <a:srgbClr val="00B050"/>
+              </a:solidFill>
+            </a:endParaRPr>
+          </a:p>
+        </p:txBody>
+      </p:sp>
+      <p:sp>
+        <p:nvSpPr>
+          <p:cNvPr id="7" name="Rectangular Callout 6"/>
+          <p:cNvSpPr/>
+          <p:nvPr/>
+        </p:nvSpPr>
+        <p:spPr>
+          <a:xfrm>
+            <a:off x="3200400" y="3048000"/>
+            <a:ext cx="2133600" cy="685800"/>
+          </a:xfrm>
+          <a:prstGeom prst="wedgeRectCallout">
+            <a:avLst/>
+          </a:prstGeom>
+          <a:solidFill>
+            <a:schemeClr val="bg1"/>
+          </a:solidFill>
+          <a:ln>
+            <a:solidFill>
+              <a:schemeClr val="tx1"/>
+            </a:solidFill>
+          </a:ln>
+          <a:effectLst>
+            <a:outerShdw blurRad="50800" dist="38100" dir="13500000" algn="br" rotWithShape="0">
+              <a:prstClr val="black">
+                <a:alpha val="40000"/>
+              </a:prstClr>
+            </a:outerShdw>
+          </a:effectLst>
+          <a:scene3d>
+            <a:camera prst="perspectiveHeroicExtremeRightFacing"/>
+            <a:lightRig rig="threePt" dir="t"/>
+          </a:scene3d>
+        </p:spPr>
+        <p:style>
+          <a:lnRef idx="2">
+            <a:schemeClr val="dk1"/>
+          </a:lnRef>
+          <a:fillRef idx="1">
+            <a:schemeClr val="lt1"/>
+          </a:fillRef>
+          <a:effectRef idx="0">
+            <a:schemeClr val="dk1"/>
+          </a:effectRef>
+          <a:fontRef idx="minor">
+            <a:schemeClr val="dk1"/>
+          </a:fontRef>
+        </p:style>
+        <p:txBody>
+          <a:bodyPr rtlCol="0" anchor="ctr"/>
+          <a:lstStyle/>
+          <a:p>
+            <a:pPr algn="ctr"/>
+            <a:r>
+              <a:rPr lang="en-US" dirty="0" err="1" smtClean="0"/>
+              <a:t>iCreate</a:t>
+            </a:r>
+            <a:endParaRPr lang="en-US" dirty="0" smtClean="0"/>
+          </a:p>
+        </p:txBody>
+      </p:sp>
+      <p:sp>
+        <p:nvSpPr>
+          <p:cNvPr id="8" name="Rectangular Callout 7"/>
+          <p:cNvSpPr/>
+          <p:nvPr/>
+        </p:nvSpPr>
+        <p:spPr>
+          <a:xfrm>
+            <a:off x="7162800" y="3886200"/>
+            <a:ext cx="2133600" cy="685800"/>
+          </a:xfrm>
+          <a:prstGeom prst="wedgeRectCallout">
+            <a:avLst/>
+          </a:prstGeom>
+          <a:solidFill>
+            <a:schemeClr val="bg1"/>
+          </a:solidFill>
+          <a:ln>
+            <a:solidFill>
+              <a:schemeClr val="tx1"/>
+            </a:solidFill>
+          </a:ln>
+          <a:effectLst>
+            <a:outerShdw blurRad="50800" dist="38100" dir="13500000" algn="br" rotWithShape="0">
+              <a:prstClr val="black">
+                <a:alpha val="40000"/>
+              </a:prstClr>
+            </a:outerShdw>
+          </a:effectLst>
+          <a:scene3d>
+            <a:camera prst="perspectiveHeroicExtremeRightFacing"/>
+            <a:lightRig rig="threePt" dir="t"/>
+          </a:scene3d>
+        </p:spPr>
+        <p:style>
+          <a:lnRef idx="2">
+            <a:schemeClr val="dk1"/>
+          </a:lnRef>
+          <a:fillRef idx="1">
+            <a:schemeClr val="lt1"/>
+          </a:fillRef>
+          <a:effectRef idx="0">
+            <a:schemeClr val="dk1"/>
+          </a:effectRef>
+          <a:fontRef idx="minor">
+            <a:schemeClr val="dk1"/>
+          </a:fontRef>
+        </p:style>
+        <p:txBody>
+          <a:bodyPr rtlCol="0" anchor="ctr"/>
+          <a:lstStyle/>
+          <a:p>
+            <a:pPr algn="ctr"/>
+            <a:r>
+              <a:rPr lang="en-US" dirty="0" err="1" smtClean="0"/>
+              <a:t>iDestroy</a:t>
+            </a:r>
+            <a:endParaRPr lang="en-US" dirty="0" smtClean="0"/>
+          </a:p>
+        </p:txBody>
+      </p:sp>
+      <p:sp>
+        <p:nvSpPr>
+          <p:cNvPr id="9" name="Rectangular Callout 8"/>
+          <p:cNvSpPr/>
+          <p:nvPr/>
+        </p:nvSpPr>
+        <p:spPr>
+          <a:xfrm>
+            <a:off x="2362200" y="1676400"/>
+            <a:ext cx="6705600" cy="3352800"/>
+          </a:xfrm>
+          <a:prstGeom prst="wedgeRectCallout">
+            <a:avLst/>
+          </a:prstGeom>
+          <a:solidFill>
+            <a:schemeClr val="bg1"/>
+          </a:solidFill>
+          <a:ln>
+            <a:solidFill>
+              <a:schemeClr val="tx1"/>
+            </a:solidFill>
+          </a:ln>
+          <a:effectLst>
+            <a:outerShdw blurRad="50800" dist="38100" dir="13500000" algn="br" rotWithShape="0">
+              <a:prstClr val="black">
+                <a:alpha val="40000"/>
+              </a:prstClr>
+            </a:outerShdw>
+          </a:effectLst>
+          <a:scene3d>
+            <a:camera prst="perspectiveHeroicExtremeRightFacing"/>
+            <a:lightRig rig="threePt" dir="t"/>
+          </a:scene3d>
+        </p:spPr>
+        <p:style>
+          <a:lnRef idx="2">
+            <a:schemeClr val="dk1"/>
+          </a:lnRef>
+          <a:fillRef idx="1">
+            <a:schemeClr val="lt1"/>
+          </a:fillRef>
+          <a:effectRef idx="0">
+            <a:schemeClr val="dk1"/>
+          </a:effectRef>
+          <a:fontRef idx="minor">
+            <a:schemeClr val="dk1"/>
+          </a:fontRef>
+        </p:style>
+        <p:txBody>
+          <a:bodyPr rtlCol="0" anchor="ctr"/>
+          <a:lstStyle/>
+          <a:p>
+            <a:pPr algn="ctr"/>
+            <a:r>
+              <a:rPr lang="en-US" sz="6600" b="1" dirty="0" err="1" smtClean="0"/>
+              <a:t>iRule</a:t>
+            </a:r>
+            <a:r>
+              <a:rPr lang="en-US" sz="6600" b="1" dirty="0" smtClean="0"/>
+              <a:t> </a:t>
+            </a:r>
+            <a:r>
+              <a:rPr lang="en-US" sz="6600" b="1" dirty="0" smtClean="0">
+                <a:latin typeface="Wingdings"/>
+              </a:rPr>
+              <a:t>:)</a:t>
+            </a:r>
+            <a:endParaRPr lang="en-US" sz="6600" b="1" dirty="0" smtClean="0"/>
+          </a:p>
+        </p:txBody>
+      </p:sp>
+    </p:spTree>
+  </p:cSld>
+  <p:clrMapOvr>
+    <a:masterClrMapping/>
+  </p:clrMapOvr>
+  <p:timing>
+    <p:tnLst>
+      <p:par>
+        <p:cTn id="1" dur="indefinite" restart="never" nodeType="tmRoot"/>
+      </p:par>
+    </p:tnLst>
+  </p:timing>
+</p:sld>
+</file>
+
+<file path=ppt/slides/slide51.xml><?xml version="1.0" encoding="utf-8"?>
+<p:sld xmlns:a="http://schemas.openxmlformats.org/drawingml/2006/main" xmlns:r="http://schemas.openxmlformats.org/officeDocument/2006/relationships" xmlns:p="http://schemas.openxmlformats.org/presentationml/2006/main">
+  <p:cSld>
+    <p:spTree>
+      <p:nvGrpSpPr>
+        <p:cNvPr id="1" name=""/>
+        <p:cNvGrpSpPr/>
+        <p:nvPr/>
+      </p:nvGrpSpPr>
+      <p:grpSpPr>
+        <a:xfrm>
+          <a:off x="0" y="0"/>
+          <a:ext cx="0" cy="0"/>
+          <a:chOff x="0" y="0"/>
+          <a:chExt cx="0" cy="0"/>
+        </a:xfrm>
+      </p:grpSpPr>
+      <p:sp>
+        <p:nvSpPr>
+          <p:cNvPr id="2" name="Title 1"/>
+          <p:cNvSpPr>
+            <a:spLocks noGrp="1"/>
+          </p:cNvSpPr>
+          <p:nvPr>
+            <p:ph type="ctrTitle"/>
+          </p:nvPr>
+        </p:nvSpPr>
+        <p:spPr>
+          <a:xfrm>
+            <a:off x="0" y="1"/>
+            <a:ext cx="9144000" cy="838199"/>
+          </a:xfrm>
+          <a:solidFill>
+            <a:schemeClr val="tx1">
+              <a:lumMod val="95000"/>
+              <a:lumOff val="5000"/>
+            </a:schemeClr>
+          </a:solidFill>
+        </p:spPr>
+        <p:txBody>
+          <a:bodyPr>
+            <a:normAutofit/>
+          </a:bodyPr>
+          <a:lstStyle/>
+          <a:p>
+            <a:r>
+              <a:rPr lang="en-US" sz="3600" b="1" dirty="0" err="1" smtClean="0">
+                <a:solidFill>
+                  <a:schemeClr val="accent5">
+                    <a:lumMod val="20000"/>
+                    <a:lumOff val="80000"/>
+                  </a:schemeClr>
+                </a:solidFill>
+              </a:rPr>
+              <a:t>BugBase</a:t>
+            </a:r>
+            <a:r>
+              <a:rPr lang="en-US" sz="3600" b="1" dirty="0" smtClean="0">
+                <a:solidFill>
+                  <a:schemeClr val="accent5">
+                    <a:lumMod val="20000"/>
+                    <a:lumOff val="80000"/>
+                  </a:schemeClr>
+                </a:solidFill>
+              </a:rPr>
+              <a:t> 1.0</a:t>
+            </a:r>
+            <a:endParaRPr lang="en-US" sz="3600" b="1" dirty="0">
+              <a:solidFill>
+                <a:schemeClr val="accent5">
+                  <a:lumMod val="20000"/>
+                  <a:lumOff val="80000"/>
+                </a:schemeClr>
+              </a:solidFill>
+            </a:endParaRPr>
+          </a:p>
+        </p:txBody>
+      </p:sp>
+      <p:sp>
+        <p:nvSpPr>
+          <p:cNvPr id="3" name="Subtitle 2"/>
+          <p:cNvSpPr>
+            <a:spLocks noGrp="1"/>
+          </p:cNvSpPr>
+          <p:nvPr>
+            <p:ph type="subTitle" idx="1"/>
+          </p:nvPr>
+        </p:nvSpPr>
+        <p:spPr>
+          <a:xfrm>
+            <a:off x="0" y="838200"/>
+            <a:ext cx="9144000" cy="609600"/>
+          </a:xfrm>
+          <a:solidFill>
+            <a:srgbClr val="FFFFCC"/>
+          </a:solidFill>
+        </p:spPr>
+        <p:txBody>
+          <a:bodyPr/>
+          <a:lstStyle/>
+          <a:p>
+            <a:r>
+              <a:rPr lang="en-US" b="1" dirty="0" smtClean="0">
+                <a:solidFill>
+                  <a:srgbClr val="00B050"/>
+                </a:solidFill>
+              </a:rPr>
+              <a:t>What is a bug tracker?</a:t>
+            </a:r>
+            <a:endParaRPr lang="en-US" b="1" dirty="0">
+              <a:solidFill>
+                <a:srgbClr val="00B050"/>
               </a:solidFill>
             </a:endParaRPr>
           </a:p>

</xml_diff>

<commit_message>
done with advocacy presentation + invite to fork
</commit_message>
<xml_diff>
--- a/advocacy/BugBase 1.pptx
+++ b/advocacy/BugBase 1.pptx
@@ -5,7 +5,7 @@
     <p:sldMasterId id="2147483708" r:id="rId1"/>
   </p:sldMasterIdLst>
   <p:sldIdLst>
-    <p:sldId id="256" r:id="rId2"/>
+    <p:sldId id="311" r:id="rId2"/>
     <p:sldId id="278" r:id="rId3"/>
     <p:sldId id="257" r:id="rId4"/>
     <p:sldId id="269" r:id="rId5"/>
@@ -55,7 +55,21 @@
     <p:sldId id="308" r:id="rId49"/>
     <p:sldId id="307" r:id="rId50"/>
     <p:sldId id="309" r:id="rId51"/>
-    <p:sldId id="259" r:id="rId52"/>
+    <p:sldId id="324" r:id="rId52"/>
+    <p:sldId id="259" r:id="rId53"/>
+    <p:sldId id="313" r:id="rId54"/>
+    <p:sldId id="312" r:id="rId55"/>
+    <p:sldId id="310" r:id="rId56"/>
+    <p:sldId id="315" r:id="rId57"/>
+    <p:sldId id="316" r:id="rId58"/>
+    <p:sldId id="317" r:id="rId59"/>
+    <p:sldId id="318" r:id="rId60"/>
+    <p:sldId id="319" r:id="rId61"/>
+    <p:sldId id="314" r:id="rId62"/>
+    <p:sldId id="320" r:id="rId63"/>
+    <p:sldId id="321" r:id="rId64"/>
+    <p:sldId id="322" r:id="rId65"/>
+    <p:sldId id="323" r:id="rId66"/>
   </p:sldIdLst>
   <p:sldSz cx="9144000" cy="6858000" type="screen4x3"/>
   <p:notesSz cx="6858000" cy="9144000"/>
@@ -3117,7 +3131,7 @@
           <a:lstStyle/>
           <a:p>
             <a:r>
-              <a:rPr lang="en-US" sz="3600" b="1" dirty="0" err="1" smtClean="0">
+              <a:rPr lang="en-US" sz="3600" b="1" dirty="0" smtClean="0">
                 <a:solidFill>
                   <a:schemeClr val="accent5">
                     <a:lumMod val="20000"/>
@@ -3125,18 +3139,7 @@
                   </a:schemeClr>
                 </a:solidFill>
               </a:rPr>
-              <a:t>BugBase</a:t>
-            </a:r>
-            <a:r>
-              <a:rPr lang="en-US" sz="3600" b="1" dirty="0" smtClean="0">
-                <a:solidFill>
-                  <a:schemeClr val="accent5">
-                    <a:lumMod val="20000"/>
-                    <a:lumOff val="80000"/>
-                  </a:schemeClr>
-                </a:solidFill>
-              </a:rPr>
-              <a:t> 1.0</a:t>
+              <a:t>Say Hello to…</a:t>
             </a:r>
             <a:endParaRPr lang="en-US" sz="3600" b="1" dirty="0">
               <a:solidFill>
@@ -3165,8 +3168,8 @@
         </p:blipFill>
         <p:spPr>
           <a:xfrm>
-            <a:off x="2743200" y="2057400"/>
-            <a:ext cx="3409442" cy="3937000"/>
+            <a:off x="381000" y="2209800"/>
+            <a:ext cx="3079496" cy="3556000"/>
           </a:xfrm>
           <a:prstGeom prst="rect">
             <a:avLst/>
@@ -3197,18 +3200,118 @@
           <a:lstStyle/>
           <a:p>
             <a:r>
+              <a:rPr lang="en-US" b="1" dirty="0" err="1" smtClean="0">
+                <a:solidFill>
+                  <a:srgbClr val="00B050"/>
+                </a:solidFill>
+              </a:rPr>
+              <a:t>BugBase</a:t>
+            </a:r>
+            <a:r>
               <a:rPr lang="en-US" b="1" dirty="0" smtClean="0">
                 <a:solidFill>
                   <a:srgbClr val="00B050"/>
                 </a:solidFill>
               </a:rPr>
-              <a:t>Say Hello to…</a:t>
+              <a:t> 1.0</a:t>
             </a:r>
             <a:endParaRPr lang="en-US" b="1" dirty="0">
               <a:solidFill>
                 <a:srgbClr val="00B050"/>
               </a:solidFill>
             </a:endParaRPr>
+          </a:p>
+        </p:txBody>
+      </p:sp>
+      <p:sp>
+        <p:nvSpPr>
+          <p:cNvPr id="5" name="TextBox 4"/>
+          <p:cNvSpPr txBox="1"/>
+          <p:nvPr/>
+        </p:nvSpPr>
+        <p:spPr>
+          <a:xfrm>
+            <a:off x="3962400" y="2715161"/>
+            <a:ext cx="4648200" cy="1323439"/>
+          </a:xfrm>
+          <a:prstGeom prst="rect">
+            <a:avLst/>
+          </a:prstGeom>
+          <a:solidFill>
+            <a:schemeClr val="accent5">
+              <a:lumMod val="20000"/>
+              <a:lumOff val="80000"/>
+            </a:schemeClr>
+          </a:solidFill>
+        </p:spPr>
+        <p:txBody>
+          <a:bodyPr wrap="square" rtlCol="0">
+            <a:spAutoFit/>
+          </a:bodyPr>
+          <a:lstStyle/>
+          <a:p>
+            <a:pPr algn="ctr"/>
+            <a:r>
+              <a:rPr lang="en-US" sz="4000" b="1" dirty="0" smtClean="0"/>
+              <a:t>What, why, who, how, etc</a:t>
+            </a:r>
+            <a:endParaRPr lang="en-US" sz="4000" b="1" dirty="0"/>
+          </a:p>
+        </p:txBody>
+      </p:sp>
+      <p:sp>
+        <p:nvSpPr>
+          <p:cNvPr id="8" name="TextBox 7"/>
+          <p:cNvSpPr txBox="1"/>
+          <p:nvPr/>
+        </p:nvSpPr>
+        <p:spPr>
+          <a:xfrm>
+            <a:off x="3962400" y="4171890"/>
+            <a:ext cx="4648200" cy="400110"/>
+          </a:xfrm>
+          <a:prstGeom prst="rect">
+            <a:avLst/>
+          </a:prstGeom>
+          <a:solidFill>
+            <a:schemeClr val="accent5">
+              <a:lumMod val="20000"/>
+              <a:lumOff val="80000"/>
+            </a:schemeClr>
+          </a:solidFill>
+        </p:spPr>
+        <p:txBody>
+          <a:bodyPr wrap="square" rtlCol="0">
+            <a:spAutoFit/>
+          </a:bodyPr>
+          <a:lstStyle/>
+          <a:p>
+            <a:pPr algn="ctr"/>
+            <a:r>
+              <a:rPr lang="en-US" sz="2000" b="1" dirty="0" err="1" smtClean="0"/>
+              <a:t>Abhisehk</a:t>
+            </a:r>
+            <a:r>
+              <a:rPr lang="en-US" sz="2000" b="1" dirty="0" smtClean="0"/>
+              <a:t> </a:t>
+            </a:r>
+            <a:r>
+              <a:rPr lang="en-US" sz="2000" b="1" dirty="0" err="1" smtClean="0"/>
+              <a:t>Mishra</a:t>
+            </a:r>
+            <a:r>
+              <a:rPr lang="en-US" sz="2000" b="1" dirty="0" smtClean="0"/>
+              <a:t> (</a:t>
+            </a:r>
+            <a:r>
+              <a:rPr lang="en-US" sz="2000" b="1" dirty="0" err="1" smtClean="0"/>
+              <a:t>ideamonk</a:t>
+            </a:r>
+            <a:r>
+              <a:rPr lang="en-US" sz="2000" b="1" dirty="0" smtClean="0"/>
+              <a:t> at gmail.com)</a:t>
+            </a:r>
+            <a:endParaRPr lang="en-US" sz="2000" b="1" dirty="0"/>
           </a:p>
         </p:txBody>
       </p:sp>
@@ -3217,6 +3320,9 @@
   <p:clrMapOvr>
     <a:masterClrMapping/>
   </p:clrMapOvr>
+  <p:transition>
+    <p:fade thruBlk="1"/>
+  </p:transition>
   <p:timing>
     <p:tnLst>
       <p:par>
@@ -3630,6 +3736,7 @@
   <p:clrMapOvr>
     <a:masterClrMapping/>
   </p:clrMapOvr>
+  <p:transition/>
   <p:timing>
     <p:tnLst>
       <p:par>
@@ -4090,6 +4197,7 @@
   <p:clrMapOvr>
     <a:masterClrMapping/>
   </p:clrMapOvr>
+  <p:transition/>
   <p:timing>
     <p:tnLst>
       <p:par>
@@ -4213,6 +4321,7 @@
   <p:clrMapOvr>
     <a:masterClrMapping/>
   </p:clrMapOvr>
+  <p:transition/>
   <p:timing>
     <p:tnLst>
       <p:par>
@@ -4356,6 +4465,7 @@
   <p:clrMapOvr>
     <a:masterClrMapping/>
   </p:clrMapOvr>
+  <p:transition/>
   <p:timing>
     <p:tnLst>
       <p:par>
@@ -4635,6 +4745,7 @@
   <p:clrMapOvr>
     <a:masterClrMapping/>
   </p:clrMapOvr>
+  <p:transition/>
   <p:timing>
     <p:tnLst>
       <p:par>
@@ -4978,6 +5089,7 @@
   <p:clrMapOvr>
     <a:masterClrMapping/>
   </p:clrMapOvr>
+  <p:transition/>
   <p:timing>
     <p:tnLst>
       <p:par>
@@ -5368,6 +5480,7 @@
   <p:clrMapOvr>
     <a:masterClrMapping/>
   </p:clrMapOvr>
+  <p:transition/>
   <p:timing>
     <p:tnLst>
       <p:par>
@@ -5543,6 +5656,7 @@
   <p:clrMapOvr>
     <a:masterClrMapping/>
   </p:clrMapOvr>
+  <p:transition/>
   <p:timing>
     <p:tnLst>
       <p:par>
@@ -5760,6 +5874,7 @@
   <p:clrMapOvr>
     <a:masterClrMapping/>
   </p:clrMapOvr>
+  <p:transition/>
   <p:timing>
     <p:tnLst>
       <p:par>
@@ -6027,6 +6142,7 @@
   <p:clrMapOvr>
     <a:masterClrMapping/>
   </p:clrMapOvr>
+  <p:transition/>
   <p:timing>
     <p:tnLst>
       <p:par>
@@ -6504,6 +6620,7 @@
   <p:clrMapOvr>
     <a:masterClrMapping/>
   </p:clrMapOvr>
+  <p:transition/>
   <p:timing>
     <p:tnLst>
       <p:par>
@@ -6605,6 +6722,7 @@
   <p:clrMapOvr>
     <a:masterClrMapping/>
   </p:clrMapOvr>
+  <p:transition/>
   <p:timing>
     <p:tnLst>
       <p:par>
@@ -6750,6 +6868,7 @@
   <p:clrMapOvr>
     <a:masterClrMapping/>
   </p:clrMapOvr>
+  <p:transition/>
   <p:timing>
     <p:tnLst>
       <p:par>
@@ -6895,6 +7014,7 @@
   <p:clrMapOvr>
     <a:masterClrMapping/>
   </p:clrMapOvr>
+  <p:transition/>
   <p:timing>
     <p:tnLst>
       <p:par>
@@ -7066,6 +7186,7 @@
   <p:clrMapOvr>
     <a:masterClrMapping/>
   </p:clrMapOvr>
+  <p:transition/>
   <p:timing>
     <p:tnLst>
       <p:par>
@@ -7263,6 +7384,7 @@
   <p:clrMapOvr>
     <a:masterClrMapping/>
   </p:clrMapOvr>
+  <p:transition/>
   <p:timing>
     <p:tnLst>
       <p:par>
@@ -7384,6 +7506,7 @@
   <p:clrMapOvr>
     <a:masterClrMapping/>
   </p:clrMapOvr>
+  <p:transition/>
   <p:timing>
     <p:tnLst>
       <p:par>
@@ -7545,6 +7668,7 @@
   <p:clrMapOvr>
     <a:masterClrMapping/>
   </p:clrMapOvr>
+  <p:transition/>
   <p:timing>
     <p:tnLst>
       <p:par>
@@ -7690,6 +7814,7 @@
   <p:clrMapOvr>
     <a:masterClrMapping/>
   </p:clrMapOvr>
+  <p:transition/>
   <p:timing>
     <p:tnLst>
       <p:par>
@@ -7896,6 +8021,7 @@
   <p:clrMapOvr>
     <a:masterClrMapping/>
   </p:clrMapOvr>
+  <p:transition/>
   <p:timing>
     <p:tnLst>
       <p:par>
@@ -7997,6 +8123,7 @@
   <p:clrMapOvr>
     <a:masterClrMapping/>
   </p:clrMapOvr>
+  <p:transition/>
   <p:timing>
     <p:tnLst>
       <p:par>
@@ -8264,6 +8391,7 @@
   <p:clrMapOvr>
     <a:masterClrMapping/>
   </p:clrMapOvr>
+  <p:transition/>
   <p:timing>
     <p:tnLst>
       <p:par>
@@ -8592,6 +8720,7 @@
   <p:clrMapOvr>
     <a:masterClrMapping/>
   </p:clrMapOvr>
+  <p:transition/>
   <p:timing>
     <p:tnLst>
       <p:par>
@@ -8959,6 +9088,7 @@
   <p:clrMapOvr>
     <a:masterClrMapping/>
   </p:clrMapOvr>
+  <p:transition/>
   <p:timing>
     <p:tnLst>
       <p:par>
@@ -9204,6 +9334,7 @@
   <p:clrMapOvr>
     <a:masterClrMapping/>
   </p:clrMapOvr>
+  <p:transition/>
   <p:timing>
     <p:tnLst>
       <p:par>
@@ -9365,6 +9496,7 @@
   <p:clrMapOvr>
     <a:masterClrMapping/>
   </p:clrMapOvr>
+  <p:transition/>
   <p:timing>
     <p:tnLst>
       <p:par>
@@ -9510,6 +9642,7 @@
   <p:clrMapOvr>
     <a:masterClrMapping/>
   </p:clrMapOvr>
+  <p:transition/>
   <p:timing>
     <p:tnLst>
       <p:par>
@@ -9671,6 +9804,7 @@
   <p:clrMapOvr>
     <a:masterClrMapping/>
   </p:clrMapOvr>
+  <p:transition/>
   <p:timing>
     <p:tnLst>
       <p:par>
@@ -9816,6 +9950,7 @@
   <p:clrMapOvr>
     <a:masterClrMapping/>
   </p:clrMapOvr>
+  <p:transition/>
   <p:timing>
     <p:tnLst>
       <p:par>
@@ -9984,6 +10119,7 @@
   <p:clrMapOvr>
     <a:masterClrMapping/>
   </p:clrMapOvr>
+  <p:transition/>
   <p:timing>
     <p:tnLst>
       <p:par>
@@ -10129,6 +10265,7 @@
   <p:clrMapOvr>
     <a:masterClrMapping/>
   </p:clrMapOvr>
+  <p:transition/>
   <p:timing>
     <p:tnLst>
       <p:par>
@@ -10250,6 +10387,7 @@
   <p:clrMapOvr>
     <a:masterClrMapping/>
   </p:clrMapOvr>
+  <p:transition/>
   <p:timing>
     <p:tnLst>
       <p:par>
@@ -10411,6 +10549,7 @@
   <p:clrMapOvr>
     <a:masterClrMapping/>
   </p:clrMapOvr>
+  <p:transition/>
   <p:timing>
     <p:tnLst>
       <p:par>
@@ -10556,6 +10695,7 @@
   <p:clrMapOvr>
     <a:masterClrMapping/>
   </p:clrMapOvr>
+  <p:transition/>
   <p:timing>
     <p:tnLst>
       <p:par>
@@ -10717,6 +10857,7 @@
   <p:clrMapOvr>
     <a:masterClrMapping/>
   </p:clrMapOvr>
+  <p:transition/>
   <p:timing>
     <p:tnLst>
       <p:par>
@@ -10823,6 +10964,7 @@
   <p:clrMapOvr>
     <a:masterClrMapping/>
   </p:clrMapOvr>
+  <p:transition/>
   <p:timing>
     <p:tnLst>
       <p:par>
@@ -11170,6 +11312,7 @@
   <p:clrMapOvr>
     <a:masterClrMapping/>
   </p:clrMapOvr>
+  <p:transition/>
   <p:timing>
     <p:tnLst>
       <p:par>
@@ -11339,6 +11482,7 @@
   <p:clrMapOvr>
     <a:masterClrMapping/>
   </p:clrMapOvr>
+  <p:transition/>
   <p:timing>
     <p:tnLst>
       <p:par>
@@ -11544,6 +11688,7 @@
   <p:clrMapOvr>
     <a:masterClrMapping/>
   </p:clrMapOvr>
+  <p:transition/>
   <p:timing>
     <p:tnLst>
       <p:par>
@@ -11689,6 +11834,7 @@
   <p:clrMapOvr>
     <a:masterClrMapping/>
   </p:clrMapOvr>
+  <p:transition/>
   <p:timing>
     <p:tnLst>
       <p:par>
@@ -11895,6 +12041,7 @@
   <p:clrMapOvr>
     <a:masterClrMapping/>
   </p:clrMapOvr>
+  <p:transition/>
   <p:timing>
     <p:tnLst>
       <p:par>
@@ -12162,6 +12309,7 @@
   <p:clrMapOvr>
     <a:masterClrMapping/>
   </p:clrMapOvr>
+  <p:transition/>
   <p:timing>
     <p:tnLst>
       <p:par>
@@ -12330,6 +12478,7 @@
   <p:clrMapOvr>
     <a:masterClrMapping/>
   </p:clrMapOvr>
+  <p:transition/>
   <p:timing>
     <p:tnLst>
       <p:par>
@@ -12668,6 +12817,7 @@
   <p:clrMapOvr>
     <a:masterClrMapping/>
   </p:clrMapOvr>
+  <p:transition/>
   <p:timing>
     <p:tnLst>
       <p:par>
@@ -12695,6 +12845,30 @@
           <a:chExt cx="0" cy="0"/>
         </a:xfrm>
       </p:grpSpPr>
+      <p:pic>
+        <p:nvPicPr>
+          <p:cNvPr id="11" name="Picture 10" descr="foo.png"/>
+          <p:cNvPicPr>
+            <a:picLocks noChangeAspect="1"/>
+          </p:cNvPicPr>
+          <p:nvPr/>
+        </p:nvPicPr>
+        <p:blipFill>
+          <a:blip r:embed="rId2"/>
+          <a:stretch>
+            <a:fillRect/>
+          </a:stretch>
+        </p:blipFill>
+        <p:spPr>
+          <a:xfrm>
+            <a:off x="228600" y="990600"/>
+            <a:ext cx="7141016" cy="6213887"/>
+          </a:xfrm>
+          <a:prstGeom prst="rect">
+            <a:avLst/>
+          </a:prstGeom>
+        </p:spPr>
+      </p:pic>
       <p:sp>
         <p:nvSpPr>
           <p:cNvPr id="2" name="Title 1"/>
@@ -12724,7 +12898,7 @@
           <a:lstStyle/>
           <a:p>
             <a:r>
-              <a:rPr lang="en-US" sz="3600" b="1" dirty="0" err="1" smtClean="0">
+              <a:rPr lang="en-US" sz="3600" b="1" dirty="0" smtClean="0">
                 <a:solidFill>
                   <a:schemeClr val="accent5">
                     <a:lumMod val="20000"/>
@@ -12732,18 +12906,7 @@
                   </a:schemeClr>
                 </a:solidFill>
               </a:rPr>
-              <a:t>BugBase</a:t>
-            </a:r>
-            <a:r>
-              <a:rPr lang="en-US" sz="3600" b="1" dirty="0" smtClean="0">
-                <a:solidFill>
-                  <a:schemeClr val="accent5">
-                    <a:lumMod val="20000"/>
-                    <a:lumOff val="80000"/>
-                  </a:schemeClr>
-                </a:solidFill>
-              </a:rPr>
-              <a:t> 1.0</a:t>
+              <a:t>Features Tour</a:t>
             </a:r>
             <a:endParaRPr lang="en-US" sz="3600" b="1" dirty="0">
               <a:solidFill>
@@ -12785,13 +12948,74 @@
                   <a:srgbClr val="00B050"/>
                 </a:solidFill>
               </a:rPr>
-              <a:t>What is a bug tracker?</a:t>
+              <a:t>Administration</a:t>
             </a:r>
             <a:endParaRPr lang="en-US" b="1" dirty="0">
               <a:solidFill>
                 <a:srgbClr val="00B050"/>
               </a:solidFill>
             </a:endParaRPr>
+          </a:p>
+        </p:txBody>
+      </p:sp>
+      <p:sp>
+        <p:nvSpPr>
+          <p:cNvPr id="8" name="Rectangular Callout 7"/>
+          <p:cNvSpPr/>
+          <p:nvPr/>
+        </p:nvSpPr>
+        <p:spPr>
+          <a:xfrm>
+            <a:off x="2895600" y="4572000"/>
+            <a:ext cx="2133600" cy="685800"/>
+          </a:xfrm>
+          <a:prstGeom prst="wedgeRectCallout">
+            <a:avLst/>
+          </a:prstGeom>
+          <a:solidFill>
+            <a:schemeClr val="bg1"/>
+          </a:solidFill>
+          <a:ln>
+            <a:solidFill>
+              <a:schemeClr val="tx1"/>
+            </a:solidFill>
+          </a:ln>
+          <a:effectLst>
+            <a:outerShdw blurRad="50800" dist="38100" dir="13500000" algn="br" rotWithShape="0">
+              <a:prstClr val="black">
+                <a:alpha val="40000"/>
+              </a:prstClr>
+            </a:outerShdw>
+          </a:effectLst>
+          <a:scene3d>
+            <a:camera prst="perspectiveHeroicExtremeRightFacing"/>
+            <a:lightRig rig="threePt" dir="t"/>
+          </a:scene3d>
+        </p:spPr>
+        <p:style>
+          <a:lnRef idx="2">
+            <a:schemeClr val="dk1"/>
+          </a:lnRef>
+          <a:fillRef idx="1">
+            <a:schemeClr val="lt1"/>
+          </a:fillRef>
+          <a:effectRef idx="0">
+            <a:schemeClr val="dk1"/>
+          </a:effectRef>
+          <a:fontRef idx="minor">
+            <a:schemeClr val="dk1"/>
+          </a:fontRef>
+        </p:style>
+        <p:txBody>
+          <a:bodyPr rtlCol="0" anchor="ctr"/>
+          <a:lstStyle/>
+          <a:p>
+            <a:pPr algn="ctr"/>
+            <a:r>
+              <a:rPr lang="en-US" dirty="0" err="1" smtClean="0"/>
+              <a:t>iProject</a:t>
+            </a:r>
+            <a:endParaRPr lang="en-US" dirty="0" smtClean="0"/>
           </a:p>
         </p:txBody>
       </p:sp>
@@ -12800,6 +13024,1814 @@
   <p:clrMapOvr>
     <a:masterClrMapping/>
   </p:clrMapOvr>
+  <p:transition/>
+  <p:timing>
+    <p:tnLst>
+      <p:par>
+        <p:cTn id="1" dur="indefinite" restart="never" nodeType="tmRoot"/>
+      </p:par>
+    </p:tnLst>
+  </p:timing>
+</p:sld>
+</file>
+
+<file path=ppt/slides/slide52.xml><?xml version="1.0" encoding="utf-8"?>
+<p:sld xmlns:a="http://schemas.openxmlformats.org/drawingml/2006/main" xmlns:r="http://schemas.openxmlformats.org/officeDocument/2006/relationships" xmlns:p="http://schemas.openxmlformats.org/presentationml/2006/main">
+  <p:cSld>
+    <p:spTree>
+      <p:nvGrpSpPr>
+        <p:cNvPr id="1" name=""/>
+        <p:cNvGrpSpPr/>
+        <p:nvPr/>
+      </p:nvGrpSpPr>
+      <p:grpSpPr>
+        <a:xfrm>
+          <a:off x="0" y="0"/>
+          <a:ext cx="0" cy="0"/>
+          <a:chOff x="0" y="0"/>
+          <a:chExt cx="0" cy="0"/>
+        </a:xfrm>
+      </p:grpSpPr>
+      <p:sp>
+        <p:nvSpPr>
+          <p:cNvPr id="2" name="Title 1"/>
+          <p:cNvSpPr>
+            <a:spLocks noGrp="1"/>
+          </p:cNvSpPr>
+          <p:nvPr>
+            <p:ph type="ctrTitle"/>
+          </p:nvPr>
+        </p:nvSpPr>
+        <p:spPr>
+          <a:xfrm>
+            <a:off x="0" y="1"/>
+            <a:ext cx="9144000" cy="838199"/>
+          </a:xfrm>
+          <a:solidFill>
+            <a:schemeClr val="tx1">
+              <a:lumMod val="95000"/>
+              <a:lumOff val="5000"/>
+            </a:schemeClr>
+          </a:solidFill>
+        </p:spPr>
+        <p:txBody>
+          <a:bodyPr>
+            <a:normAutofit/>
+          </a:bodyPr>
+          <a:lstStyle/>
+          <a:p>
+            <a:r>
+              <a:rPr lang="en-US" sz="3600" b="1" dirty="0" smtClean="0">
+                <a:solidFill>
+                  <a:schemeClr val="accent5">
+                    <a:lumMod val="20000"/>
+                    <a:lumOff val="80000"/>
+                  </a:schemeClr>
+                </a:solidFill>
+              </a:rPr>
+              <a:t>Behind the Scenes</a:t>
+            </a:r>
+            <a:endParaRPr lang="en-US" sz="3600" b="1" dirty="0">
+              <a:solidFill>
+                <a:schemeClr val="accent5">
+                  <a:lumMod val="20000"/>
+                  <a:lumOff val="80000"/>
+                </a:schemeClr>
+              </a:solidFill>
+            </a:endParaRPr>
+          </a:p>
+        </p:txBody>
+      </p:sp>
+      <p:sp>
+        <p:nvSpPr>
+          <p:cNvPr id="3" name="Subtitle 2"/>
+          <p:cNvSpPr>
+            <a:spLocks noGrp="1"/>
+          </p:cNvSpPr>
+          <p:nvPr>
+            <p:ph type="subTitle" idx="1"/>
+          </p:nvPr>
+        </p:nvSpPr>
+        <p:spPr>
+          <a:xfrm>
+            <a:off x="0" y="838200"/>
+            <a:ext cx="9144000" cy="609600"/>
+          </a:xfrm>
+          <a:solidFill>
+            <a:srgbClr val="FFFFCC"/>
+          </a:solidFill>
+        </p:spPr>
+        <p:txBody>
+          <a:bodyPr/>
+          <a:lstStyle/>
+          <a:p>
+            <a:r>
+              <a:rPr lang="en-US" b="1" dirty="0" smtClean="0">
+                <a:solidFill>
+                  <a:srgbClr val="00B050"/>
+                </a:solidFill>
+              </a:rPr>
+              <a:t>What makes it work?</a:t>
+            </a:r>
+            <a:endParaRPr lang="en-US" b="1" dirty="0">
+              <a:solidFill>
+                <a:srgbClr val="00B050"/>
+              </a:solidFill>
+            </a:endParaRPr>
+          </a:p>
+        </p:txBody>
+      </p:sp>
+    </p:spTree>
+  </p:cSld>
+  <p:clrMapOvr>
+    <a:masterClrMapping/>
+  </p:clrMapOvr>
+  <p:transition/>
+  <p:timing>
+    <p:tnLst>
+      <p:par>
+        <p:cTn id="1" dur="indefinite" restart="never" nodeType="tmRoot"/>
+      </p:par>
+    </p:tnLst>
+  </p:timing>
+</p:sld>
+</file>
+
+<file path=ppt/slides/slide53.xml><?xml version="1.0" encoding="utf-8"?>
+<p:sld xmlns:a="http://schemas.openxmlformats.org/drawingml/2006/main" xmlns:r="http://schemas.openxmlformats.org/officeDocument/2006/relationships" xmlns:p="http://schemas.openxmlformats.org/presentationml/2006/main">
+  <p:cSld>
+    <p:spTree>
+      <p:nvGrpSpPr>
+        <p:cNvPr id="1" name=""/>
+        <p:cNvGrpSpPr/>
+        <p:nvPr/>
+      </p:nvGrpSpPr>
+      <p:grpSpPr>
+        <a:xfrm>
+          <a:off x="0" y="0"/>
+          <a:ext cx="0" cy="0"/>
+          <a:chOff x="0" y="0"/>
+          <a:chExt cx="0" cy="0"/>
+        </a:xfrm>
+      </p:grpSpPr>
+      <p:sp>
+        <p:nvSpPr>
+          <p:cNvPr id="2" name="Title 1"/>
+          <p:cNvSpPr>
+            <a:spLocks noGrp="1"/>
+          </p:cNvSpPr>
+          <p:nvPr>
+            <p:ph type="ctrTitle"/>
+          </p:nvPr>
+        </p:nvSpPr>
+        <p:spPr>
+          <a:xfrm>
+            <a:off x="0" y="1"/>
+            <a:ext cx="9144000" cy="838199"/>
+          </a:xfrm>
+          <a:solidFill>
+            <a:schemeClr val="tx1">
+              <a:lumMod val="95000"/>
+              <a:lumOff val="5000"/>
+            </a:schemeClr>
+          </a:solidFill>
+        </p:spPr>
+        <p:txBody>
+          <a:bodyPr>
+            <a:normAutofit/>
+          </a:bodyPr>
+          <a:lstStyle/>
+          <a:p>
+            <a:r>
+              <a:rPr lang="en-US" sz="3600" b="1" dirty="0" smtClean="0">
+                <a:solidFill>
+                  <a:schemeClr val="accent5">
+                    <a:lumMod val="20000"/>
+                    <a:lumOff val="80000"/>
+                  </a:schemeClr>
+                </a:solidFill>
+              </a:rPr>
+              <a:t>Behind the Scenes</a:t>
+            </a:r>
+            <a:endParaRPr lang="en-US" sz="3600" b="1" dirty="0">
+              <a:solidFill>
+                <a:schemeClr val="accent5">
+                  <a:lumMod val="20000"/>
+                  <a:lumOff val="80000"/>
+                </a:schemeClr>
+              </a:solidFill>
+            </a:endParaRPr>
+          </a:p>
+        </p:txBody>
+      </p:sp>
+      <p:sp>
+        <p:nvSpPr>
+          <p:cNvPr id="3" name="Subtitle 2"/>
+          <p:cNvSpPr>
+            <a:spLocks noGrp="1"/>
+          </p:cNvSpPr>
+          <p:nvPr>
+            <p:ph type="subTitle" idx="1"/>
+          </p:nvPr>
+        </p:nvSpPr>
+        <p:spPr>
+          <a:xfrm>
+            <a:off x="0" y="838200"/>
+            <a:ext cx="9144000" cy="609600"/>
+          </a:xfrm>
+          <a:solidFill>
+            <a:srgbClr val="FFFFCC"/>
+          </a:solidFill>
+        </p:spPr>
+        <p:txBody>
+          <a:bodyPr/>
+          <a:lstStyle/>
+          <a:p>
+            <a:r>
+              <a:rPr lang="en-US" b="1" dirty="0" smtClean="0">
+                <a:solidFill>
+                  <a:srgbClr val="00B050"/>
+                </a:solidFill>
+              </a:rPr>
+              <a:t>What makes it work?</a:t>
+            </a:r>
+            <a:endParaRPr lang="en-US" b="1" dirty="0">
+              <a:solidFill>
+                <a:srgbClr val="00B050"/>
+              </a:solidFill>
+            </a:endParaRPr>
+          </a:p>
+        </p:txBody>
+      </p:sp>
+      <p:pic>
+        <p:nvPicPr>
+          <p:cNvPr id="4" name="Picture 3" descr="12582807_6f8e9e75cf.jpg"/>
+          <p:cNvPicPr>
+            <a:picLocks noChangeAspect="1"/>
+          </p:cNvPicPr>
+          <p:nvPr/>
+        </p:nvPicPr>
+        <p:blipFill>
+          <a:blip r:embed="rId2"/>
+          <a:stretch>
+            <a:fillRect/>
+          </a:stretch>
+        </p:blipFill>
+        <p:spPr>
+          <a:xfrm>
+            <a:off x="1397000" y="1790700"/>
+            <a:ext cx="6350000" cy="4762500"/>
+          </a:xfrm>
+          <a:prstGeom prst="rect">
+            <a:avLst/>
+          </a:prstGeom>
+        </p:spPr>
+      </p:pic>
+    </p:spTree>
+  </p:cSld>
+  <p:clrMapOvr>
+    <a:masterClrMapping/>
+  </p:clrMapOvr>
+  <p:transition/>
+  <p:timing>
+    <p:tnLst>
+      <p:par>
+        <p:cTn id="1" dur="indefinite" restart="never" nodeType="tmRoot"/>
+      </p:par>
+    </p:tnLst>
+  </p:timing>
+</p:sld>
+</file>
+
+<file path=ppt/slides/slide54.xml><?xml version="1.0" encoding="utf-8"?>
+<p:sld xmlns:a="http://schemas.openxmlformats.org/drawingml/2006/main" xmlns:r="http://schemas.openxmlformats.org/officeDocument/2006/relationships" xmlns:p="http://schemas.openxmlformats.org/presentationml/2006/main">
+  <p:cSld>
+    <p:spTree>
+      <p:nvGrpSpPr>
+        <p:cNvPr id="1" name=""/>
+        <p:cNvGrpSpPr/>
+        <p:nvPr/>
+      </p:nvGrpSpPr>
+      <p:grpSpPr>
+        <a:xfrm>
+          <a:off x="0" y="0"/>
+          <a:ext cx="0" cy="0"/>
+          <a:chOff x="0" y="0"/>
+          <a:chExt cx="0" cy="0"/>
+        </a:xfrm>
+      </p:grpSpPr>
+      <p:sp>
+        <p:nvSpPr>
+          <p:cNvPr id="2" name="Title 1"/>
+          <p:cNvSpPr>
+            <a:spLocks noGrp="1"/>
+          </p:cNvSpPr>
+          <p:nvPr>
+            <p:ph type="ctrTitle"/>
+          </p:nvPr>
+        </p:nvSpPr>
+        <p:spPr>
+          <a:xfrm>
+            <a:off x="0" y="1"/>
+            <a:ext cx="9144000" cy="838199"/>
+          </a:xfrm>
+          <a:solidFill>
+            <a:schemeClr val="tx1">
+              <a:lumMod val="95000"/>
+              <a:lumOff val="5000"/>
+            </a:schemeClr>
+          </a:solidFill>
+        </p:spPr>
+        <p:txBody>
+          <a:bodyPr>
+            <a:normAutofit/>
+          </a:bodyPr>
+          <a:lstStyle/>
+          <a:p>
+            <a:r>
+              <a:rPr lang="en-US" sz="3600" b="1" dirty="0" smtClean="0">
+                <a:solidFill>
+                  <a:schemeClr val="accent5">
+                    <a:lumMod val="20000"/>
+                    <a:lumOff val="80000"/>
+                  </a:schemeClr>
+                </a:solidFill>
+              </a:rPr>
+              <a:t>Behind the Scenes</a:t>
+            </a:r>
+            <a:endParaRPr lang="en-US" sz="3600" b="1" dirty="0">
+              <a:solidFill>
+                <a:schemeClr val="accent5">
+                  <a:lumMod val="20000"/>
+                  <a:lumOff val="80000"/>
+                </a:schemeClr>
+              </a:solidFill>
+            </a:endParaRPr>
+          </a:p>
+        </p:txBody>
+      </p:sp>
+      <p:sp>
+        <p:nvSpPr>
+          <p:cNvPr id="3" name="Subtitle 2"/>
+          <p:cNvSpPr>
+            <a:spLocks noGrp="1"/>
+          </p:cNvSpPr>
+          <p:nvPr>
+            <p:ph type="subTitle" idx="1"/>
+          </p:nvPr>
+        </p:nvSpPr>
+        <p:spPr>
+          <a:xfrm>
+            <a:off x="0" y="838200"/>
+            <a:ext cx="9144000" cy="609600"/>
+          </a:xfrm>
+          <a:solidFill>
+            <a:srgbClr val="FFFFCC"/>
+          </a:solidFill>
+        </p:spPr>
+        <p:txBody>
+          <a:bodyPr/>
+          <a:lstStyle/>
+          <a:p>
+            <a:r>
+              <a:rPr lang="en-US" b="1" dirty="0" smtClean="0">
+                <a:solidFill>
+                  <a:srgbClr val="00B050"/>
+                </a:solidFill>
+              </a:rPr>
+              <a:t>What makes it work?</a:t>
+            </a:r>
+            <a:endParaRPr lang="en-US" b="1" dirty="0">
+              <a:solidFill>
+                <a:srgbClr val="00B050"/>
+              </a:solidFill>
+            </a:endParaRPr>
+          </a:p>
+        </p:txBody>
+      </p:sp>
+      <p:pic>
+        <p:nvPicPr>
+          <p:cNvPr id="6" name="Picture 5" descr="mysql.gif"/>
+          <p:cNvPicPr>
+            <a:picLocks noChangeAspect="1"/>
+          </p:cNvPicPr>
+          <p:nvPr/>
+        </p:nvPicPr>
+        <p:blipFill>
+          <a:blip r:embed="rId2"/>
+          <a:stretch>
+            <a:fillRect/>
+          </a:stretch>
+        </p:blipFill>
+        <p:spPr>
+          <a:xfrm>
+            <a:off x="6744372" y="1600200"/>
+            <a:ext cx="2059823" cy="1371600"/>
+          </a:xfrm>
+          <a:prstGeom prst="rect">
+            <a:avLst/>
+          </a:prstGeom>
+        </p:spPr>
+      </p:pic>
+      <p:pic>
+        <p:nvPicPr>
+          <p:cNvPr id="7" name="Picture 6" descr="php.png"/>
+          <p:cNvPicPr>
+            <a:picLocks noChangeAspect="1"/>
+          </p:cNvPicPr>
+          <p:nvPr/>
+        </p:nvPicPr>
+        <p:blipFill>
+          <a:blip r:embed="rId3"/>
+          <a:stretch>
+            <a:fillRect/>
+          </a:stretch>
+        </p:blipFill>
+        <p:spPr>
+          <a:xfrm>
+            <a:off x="2667000" y="1752600"/>
+            <a:ext cx="3352800" cy="1764411"/>
+          </a:xfrm>
+          <a:prstGeom prst="rect">
+            <a:avLst/>
+          </a:prstGeom>
+        </p:spPr>
+      </p:pic>
+      <p:pic>
+        <p:nvPicPr>
+          <p:cNvPr id="8" name="Picture 7" descr="smarty-logo-orange.gif"/>
+          <p:cNvPicPr>
+            <a:picLocks noChangeAspect="1"/>
+          </p:cNvPicPr>
+          <p:nvPr/>
+        </p:nvPicPr>
+        <p:blipFill>
+          <a:blip r:embed="rId4"/>
+          <a:stretch>
+            <a:fillRect/>
+          </a:stretch>
+        </p:blipFill>
+        <p:spPr>
+          <a:xfrm>
+            <a:off x="457200" y="3429000"/>
+            <a:ext cx="2381250" cy="609600"/>
+          </a:xfrm>
+          <a:prstGeom prst="rect">
+            <a:avLst/>
+          </a:prstGeom>
+        </p:spPr>
+      </p:pic>
+      <p:pic>
+        <p:nvPicPr>
+          <p:cNvPr id="9" name="Picture 8" descr="JQuery_logo_color_onwhite.png"/>
+          <p:cNvPicPr>
+            <a:picLocks noChangeAspect="1"/>
+          </p:cNvPicPr>
+          <p:nvPr/>
+        </p:nvPicPr>
+        <p:blipFill>
+          <a:blip r:embed="rId5"/>
+          <a:stretch>
+            <a:fillRect/>
+          </a:stretch>
+        </p:blipFill>
+        <p:spPr>
+          <a:xfrm>
+            <a:off x="5638800" y="3378926"/>
+            <a:ext cx="2971800" cy="735874"/>
+          </a:xfrm>
+          <a:prstGeom prst="rect">
+            <a:avLst/>
+          </a:prstGeom>
+        </p:spPr>
+      </p:pic>
+      <p:pic>
+        <p:nvPicPr>
+          <p:cNvPr id="10" name="Picture 9" descr="apache_software_foundation_logo_3074.gif"/>
+          <p:cNvPicPr>
+            <a:picLocks noChangeAspect="1"/>
+          </p:cNvPicPr>
+          <p:nvPr/>
+        </p:nvPicPr>
+        <p:blipFill>
+          <a:blip r:embed="rId6"/>
+          <a:stretch>
+            <a:fillRect/>
+          </a:stretch>
+        </p:blipFill>
+        <p:spPr>
+          <a:xfrm>
+            <a:off x="247650" y="1684292"/>
+            <a:ext cx="1657350" cy="876028"/>
+          </a:xfrm>
+          <a:prstGeom prst="rect">
+            <a:avLst/>
+          </a:prstGeom>
+        </p:spPr>
+      </p:pic>
+      <p:pic>
+        <p:nvPicPr>
+          <p:cNvPr id="11" name="Picture 10" descr="snapshot59.png"/>
+          <p:cNvPicPr>
+            <a:picLocks noChangeAspect="1"/>
+          </p:cNvPicPr>
+          <p:nvPr/>
+        </p:nvPicPr>
+        <p:blipFill>
+          <a:blip r:embed="rId7"/>
+          <a:stretch>
+            <a:fillRect/>
+          </a:stretch>
+        </p:blipFill>
+        <p:spPr>
+          <a:xfrm>
+            <a:off x="1066800" y="4658112"/>
+            <a:ext cx="7196025" cy="2047488"/>
+          </a:xfrm>
+          <a:prstGeom prst="rect">
+            <a:avLst/>
+          </a:prstGeom>
+        </p:spPr>
+      </p:pic>
+      <p:pic>
+        <p:nvPicPr>
+          <p:cNvPr id="14" name="Picture 13" descr="github_logo_social_coding_outlined.png"/>
+          <p:cNvPicPr>
+            <a:picLocks noChangeAspect="1"/>
+          </p:cNvPicPr>
+          <p:nvPr/>
+        </p:nvPicPr>
+        <p:blipFill>
+          <a:blip r:embed="rId8"/>
+          <a:stretch>
+            <a:fillRect/>
+          </a:stretch>
+        </p:blipFill>
+        <p:spPr>
+          <a:xfrm>
+            <a:off x="3352800" y="4129772"/>
+            <a:ext cx="1682559" cy="747028"/>
+          </a:xfrm>
+          <a:prstGeom prst="rect">
+            <a:avLst/>
+          </a:prstGeom>
+        </p:spPr>
+      </p:pic>
+    </p:spTree>
+  </p:cSld>
+  <p:clrMapOvr>
+    <a:masterClrMapping/>
+  </p:clrMapOvr>
+  <p:transition/>
+  <p:timing>
+    <p:tnLst>
+      <p:par>
+        <p:cTn id="1" dur="indefinite" restart="never" nodeType="tmRoot"/>
+      </p:par>
+    </p:tnLst>
+  </p:timing>
+</p:sld>
+</file>
+
+<file path=ppt/slides/slide55.xml><?xml version="1.0" encoding="utf-8"?>
+<p:sld xmlns:a="http://schemas.openxmlformats.org/drawingml/2006/main" xmlns:r="http://schemas.openxmlformats.org/officeDocument/2006/relationships" xmlns:p="http://schemas.openxmlformats.org/presentationml/2006/main">
+  <p:cSld>
+    <p:spTree>
+      <p:nvGrpSpPr>
+        <p:cNvPr id="1" name=""/>
+        <p:cNvGrpSpPr/>
+        <p:nvPr/>
+      </p:nvGrpSpPr>
+      <p:grpSpPr>
+        <a:xfrm>
+          <a:off x="0" y="0"/>
+          <a:ext cx="0" cy="0"/>
+          <a:chOff x="0" y="0"/>
+          <a:chExt cx="0" cy="0"/>
+        </a:xfrm>
+      </p:grpSpPr>
+      <p:sp>
+        <p:nvSpPr>
+          <p:cNvPr id="2" name="Title 1"/>
+          <p:cNvSpPr>
+            <a:spLocks noGrp="1"/>
+          </p:cNvSpPr>
+          <p:nvPr>
+            <p:ph type="ctrTitle"/>
+          </p:nvPr>
+        </p:nvSpPr>
+        <p:spPr>
+          <a:xfrm>
+            <a:off x="0" y="1"/>
+            <a:ext cx="9144000" cy="838199"/>
+          </a:xfrm>
+          <a:solidFill>
+            <a:schemeClr val="tx1">
+              <a:lumMod val="95000"/>
+              <a:lumOff val="5000"/>
+            </a:schemeClr>
+          </a:solidFill>
+        </p:spPr>
+        <p:txBody>
+          <a:bodyPr>
+            <a:normAutofit/>
+          </a:bodyPr>
+          <a:lstStyle/>
+          <a:p>
+            <a:r>
+              <a:rPr lang="en-US" sz="3600" b="1" dirty="0" err="1" smtClean="0">
+                <a:solidFill>
+                  <a:schemeClr val="accent5">
+                    <a:lumMod val="20000"/>
+                    <a:lumOff val="80000"/>
+                  </a:schemeClr>
+                </a:solidFill>
+              </a:rPr>
+              <a:t>BugBase</a:t>
+            </a:r>
+            <a:r>
+              <a:rPr lang="en-US" sz="3600" b="1" dirty="0" smtClean="0">
+                <a:solidFill>
+                  <a:schemeClr val="accent5">
+                    <a:lumMod val="20000"/>
+                    <a:lumOff val="80000"/>
+                  </a:schemeClr>
+                </a:solidFill>
+              </a:rPr>
+              <a:t> 1.0</a:t>
+            </a:r>
+            <a:endParaRPr lang="en-US" sz="3600" b="1" dirty="0">
+              <a:solidFill>
+                <a:schemeClr val="accent5">
+                  <a:lumMod val="20000"/>
+                  <a:lumOff val="80000"/>
+                </a:schemeClr>
+              </a:solidFill>
+            </a:endParaRPr>
+          </a:p>
+        </p:txBody>
+      </p:sp>
+      <p:sp>
+        <p:nvSpPr>
+          <p:cNvPr id="3" name="Subtitle 2"/>
+          <p:cNvSpPr>
+            <a:spLocks noGrp="1"/>
+          </p:cNvSpPr>
+          <p:nvPr>
+            <p:ph type="subTitle" idx="1"/>
+          </p:nvPr>
+        </p:nvSpPr>
+        <p:spPr>
+          <a:xfrm>
+            <a:off x="0" y="838200"/>
+            <a:ext cx="9144000" cy="609600"/>
+          </a:xfrm>
+          <a:solidFill>
+            <a:srgbClr val="FFFFCC"/>
+          </a:solidFill>
+        </p:spPr>
+        <p:txBody>
+          <a:bodyPr/>
+          <a:lstStyle/>
+          <a:p>
+            <a:r>
+              <a:rPr lang="en-US" b="1" dirty="0" smtClean="0">
+                <a:solidFill>
+                  <a:srgbClr val="00B050"/>
+                </a:solidFill>
+              </a:rPr>
+              <a:t>Evolution</a:t>
+            </a:r>
+            <a:endParaRPr lang="en-US" b="1" dirty="0">
+              <a:solidFill>
+                <a:srgbClr val="00B050"/>
+              </a:solidFill>
+            </a:endParaRPr>
+          </a:p>
+        </p:txBody>
+      </p:sp>
+      <p:pic>
+        <p:nvPicPr>
+          <p:cNvPr id="5" name="Picture 4" descr="snapshot61.png"/>
+          <p:cNvPicPr>
+            <a:picLocks noChangeAspect="1"/>
+          </p:cNvPicPr>
+          <p:nvPr/>
+        </p:nvPicPr>
+        <p:blipFill>
+          <a:blip r:embed="rId2"/>
+          <a:stretch>
+            <a:fillRect/>
+          </a:stretch>
+        </p:blipFill>
+        <p:spPr>
+          <a:xfrm>
+            <a:off x="2077245" y="2249512"/>
+            <a:ext cx="4989509" cy="3389288"/>
+          </a:xfrm>
+          <a:prstGeom prst="rect">
+            <a:avLst/>
+          </a:prstGeom>
+        </p:spPr>
+      </p:pic>
+    </p:spTree>
+  </p:cSld>
+  <p:clrMapOvr>
+    <a:masterClrMapping/>
+  </p:clrMapOvr>
+  <p:transition/>
+  <p:timing>
+    <p:tnLst>
+      <p:par>
+        <p:cTn id="1" dur="indefinite" restart="never" nodeType="tmRoot"/>
+      </p:par>
+    </p:tnLst>
+  </p:timing>
+</p:sld>
+</file>
+
+<file path=ppt/slides/slide56.xml><?xml version="1.0" encoding="utf-8"?>
+<p:sld xmlns:a="http://schemas.openxmlformats.org/drawingml/2006/main" xmlns:r="http://schemas.openxmlformats.org/officeDocument/2006/relationships" xmlns:p="http://schemas.openxmlformats.org/presentationml/2006/main">
+  <p:cSld>
+    <p:spTree>
+      <p:nvGrpSpPr>
+        <p:cNvPr id="1" name=""/>
+        <p:cNvGrpSpPr/>
+        <p:nvPr/>
+      </p:nvGrpSpPr>
+      <p:grpSpPr>
+        <a:xfrm>
+          <a:off x="0" y="0"/>
+          <a:ext cx="0" cy="0"/>
+          <a:chOff x="0" y="0"/>
+          <a:chExt cx="0" cy="0"/>
+        </a:xfrm>
+      </p:grpSpPr>
+      <p:sp>
+        <p:nvSpPr>
+          <p:cNvPr id="2" name="Title 1"/>
+          <p:cNvSpPr>
+            <a:spLocks noGrp="1"/>
+          </p:cNvSpPr>
+          <p:nvPr>
+            <p:ph type="ctrTitle"/>
+          </p:nvPr>
+        </p:nvSpPr>
+        <p:spPr>
+          <a:xfrm>
+            <a:off x="0" y="1"/>
+            <a:ext cx="9144000" cy="838199"/>
+          </a:xfrm>
+          <a:solidFill>
+            <a:schemeClr val="tx1">
+              <a:lumMod val="95000"/>
+              <a:lumOff val="5000"/>
+            </a:schemeClr>
+          </a:solidFill>
+        </p:spPr>
+        <p:txBody>
+          <a:bodyPr>
+            <a:normAutofit/>
+          </a:bodyPr>
+          <a:lstStyle/>
+          <a:p>
+            <a:r>
+              <a:rPr lang="en-US" sz="3600" b="1" dirty="0" err="1" smtClean="0">
+                <a:solidFill>
+                  <a:schemeClr val="accent5">
+                    <a:lumMod val="20000"/>
+                    <a:lumOff val="80000"/>
+                  </a:schemeClr>
+                </a:solidFill>
+              </a:rPr>
+              <a:t>BugBase</a:t>
+            </a:r>
+            <a:r>
+              <a:rPr lang="en-US" sz="3600" b="1" dirty="0" smtClean="0">
+                <a:solidFill>
+                  <a:schemeClr val="accent5">
+                    <a:lumMod val="20000"/>
+                    <a:lumOff val="80000"/>
+                  </a:schemeClr>
+                </a:solidFill>
+              </a:rPr>
+              <a:t> 1.0</a:t>
+            </a:r>
+            <a:endParaRPr lang="en-US" sz="3600" b="1" dirty="0">
+              <a:solidFill>
+                <a:schemeClr val="accent5">
+                  <a:lumMod val="20000"/>
+                  <a:lumOff val="80000"/>
+                </a:schemeClr>
+              </a:solidFill>
+            </a:endParaRPr>
+          </a:p>
+        </p:txBody>
+      </p:sp>
+      <p:sp>
+        <p:nvSpPr>
+          <p:cNvPr id="3" name="Subtitle 2"/>
+          <p:cNvSpPr>
+            <a:spLocks noGrp="1"/>
+          </p:cNvSpPr>
+          <p:nvPr>
+            <p:ph type="subTitle" idx="1"/>
+          </p:nvPr>
+        </p:nvSpPr>
+        <p:spPr>
+          <a:xfrm>
+            <a:off x="0" y="838200"/>
+            <a:ext cx="9144000" cy="609600"/>
+          </a:xfrm>
+          <a:solidFill>
+            <a:srgbClr val="FFFFCC"/>
+          </a:solidFill>
+        </p:spPr>
+        <p:txBody>
+          <a:bodyPr/>
+          <a:lstStyle/>
+          <a:p>
+            <a:r>
+              <a:rPr lang="en-US" b="1" dirty="0" smtClean="0">
+                <a:solidFill>
+                  <a:srgbClr val="00B050"/>
+                </a:solidFill>
+              </a:rPr>
+              <a:t>Evolution</a:t>
+            </a:r>
+            <a:endParaRPr lang="en-US" b="1" dirty="0">
+              <a:solidFill>
+                <a:srgbClr val="00B050"/>
+              </a:solidFill>
+            </a:endParaRPr>
+          </a:p>
+        </p:txBody>
+      </p:sp>
+      <p:pic>
+        <p:nvPicPr>
+          <p:cNvPr id="4" name="Picture 3" descr="snapshot60.png"/>
+          <p:cNvPicPr>
+            <a:picLocks noChangeAspect="1"/>
+          </p:cNvPicPr>
+          <p:nvPr/>
+        </p:nvPicPr>
+        <p:blipFill>
+          <a:blip r:embed="rId2"/>
+          <a:stretch>
+            <a:fillRect/>
+          </a:stretch>
+        </p:blipFill>
+        <p:spPr>
+          <a:xfrm>
+            <a:off x="0" y="1752600"/>
+            <a:ext cx="5078962" cy="546659"/>
+          </a:xfrm>
+          <a:prstGeom prst="rect">
+            <a:avLst/>
+          </a:prstGeom>
+        </p:spPr>
+      </p:pic>
+      <p:sp>
+        <p:nvSpPr>
+          <p:cNvPr id="5" name="TextBox 4"/>
+          <p:cNvSpPr txBox="1"/>
+          <p:nvPr/>
+        </p:nvSpPr>
+        <p:spPr>
+          <a:xfrm>
+            <a:off x="5105400" y="1752600"/>
+            <a:ext cx="4114800" cy="523220"/>
+          </a:xfrm>
+          <a:prstGeom prst="rect">
+            <a:avLst/>
+          </a:prstGeom>
+          <a:solidFill>
+            <a:schemeClr val="accent5">
+              <a:lumMod val="20000"/>
+              <a:lumOff val="80000"/>
+            </a:schemeClr>
+          </a:solidFill>
+        </p:spPr>
+        <p:txBody>
+          <a:bodyPr wrap="square" rtlCol="0">
+            <a:spAutoFit/>
+          </a:bodyPr>
+          <a:lstStyle/>
+          <a:p>
+            <a:pPr algn="ctr"/>
+            <a:r>
+              <a:rPr lang="en-US" sz="2800" b="1" dirty="0" smtClean="0">
+                <a:solidFill>
+                  <a:schemeClr val="tx2"/>
+                </a:solidFill>
+              </a:rPr>
+              <a:t>98 commits so far</a:t>
+            </a:r>
+            <a:endParaRPr lang="en-US" sz="2800" b="1" dirty="0">
+              <a:solidFill>
+                <a:schemeClr val="tx2"/>
+              </a:solidFill>
+            </a:endParaRPr>
+          </a:p>
+        </p:txBody>
+      </p:sp>
+    </p:spTree>
+  </p:cSld>
+  <p:clrMapOvr>
+    <a:masterClrMapping/>
+  </p:clrMapOvr>
+  <p:transition/>
+  <p:timing>
+    <p:tnLst>
+      <p:par>
+        <p:cTn id="1" dur="indefinite" restart="never" nodeType="tmRoot"/>
+      </p:par>
+    </p:tnLst>
+  </p:timing>
+</p:sld>
+</file>
+
+<file path=ppt/slides/slide57.xml><?xml version="1.0" encoding="utf-8"?>
+<p:sld xmlns:a="http://schemas.openxmlformats.org/drawingml/2006/main" xmlns:r="http://schemas.openxmlformats.org/officeDocument/2006/relationships" xmlns:p="http://schemas.openxmlformats.org/presentationml/2006/main">
+  <p:cSld>
+    <p:spTree>
+      <p:nvGrpSpPr>
+        <p:cNvPr id="1" name=""/>
+        <p:cNvGrpSpPr/>
+        <p:nvPr/>
+      </p:nvGrpSpPr>
+      <p:grpSpPr>
+        <a:xfrm>
+          <a:off x="0" y="0"/>
+          <a:ext cx="0" cy="0"/>
+          <a:chOff x="0" y="0"/>
+          <a:chExt cx="0" cy="0"/>
+        </a:xfrm>
+      </p:grpSpPr>
+      <p:sp>
+        <p:nvSpPr>
+          <p:cNvPr id="2" name="Title 1"/>
+          <p:cNvSpPr>
+            <a:spLocks noGrp="1"/>
+          </p:cNvSpPr>
+          <p:nvPr>
+            <p:ph type="ctrTitle"/>
+          </p:nvPr>
+        </p:nvSpPr>
+        <p:spPr>
+          <a:xfrm>
+            <a:off x="0" y="1"/>
+            <a:ext cx="9144000" cy="838199"/>
+          </a:xfrm>
+          <a:solidFill>
+            <a:schemeClr val="tx1">
+              <a:lumMod val="95000"/>
+              <a:lumOff val="5000"/>
+            </a:schemeClr>
+          </a:solidFill>
+        </p:spPr>
+        <p:txBody>
+          <a:bodyPr>
+            <a:normAutofit/>
+          </a:bodyPr>
+          <a:lstStyle/>
+          <a:p>
+            <a:r>
+              <a:rPr lang="en-US" sz="3600" b="1" dirty="0" err="1" smtClean="0">
+                <a:solidFill>
+                  <a:schemeClr val="accent5">
+                    <a:lumMod val="20000"/>
+                    <a:lumOff val="80000"/>
+                  </a:schemeClr>
+                </a:solidFill>
+              </a:rPr>
+              <a:t>BugBase</a:t>
+            </a:r>
+            <a:r>
+              <a:rPr lang="en-US" sz="3600" b="1" dirty="0" smtClean="0">
+                <a:solidFill>
+                  <a:schemeClr val="accent5">
+                    <a:lumMod val="20000"/>
+                    <a:lumOff val="80000"/>
+                  </a:schemeClr>
+                </a:solidFill>
+              </a:rPr>
+              <a:t> 1.0</a:t>
+            </a:r>
+            <a:endParaRPr lang="en-US" sz="3600" b="1" dirty="0">
+              <a:solidFill>
+                <a:schemeClr val="accent5">
+                  <a:lumMod val="20000"/>
+                  <a:lumOff val="80000"/>
+                </a:schemeClr>
+              </a:solidFill>
+            </a:endParaRPr>
+          </a:p>
+        </p:txBody>
+      </p:sp>
+      <p:sp>
+        <p:nvSpPr>
+          <p:cNvPr id="3" name="Subtitle 2"/>
+          <p:cNvSpPr>
+            <a:spLocks noGrp="1"/>
+          </p:cNvSpPr>
+          <p:nvPr>
+            <p:ph type="subTitle" idx="1"/>
+          </p:nvPr>
+        </p:nvSpPr>
+        <p:spPr>
+          <a:xfrm>
+            <a:off x="0" y="838200"/>
+            <a:ext cx="9144000" cy="609600"/>
+          </a:xfrm>
+          <a:solidFill>
+            <a:srgbClr val="FFFFCC"/>
+          </a:solidFill>
+        </p:spPr>
+        <p:txBody>
+          <a:bodyPr/>
+          <a:lstStyle/>
+          <a:p>
+            <a:r>
+              <a:rPr lang="en-US" b="1" dirty="0" smtClean="0">
+                <a:solidFill>
+                  <a:srgbClr val="00B050"/>
+                </a:solidFill>
+              </a:rPr>
+              <a:t>Evolution</a:t>
+            </a:r>
+            <a:endParaRPr lang="en-US" b="1" dirty="0">
+              <a:solidFill>
+                <a:srgbClr val="00B050"/>
+              </a:solidFill>
+            </a:endParaRPr>
+          </a:p>
+        </p:txBody>
+      </p:sp>
+      <p:pic>
+        <p:nvPicPr>
+          <p:cNvPr id="4" name="Picture 3" descr="snapshot60.png"/>
+          <p:cNvPicPr>
+            <a:picLocks noChangeAspect="1"/>
+          </p:cNvPicPr>
+          <p:nvPr/>
+        </p:nvPicPr>
+        <p:blipFill>
+          <a:blip r:embed="rId2"/>
+          <a:stretch>
+            <a:fillRect/>
+          </a:stretch>
+        </p:blipFill>
+        <p:spPr>
+          <a:xfrm>
+            <a:off x="0" y="1752600"/>
+            <a:ext cx="5078962" cy="546659"/>
+          </a:xfrm>
+          <a:prstGeom prst="rect">
+            <a:avLst/>
+          </a:prstGeom>
+        </p:spPr>
+      </p:pic>
+      <p:sp>
+        <p:nvSpPr>
+          <p:cNvPr id="5" name="TextBox 4"/>
+          <p:cNvSpPr txBox="1"/>
+          <p:nvPr/>
+        </p:nvSpPr>
+        <p:spPr>
+          <a:xfrm>
+            <a:off x="5084618" y="1752600"/>
+            <a:ext cx="4114800" cy="523220"/>
+          </a:xfrm>
+          <a:prstGeom prst="rect">
+            <a:avLst/>
+          </a:prstGeom>
+          <a:solidFill>
+            <a:schemeClr val="accent5">
+              <a:lumMod val="20000"/>
+              <a:lumOff val="80000"/>
+            </a:schemeClr>
+          </a:solidFill>
+        </p:spPr>
+        <p:txBody>
+          <a:bodyPr wrap="square" rtlCol="0">
+            <a:spAutoFit/>
+          </a:bodyPr>
+          <a:lstStyle/>
+          <a:p>
+            <a:pPr algn="ctr"/>
+            <a:r>
+              <a:rPr lang="en-US" sz="2800" b="1" dirty="0" smtClean="0">
+                <a:solidFill>
+                  <a:schemeClr val="tx2"/>
+                </a:solidFill>
+              </a:rPr>
+              <a:t>98 commits so far</a:t>
+            </a:r>
+            <a:endParaRPr lang="en-US" sz="2800" b="1" dirty="0">
+              <a:solidFill>
+                <a:schemeClr val="tx2"/>
+              </a:solidFill>
+            </a:endParaRPr>
+          </a:p>
+        </p:txBody>
+      </p:sp>
+      <p:sp>
+        <p:nvSpPr>
+          <p:cNvPr id="6" name="TextBox 5"/>
+          <p:cNvSpPr txBox="1"/>
+          <p:nvPr/>
+        </p:nvSpPr>
+        <p:spPr>
+          <a:xfrm>
+            <a:off x="0" y="2600980"/>
+            <a:ext cx="9144000" cy="523220"/>
+          </a:xfrm>
+          <a:prstGeom prst="rect">
+            <a:avLst/>
+          </a:prstGeom>
+          <a:solidFill>
+            <a:schemeClr val="accent5">
+              <a:lumMod val="20000"/>
+              <a:lumOff val="80000"/>
+            </a:schemeClr>
+          </a:solidFill>
+        </p:spPr>
+        <p:txBody>
+          <a:bodyPr wrap="square" rtlCol="0">
+            <a:spAutoFit/>
+          </a:bodyPr>
+          <a:lstStyle/>
+          <a:p>
+            <a:pPr algn="ctr"/>
+            <a:r>
+              <a:rPr lang="en-US" sz="2800" b="1" dirty="0" smtClean="0">
+                <a:solidFill>
+                  <a:schemeClr val="tx2"/>
+                </a:solidFill>
+              </a:rPr>
+              <a:t>98 commits so far in 7 days =&gt; Low quality</a:t>
+            </a:r>
+            <a:endParaRPr lang="en-US" sz="2800" b="1" dirty="0">
+              <a:solidFill>
+                <a:schemeClr val="tx2"/>
+              </a:solidFill>
+            </a:endParaRPr>
+          </a:p>
+        </p:txBody>
+      </p:sp>
+    </p:spTree>
+  </p:cSld>
+  <p:clrMapOvr>
+    <a:masterClrMapping/>
+  </p:clrMapOvr>
+  <p:transition/>
+  <p:timing>
+    <p:tnLst>
+      <p:par>
+        <p:cTn id="1" dur="indefinite" restart="never" nodeType="tmRoot"/>
+      </p:par>
+    </p:tnLst>
+  </p:timing>
+</p:sld>
+</file>
+
+<file path=ppt/slides/slide58.xml><?xml version="1.0" encoding="utf-8"?>
+<p:sld xmlns:a="http://schemas.openxmlformats.org/drawingml/2006/main" xmlns:r="http://schemas.openxmlformats.org/officeDocument/2006/relationships" xmlns:p="http://schemas.openxmlformats.org/presentationml/2006/main">
+  <p:cSld>
+    <p:spTree>
+      <p:nvGrpSpPr>
+        <p:cNvPr id="1" name=""/>
+        <p:cNvGrpSpPr/>
+        <p:nvPr/>
+      </p:nvGrpSpPr>
+      <p:grpSpPr>
+        <a:xfrm>
+          <a:off x="0" y="0"/>
+          <a:ext cx="0" cy="0"/>
+          <a:chOff x="0" y="0"/>
+          <a:chExt cx="0" cy="0"/>
+        </a:xfrm>
+      </p:grpSpPr>
+      <p:sp>
+        <p:nvSpPr>
+          <p:cNvPr id="2" name="Title 1"/>
+          <p:cNvSpPr>
+            <a:spLocks noGrp="1"/>
+          </p:cNvSpPr>
+          <p:nvPr>
+            <p:ph type="ctrTitle"/>
+          </p:nvPr>
+        </p:nvSpPr>
+        <p:spPr>
+          <a:xfrm>
+            <a:off x="0" y="1"/>
+            <a:ext cx="9144000" cy="838199"/>
+          </a:xfrm>
+          <a:solidFill>
+            <a:schemeClr val="tx1">
+              <a:lumMod val="95000"/>
+              <a:lumOff val="5000"/>
+            </a:schemeClr>
+          </a:solidFill>
+        </p:spPr>
+        <p:txBody>
+          <a:bodyPr>
+            <a:normAutofit/>
+          </a:bodyPr>
+          <a:lstStyle/>
+          <a:p>
+            <a:r>
+              <a:rPr lang="en-US" sz="3600" b="1" dirty="0" err="1" smtClean="0">
+                <a:solidFill>
+                  <a:schemeClr val="accent5">
+                    <a:lumMod val="20000"/>
+                    <a:lumOff val="80000"/>
+                  </a:schemeClr>
+                </a:solidFill>
+              </a:rPr>
+              <a:t>BugBase</a:t>
+            </a:r>
+            <a:r>
+              <a:rPr lang="en-US" sz="3600" b="1" dirty="0" smtClean="0">
+                <a:solidFill>
+                  <a:schemeClr val="accent5">
+                    <a:lumMod val="20000"/>
+                    <a:lumOff val="80000"/>
+                  </a:schemeClr>
+                </a:solidFill>
+              </a:rPr>
+              <a:t> 1.0</a:t>
+            </a:r>
+            <a:endParaRPr lang="en-US" sz="3600" b="1" dirty="0">
+              <a:solidFill>
+                <a:schemeClr val="accent5">
+                  <a:lumMod val="20000"/>
+                  <a:lumOff val="80000"/>
+                </a:schemeClr>
+              </a:solidFill>
+            </a:endParaRPr>
+          </a:p>
+        </p:txBody>
+      </p:sp>
+      <p:sp>
+        <p:nvSpPr>
+          <p:cNvPr id="3" name="Subtitle 2"/>
+          <p:cNvSpPr>
+            <a:spLocks noGrp="1"/>
+          </p:cNvSpPr>
+          <p:nvPr>
+            <p:ph type="subTitle" idx="1"/>
+          </p:nvPr>
+        </p:nvSpPr>
+        <p:spPr>
+          <a:xfrm>
+            <a:off x="0" y="838200"/>
+            <a:ext cx="9144000" cy="609600"/>
+          </a:xfrm>
+          <a:solidFill>
+            <a:srgbClr val="FFFFCC"/>
+          </a:solidFill>
+        </p:spPr>
+        <p:txBody>
+          <a:bodyPr/>
+          <a:lstStyle/>
+          <a:p>
+            <a:r>
+              <a:rPr lang="en-US" b="1" dirty="0" smtClean="0">
+                <a:solidFill>
+                  <a:srgbClr val="00B050"/>
+                </a:solidFill>
+              </a:rPr>
+              <a:t>Evolution</a:t>
+            </a:r>
+            <a:endParaRPr lang="en-US" b="1" dirty="0">
+              <a:solidFill>
+                <a:srgbClr val="00B050"/>
+              </a:solidFill>
+            </a:endParaRPr>
+          </a:p>
+        </p:txBody>
+      </p:sp>
+      <p:pic>
+        <p:nvPicPr>
+          <p:cNvPr id="4" name="Picture 3" descr="snapshot60.png"/>
+          <p:cNvPicPr>
+            <a:picLocks noChangeAspect="1"/>
+          </p:cNvPicPr>
+          <p:nvPr/>
+        </p:nvPicPr>
+        <p:blipFill>
+          <a:blip r:embed="rId2"/>
+          <a:stretch>
+            <a:fillRect/>
+          </a:stretch>
+        </p:blipFill>
+        <p:spPr>
+          <a:xfrm>
+            <a:off x="0" y="1752600"/>
+            <a:ext cx="5078962" cy="546659"/>
+          </a:xfrm>
+          <a:prstGeom prst="rect">
+            <a:avLst/>
+          </a:prstGeom>
+        </p:spPr>
+      </p:pic>
+      <p:sp>
+        <p:nvSpPr>
+          <p:cNvPr id="5" name="TextBox 4"/>
+          <p:cNvSpPr txBox="1"/>
+          <p:nvPr/>
+        </p:nvSpPr>
+        <p:spPr>
+          <a:xfrm>
+            <a:off x="5084618" y="1752600"/>
+            <a:ext cx="4114800" cy="523220"/>
+          </a:xfrm>
+          <a:prstGeom prst="rect">
+            <a:avLst/>
+          </a:prstGeom>
+          <a:solidFill>
+            <a:schemeClr val="accent5">
+              <a:lumMod val="20000"/>
+              <a:lumOff val="80000"/>
+            </a:schemeClr>
+          </a:solidFill>
+        </p:spPr>
+        <p:txBody>
+          <a:bodyPr wrap="square" rtlCol="0">
+            <a:spAutoFit/>
+          </a:bodyPr>
+          <a:lstStyle/>
+          <a:p>
+            <a:pPr algn="ctr"/>
+            <a:r>
+              <a:rPr lang="en-US" sz="2800" b="1" dirty="0" smtClean="0">
+                <a:solidFill>
+                  <a:schemeClr val="tx2"/>
+                </a:solidFill>
+              </a:rPr>
+              <a:t>98 commits so far</a:t>
+            </a:r>
+            <a:endParaRPr lang="en-US" sz="2800" b="1" dirty="0">
+              <a:solidFill>
+                <a:schemeClr val="tx2"/>
+              </a:solidFill>
+            </a:endParaRPr>
+          </a:p>
+        </p:txBody>
+      </p:sp>
+      <p:sp>
+        <p:nvSpPr>
+          <p:cNvPr id="6" name="TextBox 5"/>
+          <p:cNvSpPr txBox="1"/>
+          <p:nvPr/>
+        </p:nvSpPr>
+        <p:spPr>
+          <a:xfrm>
+            <a:off x="0" y="2600980"/>
+            <a:ext cx="9144000" cy="523220"/>
+          </a:xfrm>
+          <a:prstGeom prst="rect">
+            <a:avLst/>
+          </a:prstGeom>
+          <a:solidFill>
+            <a:schemeClr val="accent5">
+              <a:lumMod val="20000"/>
+              <a:lumOff val="80000"/>
+            </a:schemeClr>
+          </a:solidFill>
+        </p:spPr>
+        <p:txBody>
+          <a:bodyPr wrap="square" rtlCol="0">
+            <a:spAutoFit/>
+          </a:bodyPr>
+          <a:lstStyle/>
+          <a:p>
+            <a:pPr algn="ctr"/>
+            <a:r>
+              <a:rPr lang="en-US" sz="2800" b="1" dirty="0" smtClean="0">
+                <a:solidFill>
+                  <a:schemeClr val="tx2"/>
+                </a:solidFill>
+              </a:rPr>
+              <a:t>98 commits so far in 7 days =&gt; Low quality</a:t>
+            </a:r>
+            <a:endParaRPr lang="en-US" sz="2800" b="1" dirty="0">
+              <a:solidFill>
+                <a:schemeClr val="tx2"/>
+              </a:solidFill>
+            </a:endParaRPr>
+          </a:p>
+        </p:txBody>
+      </p:sp>
+      <p:sp>
+        <p:nvSpPr>
+          <p:cNvPr id="7" name="TextBox 6"/>
+          <p:cNvSpPr txBox="1"/>
+          <p:nvPr/>
+        </p:nvSpPr>
+        <p:spPr>
+          <a:xfrm>
+            <a:off x="0" y="3286780"/>
+            <a:ext cx="9144000" cy="523220"/>
+          </a:xfrm>
+          <a:prstGeom prst="rect">
+            <a:avLst/>
+          </a:prstGeom>
+          <a:solidFill>
+            <a:schemeClr val="accent5">
+              <a:lumMod val="20000"/>
+              <a:lumOff val="80000"/>
+            </a:schemeClr>
+          </a:solidFill>
+        </p:spPr>
+        <p:txBody>
+          <a:bodyPr wrap="square" rtlCol="0">
+            <a:spAutoFit/>
+          </a:bodyPr>
+          <a:lstStyle/>
+          <a:p>
+            <a:pPr algn="ctr"/>
+            <a:r>
+              <a:rPr lang="en-US" sz="2800" b="1" dirty="0" smtClean="0">
+                <a:solidFill>
+                  <a:schemeClr val="tx2"/>
+                </a:solidFill>
+              </a:rPr>
+              <a:t>98 commits so far in 7 days =&gt; Loopholes</a:t>
+            </a:r>
+            <a:endParaRPr lang="en-US" sz="2800" b="1" dirty="0">
+              <a:solidFill>
+                <a:schemeClr val="tx2"/>
+              </a:solidFill>
+            </a:endParaRPr>
+          </a:p>
+        </p:txBody>
+      </p:sp>
+    </p:spTree>
+  </p:cSld>
+  <p:clrMapOvr>
+    <a:masterClrMapping/>
+  </p:clrMapOvr>
+  <p:transition/>
+  <p:timing>
+    <p:tnLst>
+      <p:par>
+        <p:cTn id="1" dur="indefinite" restart="never" nodeType="tmRoot"/>
+      </p:par>
+    </p:tnLst>
+  </p:timing>
+</p:sld>
+</file>
+
+<file path=ppt/slides/slide59.xml><?xml version="1.0" encoding="utf-8"?>
+<p:sld xmlns:a="http://schemas.openxmlformats.org/drawingml/2006/main" xmlns:r="http://schemas.openxmlformats.org/officeDocument/2006/relationships" xmlns:p="http://schemas.openxmlformats.org/presentationml/2006/main">
+  <p:cSld>
+    <p:spTree>
+      <p:nvGrpSpPr>
+        <p:cNvPr id="1" name=""/>
+        <p:cNvGrpSpPr/>
+        <p:nvPr/>
+      </p:nvGrpSpPr>
+      <p:grpSpPr>
+        <a:xfrm>
+          <a:off x="0" y="0"/>
+          <a:ext cx="0" cy="0"/>
+          <a:chOff x="0" y="0"/>
+          <a:chExt cx="0" cy="0"/>
+        </a:xfrm>
+      </p:grpSpPr>
+      <p:sp>
+        <p:nvSpPr>
+          <p:cNvPr id="2" name="Title 1"/>
+          <p:cNvSpPr>
+            <a:spLocks noGrp="1"/>
+          </p:cNvSpPr>
+          <p:nvPr>
+            <p:ph type="ctrTitle"/>
+          </p:nvPr>
+        </p:nvSpPr>
+        <p:spPr>
+          <a:xfrm>
+            <a:off x="0" y="1"/>
+            <a:ext cx="9144000" cy="838199"/>
+          </a:xfrm>
+          <a:solidFill>
+            <a:schemeClr val="tx1">
+              <a:lumMod val="95000"/>
+              <a:lumOff val="5000"/>
+            </a:schemeClr>
+          </a:solidFill>
+        </p:spPr>
+        <p:txBody>
+          <a:bodyPr>
+            <a:normAutofit/>
+          </a:bodyPr>
+          <a:lstStyle/>
+          <a:p>
+            <a:r>
+              <a:rPr lang="en-US" sz="3600" b="1" dirty="0" err="1" smtClean="0">
+                <a:solidFill>
+                  <a:schemeClr val="accent5">
+                    <a:lumMod val="20000"/>
+                    <a:lumOff val="80000"/>
+                  </a:schemeClr>
+                </a:solidFill>
+              </a:rPr>
+              <a:t>BugBase</a:t>
+            </a:r>
+            <a:r>
+              <a:rPr lang="en-US" sz="3600" b="1" dirty="0" smtClean="0">
+                <a:solidFill>
+                  <a:schemeClr val="accent5">
+                    <a:lumMod val="20000"/>
+                    <a:lumOff val="80000"/>
+                  </a:schemeClr>
+                </a:solidFill>
+              </a:rPr>
+              <a:t> 1.0</a:t>
+            </a:r>
+            <a:endParaRPr lang="en-US" sz="3600" b="1" dirty="0">
+              <a:solidFill>
+                <a:schemeClr val="accent5">
+                  <a:lumMod val="20000"/>
+                  <a:lumOff val="80000"/>
+                </a:schemeClr>
+              </a:solidFill>
+            </a:endParaRPr>
+          </a:p>
+        </p:txBody>
+      </p:sp>
+      <p:sp>
+        <p:nvSpPr>
+          <p:cNvPr id="3" name="Subtitle 2"/>
+          <p:cNvSpPr>
+            <a:spLocks noGrp="1"/>
+          </p:cNvSpPr>
+          <p:nvPr>
+            <p:ph type="subTitle" idx="1"/>
+          </p:nvPr>
+        </p:nvSpPr>
+        <p:spPr>
+          <a:xfrm>
+            <a:off x="0" y="838200"/>
+            <a:ext cx="9144000" cy="609600"/>
+          </a:xfrm>
+          <a:solidFill>
+            <a:srgbClr val="FFFFCC"/>
+          </a:solidFill>
+        </p:spPr>
+        <p:txBody>
+          <a:bodyPr/>
+          <a:lstStyle/>
+          <a:p>
+            <a:r>
+              <a:rPr lang="en-US" b="1" dirty="0" smtClean="0">
+                <a:solidFill>
+                  <a:srgbClr val="00B050"/>
+                </a:solidFill>
+              </a:rPr>
+              <a:t>Evolution</a:t>
+            </a:r>
+            <a:endParaRPr lang="en-US" b="1" dirty="0">
+              <a:solidFill>
+                <a:srgbClr val="00B050"/>
+              </a:solidFill>
+            </a:endParaRPr>
+          </a:p>
+        </p:txBody>
+      </p:sp>
+      <p:pic>
+        <p:nvPicPr>
+          <p:cNvPr id="4" name="Picture 3" descr="snapshot60.png"/>
+          <p:cNvPicPr>
+            <a:picLocks noChangeAspect="1"/>
+          </p:cNvPicPr>
+          <p:nvPr/>
+        </p:nvPicPr>
+        <p:blipFill>
+          <a:blip r:embed="rId2"/>
+          <a:stretch>
+            <a:fillRect/>
+          </a:stretch>
+        </p:blipFill>
+        <p:spPr>
+          <a:xfrm>
+            <a:off x="0" y="1752600"/>
+            <a:ext cx="5078962" cy="546659"/>
+          </a:xfrm>
+          <a:prstGeom prst="rect">
+            <a:avLst/>
+          </a:prstGeom>
+        </p:spPr>
+      </p:pic>
+      <p:sp>
+        <p:nvSpPr>
+          <p:cNvPr id="5" name="TextBox 4"/>
+          <p:cNvSpPr txBox="1"/>
+          <p:nvPr/>
+        </p:nvSpPr>
+        <p:spPr>
+          <a:xfrm>
+            <a:off x="5084618" y="1752600"/>
+            <a:ext cx="4114800" cy="523220"/>
+          </a:xfrm>
+          <a:prstGeom prst="rect">
+            <a:avLst/>
+          </a:prstGeom>
+          <a:solidFill>
+            <a:schemeClr val="accent5">
+              <a:lumMod val="20000"/>
+              <a:lumOff val="80000"/>
+            </a:schemeClr>
+          </a:solidFill>
+        </p:spPr>
+        <p:txBody>
+          <a:bodyPr wrap="square" rtlCol="0">
+            <a:spAutoFit/>
+          </a:bodyPr>
+          <a:lstStyle/>
+          <a:p>
+            <a:pPr algn="ctr"/>
+            <a:r>
+              <a:rPr lang="en-US" sz="2800" b="1" dirty="0" smtClean="0">
+                <a:solidFill>
+                  <a:schemeClr val="tx2"/>
+                </a:solidFill>
+              </a:rPr>
+              <a:t>98 commits so far</a:t>
+            </a:r>
+            <a:endParaRPr lang="en-US" sz="2800" b="1" dirty="0">
+              <a:solidFill>
+                <a:schemeClr val="tx2"/>
+              </a:solidFill>
+            </a:endParaRPr>
+          </a:p>
+        </p:txBody>
+      </p:sp>
+      <p:sp>
+        <p:nvSpPr>
+          <p:cNvPr id="6" name="TextBox 5"/>
+          <p:cNvSpPr txBox="1"/>
+          <p:nvPr/>
+        </p:nvSpPr>
+        <p:spPr>
+          <a:xfrm>
+            <a:off x="0" y="2600980"/>
+            <a:ext cx="9144000" cy="523220"/>
+          </a:xfrm>
+          <a:prstGeom prst="rect">
+            <a:avLst/>
+          </a:prstGeom>
+          <a:solidFill>
+            <a:schemeClr val="accent5">
+              <a:lumMod val="20000"/>
+              <a:lumOff val="80000"/>
+            </a:schemeClr>
+          </a:solidFill>
+        </p:spPr>
+        <p:txBody>
+          <a:bodyPr wrap="square" rtlCol="0">
+            <a:spAutoFit/>
+          </a:bodyPr>
+          <a:lstStyle/>
+          <a:p>
+            <a:pPr algn="ctr"/>
+            <a:r>
+              <a:rPr lang="en-US" sz="2800" b="1" dirty="0" smtClean="0">
+                <a:solidFill>
+                  <a:schemeClr val="tx2"/>
+                </a:solidFill>
+              </a:rPr>
+              <a:t>98 commits so far in 7 days =&gt; Low quality</a:t>
+            </a:r>
+            <a:endParaRPr lang="en-US" sz="2800" b="1" dirty="0">
+              <a:solidFill>
+                <a:schemeClr val="tx2"/>
+              </a:solidFill>
+            </a:endParaRPr>
+          </a:p>
+        </p:txBody>
+      </p:sp>
+      <p:sp>
+        <p:nvSpPr>
+          <p:cNvPr id="7" name="TextBox 6"/>
+          <p:cNvSpPr txBox="1"/>
+          <p:nvPr/>
+        </p:nvSpPr>
+        <p:spPr>
+          <a:xfrm>
+            <a:off x="0" y="3286780"/>
+            <a:ext cx="9144000" cy="523220"/>
+          </a:xfrm>
+          <a:prstGeom prst="rect">
+            <a:avLst/>
+          </a:prstGeom>
+          <a:solidFill>
+            <a:schemeClr val="accent5">
+              <a:lumMod val="20000"/>
+              <a:lumOff val="80000"/>
+            </a:schemeClr>
+          </a:solidFill>
+        </p:spPr>
+        <p:txBody>
+          <a:bodyPr wrap="square" rtlCol="0">
+            <a:spAutoFit/>
+          </a:bodyPr>
+          <a:lstStyle/>
+          <a:p>
+            <a:pPr algn="ctr"/>
+            <a:r>
+              <a:rPr lang="en-US" sz="2800" b="1" dirty="0" smtClean="0">
+                <a:solidFill>
+                  <a:schemeClr val="tx2"/>
+                </a:solidFill>
+              </a:rPr>
+              <a:t>98 commits so far in 7 days =&gt; Loopholes</a:t>
+            </a:r>
+            <a:endParaRPr lang="en-US" sz="2800" b="1" dirty="0">
+              <a:solidFill>
+                <a:schemeClr val="tx2"/>
+              </a:solidFill>
+            </a:endParaRPr>
+          </a:p>
+        </p:txBody>
+      </p:sp>
+      <p:sp>
+        <p:nvSpPr>
+          <p:cNvPr id="8" name="TextBox 7"/>
+          <p:cNvSpPr txBox="1"/>
+          <p:nvPr/>
+        </p:nvSpPr>
+        <p:spPr>
+          <a:xfrm>
+            <a:off x="0" y="3962400"/>
+            <a:ext cx="9144000" cy="523220"/>
+          </a:xfrm>
+          <a:prstGeom prst="rect">
+            <a:avLst/>
+          </a:prstGeom>
+          <a:solidFill>
+            <a:schemeClr val="accent5">
+              <a:lumMod val="20000"/>
+              <a:lumOff val="80000"/>
+            </a:schemeClr>
+          </a:solidFill>
+        </p:spPr>
+        <p:txBody>
+          <a:bodyPr wrap="square" rtlCol="0">
+            <a:spAutoFit/>
+          </a:bodyPr>
+          <a:lstStyle/>
+          <a:p>
+            <a:pPr algn="ctr"/>
+            <a:r>
+              <a:rPr lang="en-US" sz="2800" b="1" dirty="0" smtClean="0">
+                <a:solidFill>
+                  <a:schemeClr val="tx2"/>
+                </a:solidFill>
+              </a:rPr>
+              <a:t>98 commits so far in 7 days =&gt; pending TODOs</a:t>
+            </a:r>
+            <a:endParaRPr lang="en-US" sz="2800" b="1" dirty="0">
+              <a:solidFill>
+                <a:schemeClr val="tx2"/>
+              </a:solidFill>
+            </a:endParaRPr>
+          </a:p>
+        </p:txBody>
+      </p:sp>
+      <p:pic>
+        <p:nvPicPr>
+          <p:cNvPr id="9" name="Picture 8" descr="snapshot62.png"/>
+          <p:cNvPicPr>
+            <a:picLocks noChangeAspect="1"/>
+          </p:cNvPicPr>
+          <p:nvPr/>
+        </p:nvPicPr>
+        <p:blipFill>
+          <a:blip r:embed="rId3"/>
+          <a:stretch>
+            <a:fillRect/>
+          </a:stretch>
+        </p:blipFill>
+        <p:spPr>
+          <a:xfrm>
+            <a:off x="0" y="5486812"/>
+            <a:ext cx="9144000" cy="1294988"/>
+          </a:xfrm>
+          <a:prstGeom prst="rect">
+            <a:avLst/>
+          </a:prstGeom>
+        </p:spPr>
+      </p:pic>
+    </p:spTree>
+  </p:cSld>
+  <p:clrMapOvr>
+    <a:masterClrMapping/>
+  </p:clrMapOvr>
+  <p:transition/>
   <p:timing>
     <p:tnLst>
       <p:par>
@@ -13015,6 +15047,1307 @@
   <p:clrMapOvr>
     <a:masterClrMapping/>
   </p:clrMapOvr>
+  <p:transition/>
+  <p:timing>
+    <p:tnLst>
+      <p:par>
+        <p:cTn id="1" dur="indefinite" restart="never" nodeType="tmRoot"/>
+      </p:par>
+    </p:tnLst>
+  </p:timing>
+</p:sld>
+</file>
+
+<file path=ppt/slides/slide60.xml><?xml version="1.0" encoding="utf-8"?>
+<p:sld xmlns:a="http://schemas.openxmlformats.org/drawingml/2006/main" xmlns:r="http://schemas.openxmlformats.org/officeDocument/2006/relationships" xmlns:p="http://schemas.openxmlformats.org/presentationml/2006/main">
+  <p:cSld>
+    <p:spTree>
+      <p:nvGrpSpPr>
+        <p:cNvPr id="1" name=""/>
+        <p:cNvGrpSpPr/>
+        <p:nvPr/>
+      </p:nvGrpSpPr>
+      <p:grpSpPr>
+        <a:xfrm>
+          <a:off x="0" y="0"/>
+          <a:ext cx="0" cy="0"/>
+          <a:chOff x="0" y="0"/>
+          <a:chExt cx="0" cy="0"/>
+        </a:xfrm>
+      </p:grpSpPr>
+      <p:sp>
+        <p:nvSpPr>
+          <p:cNvPr id="2" name="Title 1"/>
+          <p:cNvSpPr>
+            <a:spLocks noGrp="1"/>
+          </p:cNvSpPr>
+          <p:nvPr>
+            <p:ph type="ctrTitle"/>
+          </p:nvPr>
+        </p:nvSpPr>
+        <p:spPr>
+          <a:xfrm>
+            <a:off x="0" y="1"/>
+            <a:ext cx="9144000" cy="838199"/>
+          </a:xfrm>
+          <a:solidFill>
+            <a:schemeClr val="tx1">
+              <a:lumMod val="95000"/>
+              <a:lumOff val="5000"/>
+            </a:schemeClr>
+          </a:solidFill>
+        </p:spPr>
+        <p:txBody>
+          <a:bodyPr>
+            <a:normAutofit/>
+          </a:bodyPr>
+          <a:lstStyle/>
+          <a:p>
+            <a:r>
+              <a:rPr lang="en-US" sz="3600" b="1" dirty="0" err="1" smtClean="0">
+                <a:solidFill>
+                  <a:schemeClr val="accent5">
+                    <a:lumMod val="20000"/>
+                    <a:lumOff val="80000"/>
+                  </a:schemeClr>
+                </a:solidFill>
+              </a:rPr>
+              <a:t>BugBase</a:t>
+            </a:r>
+            <a:r>
+              <a:rPr lang="en-US" sz="3600" b="1" dirty="0" smtClean="0">
+                <a:solidFill>
+                  <a:schemeClr val="accent5">
+                    <a:lumMod val="20000"/>
+                    <a:lumOff val="80000"/>
+                  </a:schemeClr>
+                </a:solidFill>
+              </a:rPr>
+              <a:t> 1.0</a:t>
+            </a:r>
+            <a:endParaRPr lang="en-US" sz="3600" b="1" dirty="0">
+              <a:solidFill>
+                <a:schemeClr val="accent5">
+                  <a:lumMod val="20000"/>
+                  <a:lumOff val="80000"/>
+                </a:schemeClr>
+              </a:solidFill>
+            </a:endParaRPr>
+          </a:p>
+        </p:txBody>
+      </p:sp>
+      <p:sp>
+        <p:nvSpPr>
+          <p:cNvPr id="3" name="Subtitle 2"/>
+          <p:cNvSpPr>
+            <a:spLocks noGrp="1"/>
+          </p:cNvSpPr>
+          <p:nvPr>
+            <p:ph type="subTitle" idx="1"/>
+          </p:nvPr>
+        </p:nvSpPr>
+        <p:spPr>
+          <a:xfrm>
+            <a:off x="0" y="838200"/>
+            <a:ext cx="9144000" cy="609600"/>
+          </a:xfrm>
+          <a:solidFill>
+            <a:srgbClr val="FFFFCC"/>
+          </a:solidFill>
+        </p:spPr>
+        <p:txBody>
+          <a:bodyPr/>
+          <a:lstStyle/>
+          <a:p>
+            <a:r>
+              <a:rPr lang="en-US" b="1" dirty="0" smtClean="0">
+                <a:solidFill>
+                  <a:srgbClr val="00B050"/>
+                </a:solidFill>
+              </a:rPr>
+              <a:t>Evolution</a:t>
+            </a:r>
+            <a:endParaRPr lang="en-US" b="1" dirty="0">
+              <a:solidFill>
+                <a:srgbClr val="00B050"/>
+              </a:solidFill>
+            </a:endParaRPr>
+          </a:p>
+        </p:txBody>
+      </p:sp>
+      <p:pic>
+        <p:nvPicPr>
+          <p:cNvPr id="4" name="Picture 3" descr="snapshot60.png"/>
+          <p:cNvPicPr>
+            <a:picLocks noChangeAspect="1"/>
+          </p:cNvPicPr>
+          <p:nvPr/>
+        </p:nvPicPr>
+        <p:blipFill>
+          <a:blip r:embed="rId2"/>
+          <a:stretch>
+            <a:fillRect/>
+          </a:stretch>
+        </p:blipFill>
+        <p:spPr>
+          <a:xfrm>
+            <a:off x="0" y="1752600"/>
+            <a:ext cx="5078962" cy="546659"/>
+          </a:xfrm>
+          <a:prstGeom prst="rect">
+            <a:avLst/>
+          </a:prstGeom>
+        </p:spPr>
+      </p:pic>
+      <p:sp>
+        <p:nvSpPr>
+          <p:cNvPr id="5" name="TextBox 4"/>
+          <p:cNvSpPr txBox="1"/>
+          <p:nvPr/>
+        </p:nvSpPr>
+        <p:spPr>
+          <a:xfrm>
+            <a:off x="5084618" y="1752600"/>
+            <a:ext cx="4114800" cy="523220"/>
+          </a:xfrm>
+          <a:prstGeom prst="rect">
+            <a:avLst/>
+          </a:prstGeom>
+          <a:solidFill>
+            <a:schemeClr val="accent5">
+              <a:lumMod val="20000"/>
+              <a:lumOff val="80000"/>
+            </a:schemeClr>
+          </a:solidFill>
+        </p:spPr>
+        <p:txBody>
+          <a:bodyPr wrap="square" rtlCol="0">
+            <a:spAutoFit/>
+          </a:bodyPr>
+          <a:lstStyle/>
+          <a:p>
+            <a:pPr algn="ctr"/>
+            <a:r>
+              <a:rPr lang="en-US" sz="2800" b="1" dirty="0" smtClean="0">
+                <a:solidFill>
+                  <a:schemeClr val="tx2"/>
+                </a:solidFill>
+              </a:rPr>
+              <a:t>98 commits so far</a:t>
+            </a:r>
+            <a:endParaRPr lang="en-US" sz="2800" b="1" dirty="0">
+              <a:solidFill>
+                <a:schemeClr val="tx2"/>
+              </a:solidFill>
+            </a:endParaRPr>
+          </a:p>
+        </p:txBody>
+      </p:sp>
+      <p:sp>
+        <p:nvSpPr>
+          <p:cNvPr id="6" name="TextBox 5"/>
+          <p:cNvSpPr txBox="1"/>
+          <p:nvPr/>
+        </p:nvSpPr>
+        <p:spPr>
+          <a:xfrm>
+            <a:off x="0" y="2600980"/>
+            <a:ext cx="9144000" cy="523220"/>
+          </a:xfrm>
+          <a:prstGeom prst="rect">
+            <a:avLst/>
+          </a:prstGeom>
+          <a:solidFill>
+            <a:schemeClr val="accent5">
+              <a:lumMod val="20000"/>
+              <a:lumOff val="80000"/>
+            </a:schemeClr>
+          </a:solidFill>
+        </p:spPr>
+        <p:txBody>
+          <a:bodyPr wrap="square" rtlCol="0">
+            <a:spAutoFit/>
+          </a:bodyPr>
+          <a:lstStyle/>
+          <a:p>
+            <a:pPr algn="ctr"/>
+            <a:r>
+              <a:rPr lang="en-US" sz="2800" b="1" dirty="0" smtClean="0">
+                <a:solidFill>
+                  <a:schemeClr val="tx2"/>
+                </a:solidFill>
+              </a:rPr>
+              <a:t>98 commits so far in 7 days =&gt; Low quality</a:t>
+            </a:r>
+            <a:endParaRPr lang="en-US" sz="2800" b="1" dirty="0">
+              <a:solidFill>
+                <a:schemeClr val="tx2"/>
+              </a:solidFill>
+            </a:endParaRPr>
+          </a:p>
+        </p:txBody>
+      </p:sp>
+      <p:sp>
+        <p:nvSpPr>
+          <p:cNvPr id="7" name="TextBox 6"/>
+          <p:cNvSpPr txBox="1"/>
+          <p:nvPr/>
+        </p:nvSpPr>
+        <p:spPr>
+          <a:xfrm>
+            <a:off x="0" y="3286780"/>
+            <a:ext cx="9144000" cy="523220"/>
+          </a:xfrm>
+          <a:prstGeom prst="rect">
+            <a:avLst/>
+          </a:prstGeom>
+          <a:solidFill>
+            <a:schemeClr val="accent5">
+              <a:lumMod val="20000"/>
+              <a:lumOff val="80000"/>
+            </a:schemeClr>
+          </a:solidFill>
+        </p:spPr>
+        <p:txBody>
+          <a:bodyPr wrap="square" rtlCol="0">
+            <a:spAutoFit/>
+          </a:bodyPr>
+          <a:lstStyle/>
+          <a:p>
+            <a:pPr algn="ctr"/>
+            <a:r>
+              <a:rPr lang="en-US" sz="2800" b="1" dirty="0" smtClean="0">
+                <a:solidFill>
+                  <a:schemeClr val="tx2"/>
+                </a:solidFill>
+              </a:rPr>
+              <a:t>98 commits so far in 7 days =&gt; Loopholes</a:t>
+            </a:r>
+            <a:endParaRPr lang="en-US" sz="2800" b="1" dirty="0">
+              <a:solidFill>
+                <a:schemeClr val="tx2"/>
+              </a:solidFill>
+            </a:endParaRPr>
+          </a:p>
+        </p:txBody>
+      </p:sp>
+      <p:sp>
+        <p:nvSpPr>
+          <p:cNvPr id="8" name="TextBox 7"/>
+          <p:cNvSpPr txBox="1"/>
+          <p:nvPr/>
+        </p:nvSpPr>
+        <p:spPr>
+          <a:xfrm>
+            <a:off x="0" y="3962400"/>
+            <a:ext cx="9144000" cy="523220"/>
+          </a:xfrm>
+          <a:prstGeom prst="rect">
+            <a:avLst/>
+          </a:prstGeom>
+          <a:solidFill>
+            <a:schemeClr val="accent5">
+              <a:lumMod val="20000"/>
+              <a:lumOff val="80000"/>
+            </a:schemeClr>
+          </a:solidFill>
+        </p:spPr>
+        <p:txBody>
+          <a:bodyPr wrap="square" rtlCol="0">
+            <a:spAutoFit/>
+          </a:bodyPr>
+          <a:lstStyle/>
+          <a:p>
+            <a:pPr algn="ctr"/>
+            <a:r>
+              <a:rPr lang="en-US" sz="2800" b="1" dirty="0" smtClean="0">
+                <a:solidFill>
+                  <a:schemeClr val="tx2"/>
+                </a:solidFill>
+              </a:rPr>
+              <a:t>98 commits so far in 7 days =&gt; pending TODOs</a:t>
+            </a:r>
+            <a:endParaRPr lang="en-US" sz="2800" b="1" dirty="0">
+              <a:solidFill>
+                <a:schemeClr val="tx2"/>
+              </a:solidFill>
+            </a:endParaRPr>
+          </a:p>
+        </p:txBody>
+      </p:sp>
+      <p:pic>
+        <p:nvPicPr>
+          <p:cNvPr id="9" name="Picture 8" descr="snapshot62.png"/>
+          <p:cNvPicPr>
+            <a:picLocks noChangeAspect="1"/>
+          </p:cNvPicPr>
+          <p:nvPr/>
+        </p:nvPicPr>
+        <p:blipFill>
+          <a:blip r:embed="rId3"/>
+          <a:stretch>
+            <a:fillRect/>
+          </a:stretch>
+        </p:blipFill>
+        <p:spPr>
+          <a:xfrm>
+            <a:off x="0" y="5486812"/>
+            <a:ext cx="9144000" cy="1294988"/>
+          </a:xfrm>
+          <a:prstGeom prst="rect">
+            <a:avLst/>
+          </a:prstGeom>
+        </p:spPr>
+      </p:pic>
+      <p:sp>
+        <p:nvSpPr>
+          <p:cNvPr id="10" name="Rectangular Callout 9"/>
+          <p:cNvSpPr/>
+          <p:nvPr/>
+        </p:nvSpPr>
+        <p:spPr>
+          <a:xfrm>
+            <a:off x="2895600" y="4648200"/>
+            <a:ext cx="2971800" cy="609600"/>
+          </a:xfrm>
+          <a:prstGeom prst="wedgeRectCallout">
+            <a:avLst/>
+          </a:prstGeom>
+          <a:ln w="38100"/>
+        </p:spPr>
+        <p:style>
+          <a:lnRef idx="2">
+            <a:schemeClr val="dk1"/>
+          </a:lnRef>
+          <a:fillRef idx="1">
+            <a:schemeClr val="lt1"/>
+          </a:fillRef>
+          <a:effectRef idx="0">
+            <a:schemeClr val="dk1"/>
+          </a:effectRef>
+          <a:fontRef idx="minor">
+            <a:schemeClr val="dk1"/>
+          </a:fontRef>
+        </p:style>
+        <p:txBody>
+          <a:bodyPr rtlCol="0" anchor="ctr"/>
+          <a:lstStyle/>
+          <a:p>
+            <a:pPr algn="ctr"/>
+            <a:r>
+              <a:rPr lang="en-US" dirty="0" smtClean="0"/>
+              <a:t>Wish this line to split out.</a:t>
+            </a:r>
+            <a:endParaRPr lang="en-US" dirty="0"/>
+          </a:p>
+        </p:txBody>
+      </p:sp>
+    </p:spTree>
+  </p:cSld>
+  <p:clrMapOvr>
+    <a:masterClrMapping/>
+  </p:clrMapOvr>
+  <p:transition/>
+  <p:timing>
+    <p:tnLst>
+      <p:par>
+        <p:cTn id="1" dur="indefinite" restart="never" nodeType="tmRoot"/>
+      </p:par>
+    </p:tnLst>
+  </p:timing>
+</p:sld>
+</file>
+
+<file path=ppt/slides/slide61.xml><?xml version="1.0" encoding="utf-8"?>
+<p:sld xmlns:a="http://schemas.openxmlformats.org/drawingml/2006/main" xmlns:r="http://schemas.openxmlformats.org/officeDocument/2006/relationships" xmlns:p="http://schemas.openxmlformats.org/presentationml/2006/main">
+  <p:cSld>
+    <p:spTree>
+      <p:nvGrpSpPr>
+        <p:cNvPr id="1" name=""/>
+        <p:cNvGrpSpPr/>
+        <p:nvPr/>
+      </p:nvGrpSpPr>
+      <p:grpSpPr>
+        <a:xfrm>
+          <a:off x="0" y="0"/>
+          <a:ext cx="0" cy="0"/>
+          <a:chOff x="0" y="0"/>
+          <a:chExt cx="0" cy="0"/>
+        </a:xfrm>
+      </p:grpSpPr>
+      <p:sp>
+        <p:nvSpPr>
+          <p:cNvPr id="2" name="Title 1"/>
+          <p:cNvSpPr>
+            <a:spLocks noGrp="1"/>
+          </p:cNvSpPr>
+          <p:nvPr>
+            <p:ph type="ctrTitle"/>
+          </p:nvPr>
+        </p:nvSpPr>
+        <p:spPr>
+          <a:xfrm>
+            <a:off x="0" y="1"/>
+            <a:ext cx="9144000" cy="838199"/>
+          </a:xfrm>
+          <a:solidFill>
+            <a:schemeClr val="tx1">
+              <a:lumMod val="95000"/>
+              <a:lumOff val="5000"/>
+            </a:schemeClr>
+          </a:solidFill>
+        </p:spPr>
+        <p:txBody>
+          <a:bodyPr>
+            <a:normAutofit/>
+          </a:bodyPr>
+          <a:lstStyle/>
+          <a:p>
+            <a:r>
+              <a:rPr lang="en-US" sz="3600" b="1" dirty="0" err="1" smtClean="0">
+                <a:solidFill>
+                  <a:schemeClr val="accent5">
+                    <a:lumMod val="20000"/>
+                    <a:lumOff val="80000"/>
+                  </a:schemeClr>
+                </a:solidFill>
+              </a:rPr>
+              <a:t>BugBase</a:t>
+            </a:r>
+            <a:r>
+              <a:rPr lang="en-US" sz="3600" b="1" dirty="0" smtClean="0">
+                <a:solidFill>
+                  <a:schemeClr val="accent5">
+                    <a:lumMod val="20000"/>
+                    <a:lumOff val="80000"/>
+                  </a:schemeClr>
+                </a:solidFill>
+              </a:rPr>
+              <a:t> 1.0</a:t>
+            </a:r>
+            <a:endParaRPr lang="en-US" sz="3600" b="1" dirty="0">
+              <a:solidFill>
+                <a:schemeClr val="accent5">
+                  <a:lumMod val="20000"/>
+                  <a:lumOff val="80000"/>
+                </a:schemeClr>
+              </a:solidFill>
+            </a:endParaRPr>
+          </a:p>
+        </p:txBody>
+      </p:sp>
+      <p:sp>
+        <p:nvSpPr>
+          <p:cNvPr id="3" name="Subtitle 2"/>
+          <p:cNvSpPr>
+            <a:spLocks noGrp="1"/>
+          </p:cNvSpPr>
+          <p:nvPr>
+            <p:ph type="subTitle" idx="1"/>
+          </p:nvPr>
+        </p:nvSpPr>
+        <p:spPr>
+          <a:xfrm>
+            <a:off x="0" y="838200"/>
+            <a:ext cx="9144000" cy="609600"/>
+          </a:xfrm>
+          <a:solidFill>
+            <a:srgbClr val="FFFFCC"/>
+          </a:solidFill>
+        </p:spPr>
+        <p:txBody>
+          <a:bodyPr/>
+          <a:lstStyle/>
+          <a:p>
+            <a:r>
+              <a:rPr lang="en-US" b="1" dirty="0" smtClean="0">
+                <a:solidFill>
+                  <a:srgbClr val="00B050"/>
+                </a:solidFill>
+              </a:rPr>
+              <a:t>Having said all that…</a:t>
+            </a:r>
+            <a:endParaRPr lang="en-US" b="1" dirty="0">
+              <a:solidFill>
+                <a:srgbClr val="00B050"/>
+              </a:solidFill>
+            </a:endParaRPr>
+          </a:p>
+        </p:txBody>
+      </p:sp>
+      <p:pic>
+        <p:nvPicPr>
+          <p:cNvPr id="6" name="Picture 5" descr="sad_face-600x450.jpg"/>
+          <p:cNvPicPr>
+            <a:picLocks noChangeAspect="1"/>
+          </p:cNvPicPr>
+          <p:nvPr/>
+        </p:nvPicPr>
+        <p:blipFill>
+          <a:blip r:embed="rId2"/>
+          <a:stretch>
+            <a:fillRect/>
+          </a:stretch>
+        </p:blipFill>
+        <p:spPr>
+          <a:xfrm>
+            <a:off x="1714500" y="1981200"/>
+            <a:ext cx="5715000" cy="4286250"/>
+          </a:xfrm>
+          <a:prstGeom prst="rect">
+            <a:avLst/>
+          </a:prstGeom>
+        </p:spPr>
+      </p:pic>
+    </p:spTree>
+  </p:cSld>
+  <p:clrMapOvr>
+    <a:masterClrMapping/>
+  </p:clrMapOvr>
+  <p:transition>
+    <p:fade/>
+  </p:transition>
+  <p:timing>
+    <p:tnLst>
+      <p:par>
+        <p:cTn id="1" dur="indefinite" restart="never" nodeType="tmRoot"/>
+      </p:par>
+    </p:tnLst>
+  </p:timing>
+</p:sld>
+</file>
+
+<file path=ppt/slides/slide62.xml><?xml version="1.0" encoding="utf-8"?>
+<p:sld xmlns:a="http://schemas.openxmlformats.org/drawingml/2006/main" xmlns:r="http://schemas.openxmlformats.org/officeDocument/2006/relationships" xmlns:p="http://schemas.openxmlformats.org/presentationml/2006/main">
+  <p:cSld>
+    <p:spTree>
+      <p:nvGrpSpPr>
+        <p:cNvPr id="1" name=""/>
+        <p:cNvGrpSpPr/>
+        <p:nvPr/>
+      </p:nvGrpSpPr>
+      <p:grpSpPr>
+        <a:xfrm>
+          <a:off x="0" y="0"/>
+          <a:ext cx="0" cy="0"/>
+          <a:chOff x="0" y="0"/>
+          <a:chExt cx="0" cy="0"/>
+        </a:xfrm>
+      </p:grpSpPr>
+      <p:sp>
+        <p:nvSpPr>
+          <p:cNvPr id="2" name="Title 1"/>
+          <p:cNvSpPr>
+            <a:spLocks noGrp="1"/>
+          </p:cNvSpPr>
+          <p:nvPr>
+            <p:ph type="ctrTitle"/>
+          </p:nvPr>
+        </p:nvSpPr>
+        <p:spPr>
+          <a:xfrm>
+            <a:off x="0" y="1"/>
+            <a:ext cx="9144000" cy="838199"/>
+          </a:xfrm>
+          <a:solidFill>
+            <a:schemeClr val="tx1">
+              <a:lumMod val="95000"/>
+              <a:lumOff val="5000"/>
+            </a:schemeClr>
+          </a:solidFill>
+        </p:spPr>
+        <p:txBody>
+          <a:bodyPr>
+            <a:normAutofit/>
+          </a:bodyPr>
+          <a:lstStyle/>
+          <a:p>
+            <a:r>
+              <a:rPr lang="en-US" sz="3600" b="1" dirty="0" err="1" smtClean="0">
+                <a:solidFill>
+                  <a:schemeClr val="accent5">
+                    <a:lumMod val="20000"/>
+                    <a:lumOff val="80000"/>
+                  </a:schemeClr>
+                </a:solidFill>
+              </a:rPr>
+              <a:t>BugBase</a:t>
+            </a:r>
+            <a:r>
+              <a:rPr lang="en-US" sz="3600" b="1" dirty="0" smtClean="0">
+                <a:solidFill>
+                  <a:schemeClr val="accent5">
+                    <a:lumMod val="20000"/>
+                    <a:lumOff val="80000"/>
+                  </a:schemeClr>
+                </a:solidFill>
+              </a:rPr>
+              <a:t> 1.0</a:t>
+            </a:r>
+            <a:endParaRPr lang="en-US" sz="3600" b="1" dirty="0">
+              <a:solidFill>
+                <a:schemeClr val="accent5">
+                  <a:lumMod val="20000"/>
+                  <a:lumOff val="80000"/>
+                </a:schemeClr>
+              </a:solidFill>
+            </a:endParaRPr>
+          </a:p>
+        </p:txBody>
+      </p:sp>
+      <p:sp>
+        <p:nvSpPr>
+          <p:cNvPr id="3" name="Subtitle 2"/>
+          <p:cNvSpPr>
+            <a:spLocks noGrp="1"/>
+          </p:cNvSpPr>
+          <p:nvPr>
+            <p:ph type="subTitle" idx="1"/>
+          </p:nvPr>
+        </p:nvSpPr>
+        <p:spPr>
+          <a:xfrm>
+            <a:off x="0" y="838200"/>
+            <a:ext cx="9144000" cy="609600"/>
+          </a:xfrm>
+          <a:solidFill>
+            <a:srgbClr val="FFFFCC"/>
+          </a:solidFill>
+        </p:spPr>
+        <p:txBody>
+          <a:bodyPr/>
+          <a:lstStyle/>
+          <a:p>
+            <a:r>
+              <a:rPr lang="en-US" b="1" dirty="0" smtClean="0">
+                <a:solidFill>
+                  <a:srgbClr val="00B050"/>
+                </a:solidFill>
+              </a:rPr>
+              <a:t>You’re invited to…</a:t>
+            </a:r>
+            <a:endParaRPr lang="en-US" b="1" dirty="0">
+              <a:solidFill>
+                <a:srgbClr val="00B050"/>
+              </a:solidFill>
+            </a:endParaRPr>
+          </a:p>
+        </p:txBody>
+      </p:sp>
+      <p:pic>
+        <p:nvPicPr>
+          <p:cNvPr id="5" name="Picture 4" descr="invited.jpg"/>
+          <p:cNvPicPr>
+            <a:picLocks noChangeAspect="1"/>
+          </p:cNvPicPr>
+          <p:nvPr/>
+        </p:nvPicPr>
+        <p:blipFill>
+          <a:blip r:embed="rId2"/>
+          <a:stretch>
+            <a:fillRect/>
+          </a:stretch>
+        </p:blipFill>
+        <p:spPr>
+          <a:xfrm>
+            <a:off x="2514600" y="1676400"/>
+            <a:ext cx="4389120" cy="4937760"/>
+          </a:xfrm>
+          <a:prstGeom prst="rect">
+            <a:avLst/>
+          </a:prstGeom>
+        </p:spPr>
+      </p:pic>
+    </p:spTree>
+  </p:cSld>
+  <p:clrMapOvr>
+    <a:masterClrMapping/>
+  </p:clrMapOvr>
+  <p:transition>
+    <p:fade/>
+  </p:transition>
+  <p:timing>
+    <p:tnLst>
+      <p:par>
+        <p:cTn id="1" dur="indefinite" restart="never" nodeType="tmRoot"/>
+      </p:par>
+    </p:tnLst>
+  </p:timing>
+</p:sld>
+</file>
+
+<file path=ppt/slides/slide63.xml><?xml version="1.0" encoding="utf-8"?>
+<p:sld xmlns:a="http://schemas.openxmlformats.org/drawingml/2006/main" xmlns:r="http://schemas.openxmlformats.org/officeDocument/2006/relationships" xmlns:p="http://schemas.openxmlformats.org/presentationml/2006/main">
+  <p:cSld>
+    <p:spTree>
+      <p:nvGrpSpPr>
+        <p:cNvPr id="1" name=""/>
+        <p:cNvGrpSpPr/>
+        <p:nvPr/>
+      </p:nvGrpSpPr>
+      <p:grpSpPr>
+        <a:xfrm>
+          <a:off x="0" y="0"/>
+          <a:ext cx="0" cy="0"/>
+          <a:chOff x="0" y="0"/>
+          <a:chExt cx="0" cy="0"/>
+        </a:xfrm>
+      </p:grpSpPr>
+      <p:sp>
+        <p:nvSpPr>
+          <p:cNvPr id="2" name="Title 1"/>
+          <p:cNvSpPr>
+            <a:spLocks noGrp="1"/>
+          </p:cNvSpPr>
+          <p:nvPr>
+            <p:ph type="ctrTitle"/>
+          </p:nvPr>
+        </p:nvSpPr>
+        <p:spPr>
+          <a:xfrm>
+            <a:off x="0" y="1"/>
+            <a:ext cx="9144000" cy="838199"/>
+          </a:xfrm>
+          <a:solidFill>
+            <a:schemeClr val="tx1">
+              <a:lumMod val="95000"/>
+              <a:lumOff val="5000"/>
+            </a:schemeClr>
+          </a:solidFill>
+        </p:spPr>
+        <p:txBody>
+          <a:bodyPr>
+            <a:normAutofit/>
+          </a:bodyPr>
+          <a:lstStyle/>
+          <a:p>
+            <a:r>
+              <a:rPr lang="en-US" sz="3600" b="1" dirty="0" err="1" smtClean="0">
+                <a:solidFill>
+                  <a:schemeClr val="accent5">
+                    <a:lumMod val="20000"/>
+                    <a:lumOff val="80000"/>
+                  </a:schemeClr>
+                </a:solidFill>
+              </a:rPr>
+              <a:t>BugBase</a:t>
+            </a:r>
+            <a:r>
+              <a:rPr lang="en-US" sz="3600" b="1" dirty="0" smtClean="0">
+                <a:solidFill>
+                  <a:schemeClr val="accent5">
+                    <a:lumMod val="20000"/>
+                    <a:lumOff val="80000"/>
+                  </a:schemeClr>
+                </a:solidFill>
+              </a:rPr>
+              <a:t> 1.0</a:t>
+            </a:r>
+            <a:endParaRPr lang="en-US" sz="3600" b="1" dirty="0">
+              <a:solidFill>
+                <a:schemeClr val="accent5">
+                  <a:lumMod val="20000"/>
+                  <a:lumOff val="80000"/>
+                </a:schemeClr>
+              </a:solidFill>
+            </a:endParaRPr>
+          </a:p>
+        </p:txBody>
+      </p:sp>
+      <p:sp>
+        <p:nvSpPr>
+          <p:cNvPr id="3" name="Subtitle 2"/>
+          <p:cNvSpPr>
+            <a:spLocks noGrp="1"/>
+          </p:cNvSpPr>
+          <p:nvPr>
+            <p:ph type="subTitle" idx="1"/>
+          </p:nvPr>
+        </p:nvSpPr>
+        <p:spPr>
+          <a:xfrm>
+            <a:off x="0" y="838200"/>
+            <a:ext cx="9144000" cy="609600"/>
+          </a:xfrm>
+          <a:solidFill>
+            <a:srgbClr val="FFFFCC"/>
+          </a:solidFill>
+        </p:spPr>
+        <p:txBody>
+          <a:bodyPr/>
+          <a:lstStyle/>
+          <a:p>
+            <a:r>
+              <a:rPr lang="en-US" b="1" dirty="0" smtClean="0">
+                <a:solidFill>
+                  <a:srgbClr val="00B050"/>
+                </a:solidFill>
+              </a:rPr>
+              <a:t>Fork </a:t>
+            </a:r>
+            <a:r>
+              <a:rPr lang="en-US" b="1" dirty="0" err="1" smtClean="0">
+                <a:solidFill>
+                  <a:srgbClr val="00B050"/>
+                </a:solidFill>
+              </a:rPr>
+              <a:t>BugBase</a:t>
+            </a:r>
+            <a:endParaRPr lang="en-US" b="1" dirty="0">
+              <a:solidFill>
+                <a:srgbClr val="00B050"/>
+              </a:solidFill>
+            </a:endParaRPr>
+          </a:p>
+        </p:txBody>
+      </p:sp>
+      <p:pic>
+        <p:nvPicPr>
+          <p:cNvPr id="7" name="Picture 6" descr="tux-fork.gif"/>
+          <p:cNvPicPr>
+            <a:picLocks noChangeAspect="1"/>
+          </p:cNvPicPr>
+          <p:nvPr/>
+        </p:nvPicPr>
+        <p:blipFill>
+          <a:blip r:embed="rId2"/>
+          <a:stretch>
+            <a:fillRect/>
+          </a:stretch>
+        </p:blipFill>
+        <p:spPr>
+          <a:xfrm>
+            <a:off x="3048000" y="1895475"/>
+            <a:ext cx="3048000" cy="3067050"/>
+          </a:xfrm>
+          <a:prstGeom prst="rect">
+            <a:avLst/>
+          </a:prstGeom>
+        </p:spPr>
+      </p:pic>
+      <p:sp>
+        <p:nvSpPr>
+          <p:cNvPr id="8" name="TextBox 7"/>
+          <p:cNvSpPr txBox="1"/>
+          <p:nvPr/>
+        </p:nvSpPr>
+        <p:spPr>
+          <a:xfrm>
+            <a:off x="0" y="5410200"/>
+            <a:ext cx="9144000" cy="461665"/>
+          </a:xfrm>
+          <a:prstGeom prst="rect">
+            <a:avLst/>
+          </a:prstGeom>
+          <a:solidFill>
+            <a:srgbClr val="FFFFCC"/>
+          </a:solidFill>
+        </p:spPr>
+        <p:txBody>
+          <a:bodyPr wrap="square" rtlCol="0">
+            <a:spAutoFit/>
+          </a:bodyPr>
+          <a:lstStyle/>
+          <a:p>
+            <a:pPr algn="ctr"/>
+            <a:r>
+              <a:rPr lang="en-US" sz="2400" b="1" dirty="0" smtClean="0"/>
+              <a:t>http://github.com/ideamonk/bugbase</a:t>
+            </a:r>
+            <a:endParaRPr lang="en-US" sz="2400" b="1" dirty="0"/>
+          </a:p>
+        </p:txBody>
+      </p:sp>
+    </p:spTree>
+  </p:cSld>
+  <p:clrMapOvr>
+    <a:masterClrMapping/>
+  </p:clrMapOvr>
+  <p:transition>
+    <p:fade/>
+  </p:transition>
+  <p:timing>
+    <p:tnLst>
+      <p:par>
+        <p:cTn id="1" dur="indefinite" restart="never" nodeType="tmRoot"/>
+      </p:par>
+    </p:tnLst>
+  </p:timing>
+</p:sld>
+</file>
+
+<file path=ppt/slides/slide64.xml><?xml version="1.0" encoding="utf-8"?>
+<p:sld xmlns:a="http://schemas.openxmlformats.org/drawingml/2006/main" xmlns:r="http://schemas.openxmlformats.org/officeDocument/2006/relationships" xmlns:p="http://schemas.openxmlformats.org/presentationml/2006/main">
+  <p:cSld>
+    <p:spTree>
+      <p:nvGrpSpPr>
+        <p:cNvPr id="1" name=""/>
+        <p:cNvGrpSpPr/>
+        <p:nvPr/>
+      </p:nvGrpSpPr>
+      <p:grpSpPr>
+        <a:xfrm>
+          <a:off x="0" y="0"/>
+          <a:ext cx="0" cy="0"/>
+          <a:chOff x="0" y="0"/>
+          <a:chExt cx="0" cy="0"/>
+        </a:xfrm>
+      </p:grpSpPr>
+      <p:sp>
+        <p:nvSpPr>
+          <p:cNvPr id="2" name="Title 1"/>
+          <p:cNvSpPr>
+            <a:spLocks noGrp="1"/>
+          </p:cNvSpPr>
+          <p:nvPr>
+            <p:ph type="ctrTitle"/>
+          </p:nvPr>
+        </p:nvSpPr>
+        <p:spPr>
+          <a:xfrm>
+            <a:off x="0" y="1"/>
+            <a:ext cx="9144000" cy="838199"/>
+          </a:xfrm>
+          <a:solidFill>
+            <a:schemeClr val="tx1">
+              <a:lumMod val="95000"/>
+              <a:lumOff val="5000"/>
+            </a:schemeClr>
+          </a:solidFill>
+        </p:spPr>
+        <p:txBody>
+          <a:bodyPr>
+            <a:normAutofit/>
+          </a:bodyPr>
+          <a:lstStyle/>
+          <a:p>
+            <a:r>
+              <a:rPr lang="en-US" sz="3600" b="1" dirty="0" err="1" smtClean="0">
+                <a:solidFill>
+                  <a:schemeClr val="accent5">
+                    <a:lumMod val="20000"/>
+                    <a:lumOff val="80000"/>
+                  </a:schemeClr>
+                </a:solidFill>
+              </a:rPr>
+              <a:t>BugBase</a:t>
+            </a:r>
+            <a:r>
+              <a:rPr lang="en-US" sz="3600" b="1" dirty="0" smtClean="0">
+                <a:solidFill>
+                  <a:schemeClr val="accent5">
+                    <a:lumMod val="20000"/>
+                    <a:lumOff val="80000"/>
+                  </a:schemeClr>
+                </a:solidFill>
+              </a:rPr>
+              <a:t> 1.0</a:t>
+            </a:r>
+            <a:endParaRPr lang="en-US" sz="3600" b="1" dirty="0">
+              <a:solidFill>
+                <a:schemeClr val="accent5">
+                  <a:lumMod val="20000"/>
+                  <a:lumOff val="80000"/>
+                </a:schemeClr>
+              </a:solidFill>
+            </a:endParaRPr>
+          </a:p>
+        </p:txBody>
+      </p:sp>
+      <p:sp>
+        <p:nvSpPr>
+          <p:cNvPr id="3" name="Subtitle 2"/>
+          <p:cNvSpPr>
+            <a:spLocks noGrp="1"/>
+          </p:cNvSpPr>
+          <p:nvPr>
+            <p:ph type="subTitle" idx="1"/>
+          </p:nvPr>
+        </p:nvSpPr>
+        <p:spPr>
+          <a:xfrm>
+            <a:off x="0" y="838200"/>
+            <a:ext cx="9144000" cy="609600"/>
+          </a:xfrm>
+          <a:solidFill>
+            <a:srgbClr val="FFFFCC"/>
+          </a:solidFill>
+        </p:spPr>
+        <p:txBody>
+          <a:bodyPr/>
+          <a:lstStyle/>
+          <a:p>
+            <a:r>
+              <a:rPr lang="en-US" b="1" dirty="0" smtClean="0">
+                <a:solidFill>
+                  <a:srgbClr val="00B050"/>
+                </a:solidFill>
+              </a:rPr>
+              <a:t>Development snapshot also active at</a:t>
+            </a:r>
+            <a:endParaRPr lang="en-US" b="1" dirty="0">
+              <a:solidFill>
+                <a:srgbClr val="00B050"/>
+              </a:solidFill>
+            </a:endParaRPr>
+          </a:p>
+        </p:txBody>
+      </p:sp>
+      <p:sp>
+        <p:nvSpPr>
+          <p:cNvPr id="8" name="TextBox 7"/>
+          <p:cNvSpPr txBox="1"/>
+          <p:nvPr/>
+        </p:nvSpPr>
+        <p:spPr>
+          <a:xfrm>
+            <a:off x="0" y="3576935"/>
+            <a:ext cx="9144000" cy="523220"/>
+          </a:xfrm>
+          <a:prstGeom prst="rect">
+            <a:avLst/>
+          </a:prstGeom>
+          <a:solidFill>
+            <a:srgbClr val="FFFFCC"/>
+          </a:solidFill>
+        </p:spPr>
+        <p:txBody>
+          <a:bodyPr wrap="square" rtlCol="0">
+            <a:spAutoFit/>
+          </a:bodyPr>
+          <a:lstStyle/>
+          <a:p>
+            <a:pPr algn="ctr"/>
+            <a:r>
+              <a:rPr lang="en-US" sz="2800" b="1" dirty="0" smtClean="0"/>
+              <a:t>http://bugs.madetokill.com</a:t>
+            </a:r>
+            <a:endParaRPr lang="en-US" sz="2800" b="1" dirty="0"/>
+          </a:p>
+        </p:txBody>
+      </p:sp>
+    </p:spTree>
+  </p:cSld>
+  <p:clrMapOvr>
+    <a:masterClrMapping/>
+  </p:clrMapOvr>
+  <p:transition>
+    <p:fade thruBlk="1"/>
+  </p:transition>
+  <p:timing>
+    <p:tnLst>
+      <p:par>
+        <p:cTn id="1" dur="indefinite" restart="never" nodeType="tmRoot"/>
+      </p:par>
+    </p:tnLst>
+  </p:timing>
+</p:sld>
+</file>
+
+<file path=ppt/slides/slide65.xml><?xml version="1.0" encoding="utf-8"?>
+<p:sld xmlns:a="http://schemas.openxmlformats.org/drawingml/2006/main" xmlns:r="http://schemas.openxmlformats.org/officeDocument/2006/relationships" xmlns:p="http://schemas.openxmlformats.org/presentationml/2006/main">
+  <p:cSld>
+    <p:spTree>
+      <p:nvGrpSpPr>
+        <p:cNvPr id="1" name=""/>
+        <p:cNvGrpSpPr/>
+        <p:nvPr/>
+      </p:nvGrpSpPr>
+      <p:grpSpPr>
+        <a:xfrm>
+          <a:off x="0" y="0"/>
+          <a:ext cx="0" cy="0"/>
+          <a:chOff x="0" y="0"/>
+          <a:chExt cx="0" cy="0"/>
+        </a:xfrm>
+      </p:grpSpPr>
+      <p:pic>
+        <p:nvPicPr>
+          <p:cNvPr id="5" name="Picture 4" descr="2821898310_fd0de97fe3.jpg"/>
+          <p:cNvPicPr>
+            <a:picLocks noChangeAspect="1"/>
+          </p:cNvPicPr>
+          <p:nvPr/>
+        </p:nvPicPr>
+        <p:blipFill>
+          <a:blip r:embed="rId2"/>
+          <a:stretch>
+            <a:fillRect/>
+          </a:stretch>
+        </p:blipFill>
+        <p:spPr>
+          <a:xfrm>
+            <a:off x="0" y="-128016"/>
+            <a:ext cx="9144000" cy="6986016"/>
+          </a:xfrm>
+          <a:prstGeom prst="rect">
+            <a:avLst/>
+          </a:prstGeom>
+        </p:spPr>
+      </p:pic>
+      <p:sp>
+        <p:nvSpPr>
+          <p:cNvPr id="2" name="Title 1"/>
+          <p:cNvSpPr>
+            <a:spLocks noGrp="1"/>
+          </p:cNvSpPr>
+          <p:nvPr>
+            <p:ph type="ctrTitle"/>
+          </p:nvPr>
+        </p:nvSpPr>
+        <p:spPr>
+          <a:xfrm>
+            <a:off x="0" y="1"/>
+            <a:ext cx="9144000" cy="838199"/>
+          </a:xfrm>
+          <a:solidFill>
+            <a:schemeClr val="tx1">
+              <a:lumMod val="95000"/>
+              <a:lumOff val="5000"/>
+            </a:schemeClr>
+          </a:solidFill>
+        </p:spPr>
+        <p:txBody>
+          <a:bodyPr>
+            <a:normAutofit/>
+          </a:bodyPr>
+          <a:lstStyle/>
+          <a:p>
+            <a:r>
+              <a:rPr lang="en-US" sz="3600" b="1" dirty="0" err="1" smtClean="0">
+                <a:solidFill>
+                  <a:schemeClr val="accent5">
+                    <a:lumMod val="20000"/>
+                    <a:lumOff val="80000"/>
+                  </a:schemeClr>
+                </a:solidFill>
+              </a:rPr>
+              <a:t>BugBase</a:t>
+            </a:r>
+            <a:r>
+              <a:rPr lang="en-US" sz="3600" b="1" dirty="0" smtClean="0">
+                <a:solidFill>
+                  <a:schemeClr val="accent5">
+                    <a:lumMod val="20000"/>
+                    <a:lumOff val="80000"/>
+                  </a:schemeClr>
+                </a:solidFill>
+              </a:rPr>
+              <a:t> 1.0</a:t>
+            </a:r>
+            <a:endParaRPr lang="en-US" sz="3600" b="1" dirty="0">
+              <a:solidFill>
+                <a:schemeClr val="accent5">
+                  <a:lumMod val="20000"/>
+                  <a:lumOff val="80000"/>
+                </a:schemeClr>
+              </a:solidFill>
+            </a:endParaRPr>
+          </a:p>
+        </p:txBody>
+      </p:sp>
+      <p:sp>
+        <p:nvSpPr>
+          <p:cNvPr id="3" name="Subtitle 2"/>
+          <p:cNvSpPr>
+            <a:spLocks noGrp="1"/>
+          </p:cNvSpPr>
+          <p:nvPr>
+            <p:ph type="subTitle" idx="1"/>
+          </p:nvPr>
+        </p:nvSpPr>
+        <p:spPr>
+          <a:xfrm>
+            <a:off x="0" y="838200"/>
+            <a:ext cx="9144000" cy="609600"/>
+          </a:xfrm>
+          <a:solidFill>
+            <a:srgbClr val="FFFFCC"/>
+          </a:solidFill>
+        </p:spPr>
+        <p:txBody>
+          <a:bodyPr/>
+          <a:lstStyle/>
+          <a:p>
+            <a:r>
+              <a:rPr lang="en-US" b="1" dirty="0" smtClean="0">
+                <a:solidFill>
+                  <a:srgbClr val="00B050"/>
+                </a:solidFill>
+              </a:rPr>
+              <a:t>Adios!</a:t>
+            </a:r>
+            <a:endParaRPr lang="en-US" b="1" dirty="0">
+              <a:solidFill>
+                <a:srgbClr val="00B050"/>
+              </a:solidFill>
+            </a:endParaRPr>
+          </a:p>
+        </p:txBody>
+      </p:sp>
+      <p:sp>
+        <p:nvSpPr>
+          <p:cNvPr id="7" name="TextBox 6"/>
+          <p:cNvSpPr txBox="1"/>
+          <p:nvPr/>
+        </p:nvSpPr>
+        <p:spPr>
+          <a:xfrm>
+            <a:off x="0" y="5830669"/>
+            <a:ext cx="9144000" cy="646331"/>
+          </a:xfrm>
+          <a:prstGeom prst="rect">
+            <a:avLst/>
+          </a:prstGeom>
+          <a:solidFill>
+            <a:schemeClr val="tx1">
+              <a:lumMod val="95000"/>
+              <a:lumOff val="5000"/>
+            </a:schemeClr>
+          </a:solidFill>
+        </p:spPr>
+        <p:txBody>
+          <a:bodyPr wrap="square" rtlCol="0">
+            <a:spAutoFit/>
+          </a:bodyPr>
+          <a:lstStyle/>
+          <a:p>
+            <a:pPr algn="r"/>
+            <a:r>
+              <a:rPr lang="en-US" sz="3600" dirty="0" smtClean="0">
+                <a:solidFill>
+                  <a:schemeClr val="accent5">
+                    <a:lumMod val="20000"/>
+                    <a:lumOff val="80000"/>
+                  </a:schemeClr>
+                </a:solidFill>
+              </a:rPr>
+              <a:t>Keep in touch – </a:t>
+            </a:r>
+            <a:r>
+              <a:rPr lang="en-US" sz="3600" dirty="0" smtClean="0">
+                <a:solidFill>
+                  <a:srgbClr val="9DF54D"/>
+                </a:solidFill>
+              </a:rPr>
+              <a:t>http://blog.ideamonk.in</a:t>
+            </a:r>
+            <a:endParaRPr lang="en-US" sz="3600" dirty="0">
+              <a:solidFill>
+                <a:srgbClr val="9DF54D"/>
+              </a:solidFill>
+            </a:endParaRPr>
+          </a:p>
+        </p:txBody>
+      </p:sp>
+    </p:spTree>
+  </p:cSld>
+  <p:clrMapOvr>
+    <a:masterClrMapping/>
+  </p:clrMapOvr>
+  <p:transition>
+    <p:fade thruBlk="1"/>
+  </p:transition>
   <p:timing>
     <p:tnLst>
       <p:par>
@@ -13277,6 +16610,7 @@
   <p:clrMapOvr>
     <a:masterClrMapping/>
   </p:clrMapOvr>
+  <p:transition/>
   <p:timing>
     <p:tnLst>
       <p:par>
@@ -13586,6 +16920,7 @@
   <p:clrMapOvr>
     <a:masterClrMapping/>
   </p:clrMapOvr>
+  <p:transition/>
   <p:timing>
     <p:tnLst>
       <p:par>
@@ -13952,6 +17287,7 @@
   <p:clrMapOvr>
     <a:masterClrMapping/>
   </p:clrMapOvr>
+  <p:transition/>
   <p:timing>
     <p:tnLst>
       <p:par>

</xml_diff>